<commit_message>
import/export SD & class angepasst Präsentation
</commit_message>
<xml_diff>
--- a/SearchRobot/doc/presentation.pptx
+++ b/SearchRobot/doc/presentation.pptx
@@ -5,22 +5,25 @@
     <p:sldMasterId id="2147483660" r:id="rId1"/>
   </p:sldMasterIdLst>
   <p:notesMasterIdLst>
-    <p:notesMasterId r:id="rId12"/>
+    <p:notesMasterId r:id="rId15"/>
   </p:notesMasterIdLst>
   <p:handoutMasterIdLst>
-    <p:handoutMasterId r:id="rId13"/>
+    <p:handoutMasterId r:id="rId16"/>
   </p:handoutMasterIdLst>
   <p:sldIdLst>
     <p:sldId id="256" r:id="rId2"/>
     <p:sldId id="258" r:id="rId3"/>
-    <p:sldId id="261" r:id="rId4"/>
-    <p:sldId id="260" r:id="rId5"/>
-    <p:sldId id="262" r:id="rId6"/>
-    <p:sldId id="265" r:id="rId7"/>
-    <p:sldId id="266" r:id="rId8"/>
+    <p:sldId id="260" r:id="rId4"/>
+    <p:sldId id="262" r:id="rId5"/>
+    <p:sldId id="265" r:id="rId6"/>
+    <p:sldId id="266" r:id="rId7"/>
+    <p:sldId id="268" r:id="rId8"/>
     <p:sldId id="267" r:id="rId9"/>
-    <p:sldId id="263" r:id="rId10"/>
-    <p:sldId id="264" r:id="rId11"/>
+    <p:sldId id="269" r:id="rId10"/>
+    <p:sldId id="270" r:id="rId11"/>
+    <p:sldId id="271" r:id="rId12"/>
+    <p:sldId id="263" r:id="rId13"/>
+    <p:sldId id="264" r:id="rId14"/>
   </p:sldIdLst>
   <p:sldSz cx="9144000" cy="6858000" type="screen4x3"/>
   <p:notesSz cx="6858000" cy="9144000"/>
@@ -204,7 +207,7 @@
           <a:p>
             <a:fld id="{5700CF2B-8EF7-EB4B-86E2-A47F47DC1114}" type="datetime1">
               <a:rPr lang="de-CH" smtClean="0"/>
-              <a:t>11.12.13</a:t>
+              <a:t>25.12.13</a:t>
             </a:fld>
             <a:endParaRPr lang="de-DE"/>
           </a:p>
@@ -370,7 +373,7 @@
           <a:p>
             <a:fld id="{E92AB650-C135-D34D-93AB-17B8508C2308}" type="datetime1">
               <a:rPr lang="de-CH" smtClean="0"/>
-              <a:t>11.12.13</a:t>
+              <a:t>25.12.13</a:t>
             </a:fld>
             <a:endParaRPr lang="de-DE"/>
           </a:p>
@@ -684,229 +687,15 @@
           <a:lstStyle/>
           <a:p>
             <a:r>
-              <a:rPr lang="de-DE" sz="1200" b="1" kern="1200" dirty="0" smtClean="0">
-                <a:solidFill>
-                  <a:schemeClr val="tx1"/>
-                </a:solidFill>
-                <a:effectLst/>
-                <a:latin typeface="+mn-lt"/>
-                <a:ea typeface="+mn-ea"/>
-                <a:cs typeface="+mn-cs"/>
-              </a:rPr>
-              <a:t>Hindernisse setzen</a:t>
-            </a:r>
-          </a:p>
-          <a:p>
-            <a:r>
-              <a:rPr lang="de-DE" sz="1200" kern="1200" dirty="0" smtClean="0">
-                <a:solidFill>
-                  <a:schemeClr val="tx1"/>
-                </a:solidFill>
-                <a:effectLst/>
-                <a:latin typeface="+mn-lt"/>
-                <a:ea typeface="+mn-ea"/>
-                <a:cs typeface="+mn-cs"/>
-              </a:rPr>
-              <a:t>Ein Spieler setzt alle gewünschte Hindernisse (2D Hindernisse) auf dem Spielfeld. </a:t>
-            </a:r>
-          </a:p>
-          <a:p>
-            <a:r>
-              <a:rPr lang="de-DE" sz="1200" b="1" kern="1200" dirty="0" smtClean="0">
-                <a:solidFill>
-                  <a:schemeClr val="tx1"/>
-                </a:solidFill>
-                <a:effectLst/>
-                <a:latin typeface="+mn-lt"/>
-                <a:ea typeface="+mn-ea"/>
-                <a:cs typeface="+mn-cs"/>
-              </a:rPr>
-              <a:t>Roboter setzen</a:t>
-            </a:r>
-          </a:p>
-          <a:p>
-            <a:r>
-              <a:rPr lang="de-DE" sz="1200" kern="1200" dirty="0" smtClean="0">
-                <a:solidFill>
-                  <a:schemeClr val="tx1"/>
-                </a:solidFill>
-                <a:effectLst/>
-                <a:latin typeface="+mn-lt"/>
-                <a:ea typeface="+mn-ea"/>
-                <a:cs typeface="+mn-cs"/>
-              </a:rPr>
-              <a:t>Der Spieler setzt den Roboter auf das Spielfeld. Diese Position wird zugleich die Startposition des Roboters sein. </a:t>
-            </a:r>
-          </a:p>
-          <a:p>
-            <a:r>
-              <a:rPr lang="de-DE" sz="1200" b="1" kern="1200" dirty="0" smtClean="0">
-                <a:solidFill>
-                  <a:schemeClr val="tx1"/>
-                </a:solidFill>
-                <a:effectLst/>
-                <a:latin typeface="+mn-lt"/>
-                <a:ea typeface="+mn-ea"/>
-                <a:cs typeface="+mn-cs"/>
-              </a:rPr>
-              <a:t>Ziel setzten</a:t>
-            </a:r>
-          </a:p>
-          <a:p>
-            <a:r>
-              <a:rPr lang="de-DE" sz="1200" kern="1200" dirty="0" smtClean="0">
-                <a:solidFill>
-                  <a:schemeClr val="tx1"/>
-                </a:solidFill>
-                <a:effectLst/>
-                <a:latin typeface="+mn-lt"/>
-                <a:ea typeface="+mn-ea"/>
-                <a:cs typeface="+mn-cs"/>
-              </a:rPr>
-              <a:t>Der Spieler setzt das Ziel, das der Roboter suchen muss, auf das Spielfeld. </a:t>
-            </a:r>
-          </a:p>
-          <a:p>
-            <a:r>
-              <a:rPr lang="de-DE" sz="1200" b="1" kern="1200" dirty="0" smtClean="0">
-                <a:solidFill>
-                  <a:schemeClr val="tx1"/>
-                </a:solidFill>
-                <a:effectLst/>
-                <a:latin typeface="+mn-lt"/>
-                <a:ea typeface="+mn-ea"/>
-                <a:cs typeface="+mn-cs"/>
-              </a:rPr>
-              <a:t>Roboter starten</a:t>
-            </a:r>
-          </a:p>
-          <a:p>
-            <a:r>
-              <a:rPr lang="de-DE" sz="1200" kern="1200" dirty="0" smtClean="0">
-                <a:solidFill>
-                  <a:schemeClr val="tx1"/>
-                </a:solidFill>
-                <a:effectLst/>
-                <a:latin typeface="+mn-lt"/>
-                <a:ea typeface="+mn-ea"/>
-                <a:cs typeface="+mn-cs"/>
-              </a:rPr>
-              <a:t>Der Spieler startet das Spiel, d.h. der Roboter beginnt das Ziel zu suchen. </a:t>
-            </a:r>
-          </a:p>
-          <a:p>
-            <a:r>
-              <a:rPr lang="de-DE" sz="1200" b="1" kern="1200" dirty="0" smtClean="0">
-                <a:solidFill>
-                  <a:schemeClr val="tx1"/>
-                </a:solidFill>
-                <a:effectLst/>
-                <a:latin typeface="+mn-lt"/>
-                <a:ea typeface="+mn-ea"/>
-                <a:cs typeface="+mn-cs"/>
-              </a:rPr>
-              <a:t>Suche abbrechen</a:t>
-            </a:r>
-          </a:p>
-          <a:p>
-            <a:r>
-              <a:rPr lang="de-DE" sz="1200" kern="1200" dirty="0" smtClean="0">
-                <a:solidFill>
-                  <a:schemeClr val="tx1"/>
-                </a:solidFill>
-                <a:effectLst/>
-                <a:latin typeface="+mn-lt"/>
-                <a:ea typeface="+mn-ea"/>
-                <a:cs typeface="+mn-cs"/>
-              </a:rPr>
-              <a:t>Der Spieler unterbricht die Suche nach dem Ziel und kehrt zum Spielfeldeditor zurück</a:t>
-            </a:r>
-          </a:p>
-          <a:p>
-            <a:r>
-              <a:rPr lang="de-DE" sz="1200" b="1" kern="1200" dirty="0" smtClean="0">
-                <a:solidFill>
-                  <a:schemeClr val="tx1"/>
-                </a:solidFill>
-                <a:effectLst/>
-                <a:latin typeface="+mn-lt"/>
-                <a:ea typeface="+mn-ea"/>
-                <a:cs typeface="+mn-cs"/>
-              </a:rPr>
-              <a:t>Spielfeld löschen</a:t>
-            </a:r>
-          </a:p>
-          <a:p>
-            <a:r>
-              <a:rPr lang="de-DE" sz="1200" kern="1200" dirty="0" smtClean="0">
-                <a:solidFill>
-                  <a:schemeClr val="tx1"/>
-                </a:solidFill>
-                <a:effectLst/>
-                <a:latin typeface="+mn-lt"/>
-                <a:ea typeface="+mn-ea"/>
-                <a:cs typeface="+mn-cs"/>
-              </a:rPr>
-              <a:t>Der Spieler hat die Möglichkeit das Spiel jederzeit zurückzusetzten, d.h. Hindernisse, Ziel und Roboter werden vom Spielfeld entfernt. </a:t>
-            </a:r>
-          </a:p>
-          <a:p>
-            <a:r>
-              <a:rPr lang="de-DE" sz="1200" b="1" kern="1200" dirty="0" smtClean="0">
-                <a:solidFill>
-                  <a:schemeClr val="tx1"/>
-                </a:solidFill>
-                <a:effectLst/>
-                <a:latin typeface="+mn-lt"/>
-                <a:ea typeface="+mn-ea"/>
-                <a:cs typeface="+mn-cs"/>
-              </a:rPr>
-              <a:t>Spielfeld importieren</a:t>
-            </a:r>
-          </a:p>
-          <a:p>
-            <a:r>
-              <a:rPr lang="de-DE" sz="1200" kern="1200" dirty="0" smtClean="0">
-                <a:solidFill>
-                  <a:schemeClr val="tx1"/>
-                </a:solidFill>
-                <a:effectLst/>
-                <a:latin typeface="+mn-lt"/>
-                <a:ea typeface="+mn-ea"/>
-                <a:cs typeface="+mn-cs"/>
-              </a:rPr>
-              <a:t>Das Spielfeld kann anhand eines XML-Files importiert werden.</a:t>
-            </a:r>
-          </a:p>
-          <a:p>
-            <a:r>
-              <a:rPr lang="de-DE" sz="1200" b="1" kern="1200" dirty="0" smtClean="0">
-                <a:solidFill>
-                  <a:schemeClr val="tx1"/>
-                </a:solidFill>
-                <a:effectLst/>
-                <a:latin typeface="+mn-lt"/>
-                <a:ea typeface="+mn-ea"/>
-                <a:cs typeface="+mn-cs"/>
-              </a:rPr>
-              <a:t>Spielfeld exportieren</a:t>
-            </a:r>
-          </a:p>
-          <a:p>
-            <a:r>
-              <a:rPr lang="de-DE" sz="1200" kern="1200" dirty="0" smtClean="0">
-                <a:solidFill>
-                  <a:schemeClr val="tx1"/>
-                </a:solidFill>
-                <a:effectLst/>
-                <a:latin typeface="+mn-lt"/>
-                <a:ea typeface="+mn-ea"/>
-                <a:cs typeface="+mn-cs"/>
-              </a:rPr>
-              <a:t>Das Spielfeld wird in ein neu erstelltes XML-File abgespeichert. </a:t>
-            </a:r>
-          </a:p>
-          <a:p>
+              <a:rPr lang="de-DE" dirty="0" smtClean="0"/>
+              <a:t>Aufgabenstellung Robot erwähnen (Einleitung)</a:t>
+            </a:r>
+          </a:p>
+          <a:p>
+            <a:r>
+              <a:rPr lang="de-DE" dirty="0" smtClean="0"/>
+              <a:t>Teilung Frontend/Robot</a:t>
+            </a:r>
             <a:endParaRPr lang="de-DE" dirty="0"/>
           </a:p>
         </p:txBody>
@@ -928,7 +717,7 @@
           <a:p>
             <a:fld id="{6A2CFF65-CB9C-5A47-B7DE-47882B59B3DA}" type="slidenum">
               <a:rPr lang="de-DE" smtClean="0"/>
-              <a:t>7</a:t>
+              <a:t>2</a:t>
             </a:fld>
             <a:endParaRPr lang="de-DE"/>
           </a:p>
@@ -937,7 +726,7 @@
     </p:spTree>
     <p:extLst>
       <p:ext uri="{BB962C8B-B14F-4D97-AF65-F5344CB8AC3E}">
-        <p14:creationId xmlns:p14="http://schemas.microsoft.com/office/powerpoint/2010/main" val="4154515398"/>
+        <p14:creationId xmlns:p14="http://schemas.microsoft.com/office/powerpoint/2010/main" val="1841319628"/>
       </p:ext>
     </p:extLst>
   </p:cSld>
@@ -991,7 +780,603 @@
           <a:bodyPr/>
           <a:lstStyle/>
           <a:p>
+            <a:r>
+              <a:rPr lang="de-DE" sz="1200" b="1" kern="1200" dirty="0" smtClean="0">
+                <a:solidFill>
+                  <a:schemeClr val="tx1"/>
+                </a:solidFill>
+                <a:effectLst/>
+                <a:latin typeface="+mn-lt"/>
+                <a:ea typeface="+mn-ea"/>
+                <a:cs typeface="+mn-cs"/>
+              </a:rPr>
+              <a:t>Hindernisse setzen</a:t>
+            </a:r>
+          </a:p>
+          <a:p>
+            <a:r>
+              <a:rPr lang="de-DE" sz="1200" kern="1200" dirty="0" smtClean="0">
+                <a:solidFill>
+                  <a:schemeClr val="tx1"/>
+                </a:solidFill>
+                <a:effectLst/>
+                <a:latin typeface="+mn-lt"/>
+                <a:ea typeface="+mn-ea"/>
+                <a:cs typeface="+mn-cs"/>
+              </a:rPr>
+              <a:t>Ein Spieler setzt alle gewünschte Hindernisse (2D Hindernisse) auf dem Spielfeld. </a:t>
+            </a:r>
+          </a:p>
+          <a:p>
+            <a:r>
+              <a:rPr lang="de-DE" sz="1200" b="1" kern="1200" dirty="0" smtClean="0">
+                <a:solidFill>
+                  <a:schemeClr val="tx1"/>
+                </a:solidFill>
+                <a:effectLst/>
+                <a:latin typeface="+mn-lt"/>
+                <a:ea typeface="+mn-ea"/>
+                <a:cs typeface="+mn-cs"/>
+              </a:rPr>
+              <a:t>Roboter setzen</a:t>
+            </a:r>
+          </a:p>
+          <a:p>
+            <a:r>
+              <a:rPr lang="de-DE" sz="1200" kern="1200" dirty="0" smtClean="0">
+                <a:solidFill>
+                  <a:schemeClr val="tx1"/>
+                </a:solidFill>
+                <a:effectLst/>
+                <a:latin typeface="+mn-lt"/>
+                <a:ea typeface="+mn-ea"/>
+                <a:cs typeface="+mn-cs"/>
+              </a:rPr>
+              <a:t>Der Spieler setzt den Roboter auf das Spielfeld. Diese Position wird zugleich die Startposition des Roboters sein. </a:t>
+            </a:r>
+          </a:p>
+          <a:p>
+            <a:r>
+              <a:rPr lang="de-DE" sz="1200" b="1" kern="1200" dirty="0" smtClean="0">
+                <a:solidFill>
+                  <a:schemeClr val="tx1"/>
+                </a:solidFill>
+                <a:effectLst/>
+                <a:latin typeface="+mn-lt"/>
+                <a:ea typeface="+mn-ea"/>
+                <a:cs typeface="+mn-cs"/>
+              </a:rPr>
+              <a:t>Ziel setzten</a:t>
+            </a:r>
+          </a:p>
+          <a:p>
+            <a:r>
+              <a:rPr lang="de-DE" sz="1200" kern="1200" dirty="0" smtClean="0">
+                <a:solidFill>
+                  <a:schemeClr val="tx1"/>
+                </a:solidFill>
+                <a:effectLst/>
+                <a:latin typeface="+mn-lt"/>
+                <a:ea typeface="+mn-ea"/>
+                <a:cs typeface="+mn-cs"/>
+              </a:rPr>
+              <a:t>Der Spieler setzt das Ziel, das der Roboter suchen muss, auf das Spielfeld. </a:t>
+            </a:r>
+          </a:p>
+          <a:p>
+            <a:r>
+              <a:rPr lang="de-DE" sz="1200" b="1" kern="1200" dirty="0" smtClean="0">
+                <a:solidFill>
+                  <a:schemeClr val="tx1"/>
+                </a:solidFill>
+                <a:effectLst/>
+                <a:latin typeface="+mn-lt"/>
+                <a:ea typeface="+mn-ea"/>
+                <a:cs typeface="+mn-cs"/>
+              </a:rPr>
+              <a:t>Roboter starten</a:t>
+            </a:r>
+          </a:p>
+          <a:p>
+            <a:r>
+              <a:rPr lang="de-DE" sz="1200" kern="1200" dirty="0" smtClean="0">
+                <a:solidFill>
+                  <a:schemeClr val="tx1"/>
+                </a:solidFill>
+                <a:effectLst/>
+                <a:latin typeface="+mn-lt"/>
+                <a:ea typeface="+mn-ea"/>
+                <a:cs typeface="+mn-cs"/>
+              </a:rPr>
+              <a:t>Der Spieler startet das Spiel, d.h. der Roboter beginnt das Ziel zu suchen. </a:t>
+            </a:r>
+          </a:p>
+          <a:p>
+            <a:r>
+              <a:rPr lang="de-DE" sz="1200" b="1" kern="1200" dirty="0" smtClean="0">
+                <a:solidFill>
+                  <a:schemeClr val="tx1"/>
+                </a:solidFill>
+                <a:effectLst/>
+                <a:latin typeface="+mn-lt"/>
+                <a:ea typeface="+mn-ea"/>
+                <a:cs typeface="+mn-cs"/>
+              </a:rPr>
+              <a:t>Suche abbrechen</a:t>
+            </a:r>
+          </a:p>
+          <a:p>
+            <a:r>
+              <a:rPr lang="de-DE" sz="1200" kern="1200" dirty="0" smtClean="0">
+                <a:solidFill>
+                  <a:schemeClr val="tx1"/>
+                </a:solidFill>
+                <a:effectLst/>
+                <a:latin typeface="+mn-lt"/>
+                <a:ea typeface="+mn-ea"/>
+                <a:cs typeface="+mn-cs"/>
+              </a:rPr>
+              <a:t>Der Spieler unterbricht die Suche nach dem Ziel und kehrt zum Spielfeldeditor zurück</a:t>
+            </a:r>
+          </a:p>
+          <a:p>
+            <a:r>
+              <a:rPr lang="de-DE" sz="1200" b="1" kern="1200" dirty="0" smtClean="0">
+                <a:solidFill>
+                  <a:schemeClr val="tx1"/>
+                </a:solidFill>
+                <a:effectLst/>
+                <a:latin typeface="+mn-lt"/>
+                <a:ea typeface="+mn-ea"/>
+                <a:cs typeface="+mn-cs"/>
+              </a:rPr>
+              <a:t>Spielfeld löschen</a:t>
+            </a:r>
+          </a:p>
+          <a:p>
+            <a:r>
+              <a:rPr lang="de-DE" sz="1200" kern="1200" dirty="0" smtClean="0">
+                <a:solidFill>
+                  <a:schemeClr val="tx1"/>
+                </a:solidFill>
+                <a:effectLst/>
+                <a:latin typeface="+mn-lt"/>
+                <a:ea typeface="+mn-ea"/>
+                <a:cs typeface="+mn-cs"/>
+              </a:rPr>
+              <a:t>Der Spieler hat die Möglichkeit das Spiel jederzeit zurückzusetzten, d.h. Hindernisse, Ziel und Roboter werden vom Spielfeld entfernt. </a:t>
+            </a:r>
+          </a:p>
+          <a:p>
+            <a:r>
+              <a:rPr lang="de-DE" sz="1200" b="1" kern="1200" dirty="0" smtClean="0">
+                <a:solidFill>
+                  <a:schemeClr val="tx1"/>
+                </a:solidFill>
+                <a:effectLst/>
+                <a:latin typeface="+mn-lt"/>
+                <a:ea typeface="+mn-ea"/>
+                <a:cs typeface="+mn-cs"/>
+              </a:rPr>
+              <a:t>Spielfeld importieren</a:t>
+            </a:r>
+          </a:p>
+          <a:p>
+            <a:r>
+              <a:rPr lang="de-DE" sz="1200" kern="1200" dirty="0" smtClean="0">
+                <a:solidFill>
+                  <a:schemeClr val="tx1"/>
+                </a:solidFill>
+                <a:effectLst/>
+                <a:latin typeface="+mn-lt"/>
+                <a:ea typeface="+mn-ea"/>
+                <a:cs typeface="+mn-cs"/>
+              </a:rPr>
+              <a:t>Das Spielfeld kann anhand eines XML-Files importiert werden.</a:t>
+            </a:r>
+          </a:p>
+          <a:p>
+            <a:r>
+              <a:rPr lang="de-DE" sz="1200" b="1" kern="1200" dirty="0" smtClean="0">
+                <a:solidFill>
+                  <a:schemeClr val="tx1"/>
+                </a:solidFill>
+                <a:effectLst/>
+                <a:latin typeface="+mn-lt"/>
+                <a:ea typeface="+mn-ea"/>
+                <a:cs typeface="+mn-cs"/>
+              </a:rPr>
+              <a:t>Spielfeld exportieren</a:t>
+            </a:r>
+          </a:p>
+          <a:p>
+            <a:r>
+              <a:rPr lang="de-DE" sz="1200" kern="1200" dirty="0" smtClean="0">
+                <a:solidFill>
+                  <a:schemeClr val="tx1"/>
+                </a:solidFill>
+                <a:effectLst/>
+                <a:latin typeface="+mn-lt"/>
+                <a:ea typeface="+mn-ea"/>
+                <a:cs typeface="+mn-cs"/>
+              </a:rPr>
+              <a:t>Das Spielfeld wird in ein neu erstelltes XML-File abgespeichert. </a:t>
+            </a:r>
+          </a:p>
+          <a:p>
+            <a:endParaRPr lang="de-DE" dirty="0"/>
+          </a:p>
+        </p:txBody>
+      </p:sp>
+      <p:sp>
+        <p:nvSpPr>
+          <p:cNvPr id="4" name="Foliennummernplatzhalter 3"/>
+          <p:cNvSpPr>
+            <a:spLocks noGrp="1"/>
+          </p:cNvSpPr>
+          <p:nvPr>
+            <p:ph type="sldNum" sz="quarter" idx="10"/>
+          </p:nvPr>
+        </p:nvSpPr>
+        <p:spPr/>
+        <p:txBody>
+          <a:bodyPr/>
+          <a:lstStyle/>
+          <a:p>
+            <a:fld id="{6A2CFF65-CB9C-5A47-B7DE-47882B59B3DA}" type="slidenum">
+              <a:rPr lang="de-DE" smtClean="0"/>
+              <a:t>6</a:t>
+            </a:fld>
             <a:endParaRPr lang="de-DE"/>
+          </a:p>
+        </p:txBody>
+      </p:sp>
+    </p:spTree>
+    <p:extLst>
+      <p:ext uri="{BB962C8B-B14F-4D97-AF65-F5344CB8AC3E}">
+        <p14:creationId xmlns:p14="http://schemas.microsoft.com/office/powerpoint/2010/main" val="4154515398"/>
+      </p:ext>
+    </p:extLst>
+  </p:cSld>
+  <p:clrMapOvr>
+    <a:masterClrMapping/>
+  </p:clrMapOvr>
+</p:notes>
+</file>
+
+<file path=ppt/notesSlides/notesSlide3.xml><?xml version="1.0" encoding="utf-8"?>
+<p:notes xmlns:a="http://schemas.openxmlformats.org/drawingml/2006/main" xmlns:r="http://schemas.openxmlformats.org/officeDocument/2006/relationships" xmlns:p="http://schemas.openxmlformats.org/presentationml/2006/main">
+  <p:cSld>
+    <p:spTree>
+      <p:nvGrpSpPr>
+        <p:cNvPr id="1" name=""/>
+        <p:cNvGrpSpPr/>
+        <p:nvPr/>
+      </p:nvGrpSpPr>
+      <p:grpSpPr>
+        <a:xfrm>
+          <a:off x="0" y="0"/>
+          <a:ext cx="0" cy="0"/>
+          <a:chOff x="0" y="0"/>
+          <a:chExt cx="0" cy="0"/>
+        </a:xfrm>
+      </p:grpSpPr>
+      <p:sp>
+        <p:nvSpPr>
+          <p:cNvPr id="2" name="Folienbildplatzhalter 1"/>
+          <p:cNvSpPr>
+            <a:spLocks noGrp="1" noRot="1" noChangeAspect="1"/>
+          </p:cNvSpPr>
+          <p:nvPr>
+            <p:ph type="sldImg"/>
+          </p:nvPr>
+        </p:nvSpPr>
+        <p:spPr/>
+      </p:sp>
+      <p:sp>
+        <p:nvSpPr>
+          <p:cNvPr id="3" name="Notizenplatzhalter 2"/>
+          <p:cNvSpPr>
+            <a:spLocks noGrp="1"/>
+          </p:cNvSpPr>
+          <p:nvPr>
+            <p:ph type="body" idx="1"/>
+          </p:nvPr>
+        </p:nvSpPr>
+        <p:spPr/>
+        <p:txBody>
+          <a:bodyPr/>
+          <a:lstStyle/>
+          <a:p>
+            <a:r>
+              <a:rPr lang="de-DE" dirty="0" smtClean="0"/>
+              <a:t>Funktioniert bei Roboter/Ziel</a:t>
+            </a:r>
+            <a:r>
+              <a:rPr lang="de-DE" baseline="0" dirty="0" smtClean="0"/>
+              <a:t> </a:t>
+            </a:r>
+            <a:r>
+              <a:rPr lang="de-DE" baseline="0" smtClean="0"/>
+              <a:t>setzten gleich</a:t>
+            </a:r>
+            <a:endParaRPr lang="de-DE"/>
+          </a:p>
+        </p:txBody>
+      </p:sp>
+      <p:sp>
+        <p:nvSpPr>
+          <p:cNvPr id="4" name="Foliennummernplatzhalter 3"/>
+          <p:cNvSpPr>
+            <a:spLocks noGrp="1"/>
+          </p:cNvSpPr>
+          <p:nvPr>
+            <p:ph type="sldNum" sz="quarter" idx="10"/>
+          </p:nvPr>
+        </p:nvSpPr>
+        <p:spPr/>
+        <p:txBody>
+          <a:bodyPr/>
+          <a:lstStyle/>
+          <a:p>
+            <a:fld id="{6A2CFF65-CB9C-5A47-B7DE-47882B59B3DA}" type="slidenum">
+              <a:rPr lang="de-DE" smtClean="0"/>
+              <a:t>7</a:t>
+            </a:fld>
+            <a:endParaRPr lang="de-DE"/>
+          </a:p>
+        </p:txBody>
+      </p:sp>
+    </p:spTree>
+    <p:extLst>
+      <p:ext uri="{BB962C8B-B14F-4D97-AF65-F5344CB8AC3E}">
+        <p14:creationId xmlns:p14="http://schemas.microsoft.com/office/powerpoint/2010/main" val="660173880"/>
+      </p:ext>
+    </p:extLst>
+  </p:cSld>
+  <p:clrMapOvr>
+    <a:masterClrMapping/>
+  </p:clrMapOvr>
+</p:notes>
+</file>
+
+<file path=ppt/notesSlides/notesSlide4.xml><?xml version="1.0" encoding="utf-8"?>
+<p:notes xmlns:a="http://schemas.openxmlformats.org/drawingml/2006/main" xmlns:r="http://schemas.openxmlformats.org/officeDocument/2006/relationships" xmlns:p="http://schemas.openxmlformats.org/presentationml/2006/main">
+  <p:cSld>
+    <p:spTree>
+      <p:nvGrpSpPr>
+        <p:cNvPr id="1" name=""/>
+        <p:cNvGrpSpPr/>
+        <p:nvPr/>
+      </p:nvGrpSpPr>
+      <p:grpSpPr>
+        <a:xfrm>
+          <a:off x="0" y="0"/>
+          <a:ext cx="0" cy="0"/>
+          <a:chOff x="0" y="0"/>
+          <a:chExt cx="0" cy="0"/>
+        </a:xfrm>
+      </p:grpSpPr>
+      <p:sp>
+        <p:nvSpPr>
+          <p:cNvPr id="2" name="Folienbildplatzhalter 1"/>
+          <p:cNvSpPr>
+            <a:spLocks noGrp="1" noRot="1" noChangeAspect="1"/>
+          </p:cNvSpPr>
+          <p:nvPr>
+            <p:ph type="sldImg"/>
+          </p:nvPr>
+        </p:nvSpPr>
+        <p:spPr/>
+      </p:sp>
+      <p:sp>
+        <p:nvSpPr>
+          <p:cNvPr id="3" name="Notizenplatzhalter 2"/>
+          <p:cNvSpPr>
+            <a:spLocks noGrp="1"/>
+          </p:cNvSpPr>
+          <p:nvPr>
+            <p:ph type="body" idx="1"/>
+          </p:nvPr>
+        </p:nvSpPr>
+        <p:spPr/>
+        <p:txBody>
+          <a:bodyPr/>
+          <a:lstStyle/>
+          <a:p>
+            <a:r>
+              <a:rPr lang="de-DE" dirty="0" smtClean="0"/>
+              <a:t>Funktioniert bei Roboter/Ziel</a:t>
+            </a:r>
+            <a:r>
+              <a:rPr lang="de-DE" baseline="0" dirty="0" smtClean="0"/>
+              <a:t> setzten gleich</a:t>
+            </a:r>
+            <a:endParaRPr lang="de-DE" dirty="0"/>
+          </a:p>
+        </p:txBody>
+      </p:sp>
+      <p:sp>
+        <p:nvSpPr>
+          <p:cNvPr id="4" name="Foliennummernplatzhalter 3"/>
+          <p:cNvSpPr>
+            <a:spLocks noGrp="1"/>
+          </p:cNvSpPr>
+          <p:nvPr>
+            <p:ph type="sldNum" sz="quarter" idx="10"/>
+          </p:nvPr>
+        </p:nvSpPr>
+        <p:spPr/>
+        <p:txBody>
+          <a:bodyPr/>
+          <a:lstStyle/>
+          <a:p>
+            <a:fld id="{6A2CFF65-CB9C-5A47-B7DE-47882B59B3DA}" type="slidenum">
+              <a:rPr lang="de-DE" smtClean="0"/>
+              <a:t>8</a:t>
+            </a:fld>
+            <a:endParaRPr lang="de-DE"/>
+          </a:p>
+        </p:txBody>
+      </p:sp>
+    </p:spTree>
+    <p:extLst>
+      <p:ext uri="{BB962C8B-B14F-4D97-AF65-F5344CB8AC3E}">
+        <p14:creationId xmlns:p14="http://schemas.microsoft.com/office/powerpoint/2010/main" val="660173880"/>
+      </p:ext>
+    </p:extLst>
+  </p:cSld>
+  <p:clrMapOvr>
+    <a:masterClrMapping/>
+  </p:clrMapOvr>
+</p:notes>
+</file>
+
+<file path=ppt/notesSlides/notesSlide5.xml><?xml version="1.0" encoding="utf-8"?>
+<p:notes xmlns:a="http://schemas.openxmlformats.org/drawingml/2006/main" xmlns:r="http://schemas.openxmlformats.org/officeDocument/2006/relationships" xmlns:p="http://schemas.openxmlformats.org/presentationml/2006/main">
+  <p:cSld>
+    <p:spTree>
+      <p:nvGrpSpPr>
+        <p:cNvPr id="1" name=""/>
+        <p:cNvGrpSpPr/>
+        <p:nvPr/>
+      </p:nvGrpSpPr>
+      <p:grpSpPr>
+        <a:xfrm>
+          <a:off x="0" y="0"/>
+          <a:ext cx="0" cy="0"/>
+          <a:chOff x="0" y="0"/>
+          <a:chExt cx="0" cy="0"/>
+        </a:xfrm>
+      </p:grpSpPr>
+      <p:sp>
+        <p:nvSpPr>
+          <p:cNvPr id="2" name="Folienbildplatzhalter 1"/>
+          <p:cNvSpPr>
+            <a:spLocks noGrp="1" noRot="1" noChangeAspect="1"/>
+          </p:cNvSpPr>
+          <p:nvPr>
+            <p:ph type="sldImg"/>
+          </p:nvPr>
+        </p:nvSpPr>
+        <p:spPr/>
+      </p:sp>
+      <p:sp>
+        <p:nvSpPr>
+          <p:cNvPr id="3" name="Notizenplatzhalter 2"/>
+          <p:cNvSpPr>
+            <a:spLocks noGrp="1"/>
+          </p:cNvSpPr>
+          <p:nvPr>
+            <p:ph type="body" idx="1"/>
+          </p:nvPr>
+        </p:nvSpPr>
+        <p:spPr/>
+        <p:txBody>
+          <a:bodyPr/>
+          <a:lstStyle/>
+          <a:p>
+            <a:r>
+              <a:rPr lang="de-DE" dirty="0" smtClean="0"/>
+              <a:t>Funktioniert bei Roboter/Ziel</a:t>
+            </a:r>
+            <a:r>
+              <a:rPr lang="de-DE" baseline="0" dirty="0" smtClean="0"/>
+              <a:t> setzten gleich</a:t>
+            </a:r>
+            <a:endParaRPr lang="de-DE" dirty="0"/>
+          </a:p>
+        </p:txBody>
+      </p:sp>
+      <p:sp>
+        <p:nvSpPr>
+          <p:cNvPr id="4" name="Foliennummernplatzhalter 3"/>
+          <p:cNvSpPr>
+            <a:spLocks noGrp="1"/>
+          </p:cNvSpPr>
+          <p:nvPr>
+            <p:ph type="sldNum" sz="quarter" idx="10"/>
+          </p:nvPr>
+        </p:nvSpPr>
+        <p:spPr/>
+        <p:txBody>
+          <a:bodyPr/>
+          <a:lstStyle/>
+          <a:p>
+            <a:fld id="{6A2CFF65-CB9C-5A47-B7DE-47882B59B3DA}" type="slidenum">
+              <a:rPr lang="de-DE" smtClean="0"/>
+              <a:t>9</a:t>
+            </a:fld>
+            <a:endParaRPr lang="de-DE"/>
+          </a:p>
+        </p:txBody>
+      </p:sp>
+    </p:spTree>
+    <p:extLst>
+      <p:ext uri="{BB962C8B-B14F-4D97-AF65-F5344CB8AC3E}">
+        <p14:creationId xmlns:p14="http://schemas.microsoft.com/office/powerpoint/2010/main" val="660173880"/>
+      </p:ext>
+    </p:extLst>
+  </p:cSld>
+  <p:clrMapOvr>
+    <a:masterClrMapping/>
+  </p:clrMapOvr>
+</p:notes>
+</file>
+
+<file path=ppt/notesSlides/notesSlide6.xml><?xml version="1.0" encoding="utf-8"?>
+<p:notes xmlns:a="http://schemas.openxmlformats.org/drawingml/2006/main" xmlns:r="http://schemas.openxmlformats.org/officeDocument/2006/relationships" xmlns:p="http://schemas.openxmlformats.org/presentationml/2006/main">
+  <p:cSld>
+    <p:spTree>
+      <p:nvGrpSpPr>
+        <p:cNvPr id="1" name=""/>
+        <p:cNvGrpSpPr/>
+        <p:nvPr/>
+      </p:nvGrpSpPr>
+      <p:grpSpPr>
+        <a:xfrm>
+          <a:off x="0" y="0"/>
+          <a:ext cx="0" cy="0"/>
+          <a:chOff x="0" y="0"/>
+          <a:chExt cx="0" cy="0"/>
+        </a:xfrm>
+      </p:grpSpPr>
+      <p:sp>
+        <p:nvSpPr>
+          <p:cNvPr id="2" name="Folienbildplatzhalter 1"/>
+          <p:cNvSpPr>
+            <a:spLocks noGrp="1" noRot="1" noChangeAspect="1"/>
+          </p:cNvSpPr>
+          <p:nvPr>
+            <p:ph type="sldImg"/>
+          </p:nvPr>
+        </p:nvSpPr>
+        <p:spPr/>
+      </p:sp>
+      <p:sp>
+        <p:nvSpPr>
+          <p:cNvPr id="3" name="Notizenplatzhalter 2"/>
+          <p:cNvSpPr>
+            <a:spLocks noGrp="1"/>
+          </p:cNvSpPr>
+          <p:nvPr>
+            <p:ph type="body" idx="1"/>
+          </p:nvPr>
+        </p:nvSpPr>
+        <p:spPr/>
+        <p:txBody>
+          <a:bodyPr/>
+          <a:lstStyle/>
+          <a:p>
+            <a:r>
+              <a:rPr lang="de-DE" dirty="0" smtClean="0"/>
+              <a:t>Funktioniert bei Roboter/Ziel</a:t>
+            </a:r>
+            <a:r>
+              <a:rPr lang="de-DE" baseline="0" dirty="0" smtClean="0"/>
+              <a:t> setzten gleich</a:t>
+            </a:r>
+            <a:endParaRPr lang="de-DE" dirty="0"/>
           </a:p>
         </p:txBody>
       </p:sp>
@@ -1013,6 +1398,174 @@
             <a:fld id="{6A2CFF65-CB9C-5A47-B7DE-47882B59B3DA}" type="slidenum">
               <a:rPr lang="de-DE" smtClean="0"/>
               <a:t>10</a:t>
+            </a:fld>
+            <a:endParaRPr lang="de-DE"/>
+          </a:p>
+        </p:txBody>
+      </p:sp>
+    </p:spTree>
+    <p:extLst>
+      <p:ext uri="{BB962C8B-B14F-4D97-AF65-F5344CB8AC3E}">
+        <p14:creationId xmlns:p14="http://schemas.microsoft.com/office/powerpoint/2010/main" val="660173880"/>
+      </p:ext>
+    </p:extLst>
+  </p:cSld>
+  <p:clrMapOvr>
+    <a:masterClrMapping/>
+  </p:clrMapOvr>
+</p:notes>
+</file>
+
+<file path=ppt/notesSlides/notesSlide7.xml><?xml version="1.0" encoding="utf-8"?>
+<p:notes xmlns:a="http://schemas.openxmlformats.org/drawingml/2006/main" xmlns:r="http://schemas.openxmlformats.org/officeDocument/2006/relationships" xmlns:p="http://schemas.openxmlformats.org/presentationml/2006/main">
+  <p:cSld>
+    <p:spTree>
+      <p:nvGrpSpPr>
+        <p:cNvPr id="1" name=""/>
+        <p:cNvGrpSpPr/>
+        <p:nvPr/>
+      </p:nvGrpSpPr>
+      <p:grpSpPr>
+        <a:xfrm>
+          <a:off x="0" y="0"/>
+          <a:ext cx="0" cy="0"/>
+          <a:chOff x="0" y="0"/>
+          <a:chExt cx="0" cy="0"/>
+        </a:xfrm>
+      </p:grpSpPr>
+      <p:sp>
+        <p:nvSpPr>
+          <p:cNvPr id="2" name="Folienbildplatzhalter 1"/>
+          <p:cNvSpPr>
+            <a:spLocks noGrp="1" noRot="1" noChangeAspect="1"/>
+          </p:cNvSpPr>
+          <p:nvPr>
+            <p:ph type="sldImg"/>
+          </p:nvPr>
+        </p:nvSpPr>
+        <p:spPr/>
+      </p:sp>
+      <p:sp>
+        <p:nvSpPr>
+          <p:cNvPr id="3" name="Notizenplatzhalter 2"/>
+          <p:cNvSpPr>
+            <a:spLocks noGrp="1"/>
+          </p:cNvSpPr>
+          <p:nvPr>
+            <p:ph type="body" idx="1"/>
+          </p:nvPr>
+        </p:nvSpPr>
+        <p:spPr/>
+        <p:txBody>
+          <a:bodyPr/>
+          <a:lstStyle/>
+          <a:p>
+            <a:endParaRPr lang="de-DE" dirty="0"/>
+          </a:p>
+        </p:txBody>
+      </p:sp>
+      <p:sp>
+        <p:nvSpPr>
+          <p:cNvPr id="4" name="Foliennummernplatzhalter 3"/>
+          <p:cNvSpPr>
+            <a:spLocks noGrp="1"/>
+          </p:cNvSpPr>
+          <p:nvPr>
+            <p:ph type="sldNum" sz="quarter" idx="10"/>
+          </p:nvPr>
+        </p:nvSpPr>
+        <p:spPr/>
+        <p:txBody>
+          <a:bodyPr/>
+          <a:lstStyle/>
+          <a:p>
+            <a:fld id="{6A2CFF65-CB9C-5A47-B7DE-47882B59B3DA}" type="slidenum">
+              <a:rPr lang="de-DE" smtClean="0"/>
+              <a:t>11</a:t>
+            </a:fld>
+            <a:endParaRPr lang="de-DE"/>
+          </a:p>
+        </p:txBody>
+      </p:sp>
+    </p:spTree>
+    <p:extLst>
+      <p:ext uri="{BB962C8B-B14F-4D97-AF65-F5344CB8AC3E}">
+        <p14:creationId xmlns:p14="http://schemas.microsoft.com/office/powerpoint/2010/main" val="660173880"/>
+      </p:ext>
+    </p:extLst>
+  </p:cSld>
+  <p:clrMapOvr>
+    <a:masterClrMapping/>
+  </p:clrMapOvr>
+</p:notes>
+</file>
+
+<file path=ppt/notesSlides/notesSlide8.xml><?xml version="1.0" encoding="utf-8"?>
+<p:notes xmlns:a="http://schemas.openxmlformats.org/drawingml/2006/main" xmlns:r="http://schemas.openxmlformats.org/officeDocument/2006/relationships" xmlns:p="http://schemas.openxmlformats.org/presentationml/2006/main">
+  <p:cSld>
+    <p:spTree>
+      <p:nvGrpSpPr>
+        <p:cNvPr id="1" name=""/>
+        <p:cNvGrpSpPr/>
+        <p:nvPr/>
+      </p:nvGrpSpPr>
+      <p:grpSpPr>
+        <a:xfrm>
+          <a:off x="0" y="0"/>
+          <a:ext cx="0" cy="0"/>
+          <a:chOff x="0" y="0"/>
+          <a:chExt cx="0" cy="0"/>
+        </a:xfrm>
+      </p:grpSpPr>
+      <p:sp>
+        <p:nvSpPr>
+          <p:cNvPr id="2" name="Folienbildplatzhalter 1"/>
+          <p:cNvSpPr>
+            <a:spLocks noGrp="1" noRot="1" noChangeAspect="1"/>
+          </p:cNvSpPr>
+          <p:nvPr>
+            <p:ph type="sldImg"/>
+          </p:nvPr>
+        </p:nvSpPr>
+        <p:spPr/>
+      </p:sp>
+      <p:sp>
+        <p:nvSpPr>
+          <p:cNvPr id="3" name="Notizenplatzhalter 2"/>
+          <p:cNvSpPr>
+            <a:spLocks noGrp="1"/>
+          </p:cNvSpPr>
+          <p:nvPr>
+            <p:ph type="body" idx="1"/>
+          </p:nvPr>
+        </p:nvSpPr>
+        <p:spPr/>
+        <p:txBody>
+          <a:bodyPr/>
+          <a:lstStyle/>
+          <a:p>
+            <a:endParaRPr lang="de-DE"/>
+          </a:p>
+        </p:txBody>
+      </p:sp>
+      <p:sp>
+        <p:nvSpPr>
+          <p:cNvPr id="4" name="Foliennummernplatzhalter 3"/>
+          <p:cNvSpPr>
+            <a:spLocks noGrp="1"/>
+          </p:cNvSpPr>
+          <p:nvPr>
+            <p:ph type="sldNum" sz="quarter" idx="10"/>
+          </p:nvPr>
+        </p:nvSpPr>
+        <p:spPr/>
+        <p:txBody>
+          <a:bodyPr/>
+          <a:lstStyle/>
+          <a:p>
+            <a:fld id="{6A2CFF65-CB9C-5A47-B7DE-47882B59B3DA}" type="slidenum">
+              <a:rPr lang="de-DE" smtClean="0"/>
+              <a:t>13</a:t>
             </a:fld>
             <a:endParaRPr lang="de-DE"/>
           </a:p>
@@ -1217,7 +1770,7 @@
           <a:p>
             <a:fld id="{4BB9ED57-D06A-6841-AEF1-9EC3590845AD}" type="datetime1">
               <a:rPr lang="de-CH" smtClean="0"/>
-              <a:t>11.12.13</a:t>
+              <a:t>25.12.13</a:t>
             </a:fld>
             <a:endParaRPr lang="en-US"/>
           </a:p>
@@ -1578,7 +2131,7 @@
           <a:p>
             <a:fld id="{95F272CE-041C-1C41-893C-DDA23BE0160F}" type="datetime1">
               <a:rPr lang="de-CH" smtClean="0"/>
-              <a:t>11.12.13</a:t>
+              <a:t>25.12.13</a:t>
             </a:fld>
             <a:endParaRPr lang="en-US"/>
           </a:p>
@@ -1751,7 +2304,7 @@
           <a:p>
             <a:fld id="{89A08E58-8D68-9748-BF3C-59C04C017569}" type="datetime1">
               <a:rPr lang="de-CH" smtClean="0"/>
-              <a:t>11.12.13</a:t>
+              <a:t>25.12.13</a:t>
             </a:fld>
             <a:endParaRPr lang="en-US"/>
           </a:p>
@@ -1934,7 +2487,7 @@
           <a:p>
             <a:fld id="{27BF19B1-2D39-624F-92F5-63033DC0C277}" type="datetime1">
               <a:rPr lang="de-CH" smtClean="0"/>
-              <a:t>11.12.13</a:t>
+              <a:t>25.12.13</a:t>
             </a:fld>
             <a:endParaRPr lang="en-US"/>
           </a:p>
@@ -2107,7 +2660,7 @@
           <a:p>
             <a:fld id="{888DA9D7-FFEA-1B4A-AF78-999894C2A1ED}" type="datetime1">
               <a:rPr lang="de-CH" smtClean="0"/>
-              <a:t>11.12.13</a:t>
+              <a:t>25.12.13</a:t>
             </a:fld>
             <a:endParaRPr lang="en-US"/>
           </a:p>
@@ -2388,7 +2941,7 @@
           <a:p>
             <a:fld id="{FBB35A6E-A281-A541-AD16-C55A808D744E}" type="datetime1">
               <a:rPr lang="de-CH" smtClean="0"/>
-              <a:t>11.12.13</a:t>
+              <a:t>25.12.13</a:t>
             </a:fld>
             <a:endParaRPr lang="en-US"/>
           </a:p>
@@ -2684,7 +3237,7 @@
           <a:p>
             <a:fld id="{2E7962BB-C82D-F845-801E-BCD66FE917CE}" type="datetime1">
               <a:rPr lang="de-CH" smtClean="0"/>
-              <a:t>11.12.13</a:t>
+              <a:t>25.12.13</a:t>
             </a:fld>
             <a:endParaRPr lang="en-US"/>
           </a:p>
@@ -3124,7 +3677,7 @@
           <a:p>
             <a:fld id="{4AFFAB72-D003-9A4F-9AD5-2977850EC029}" type="datetime1">
               <a:rPr lang="de-CH" smtClean="0"/>
-              <a:t>11.12.13</a:t>
+              <a:t>25.12.13</a:t>
             </a:fld>
             <a:endParaRPr lang="en-US"/>
           </a:p>
@@ -3241,7 +3794,7 @@
           <a:p>
             <a:fld id="{0149C50A-A324-2749-86BA-B53E8B1F97D9}" type="datetime1">
               <a:rPr lang="de-CH" smtClean="0"/>
-              <a:t>11.12.13</a:t>
+              <a:t>25.12.13</a:t>
             </a:fld>
             <a:endParaRPr lang="en-US"/>
           </a:p>
@@ -3335,7 +3888,7 @@
           <a:p>
             <a:fld id="{40076AA9-28AC-F74A-AEDA-D52A19FDEF6D}" type="datetime1">
               <a:rPr lang="de-CH" smtClean="0"/>
-              <a:t>11.12.13</a:t>
+              <a:t>25.12.13</a:t>
             </a:fld>
             <a:endParaRPr lang="en-US"/>
           </a:p>
@@ -3676,7 +4229,7 @@
           <a:p>
             <a:fld id="{CAFB1E87-75BB-0747-B4D2-065C5EAE4DED}" type="datetime1">
               <a:rPr lang="de-CH" smtClean="0"/>
-              <a:t>11.12.13</a:t>
+              <a:t>25.12.13</a:t>
             </a:fld>
             <a:endParaRPr lang="en-US"/>
           </a:p>
@@ -3995,7 +4548,7 @@
           <a:p>
             <a:fld id="{5EB17E15-638F-8B4A-BBAA-33880E209CDA}" type="datetime1">
               <a:rPr lang="de-CH" smtClean="0"/>
-              <a:t>11.12.13</a:t>
+              <a:t>25.12.13</a:t>
             </a:fld>
             <a:endParaRPr lang="en-US"/>
           </a:p>
@@ -4245,7 +4798,7 @@
           <a:p>
             <a:fld id="{C652C00D-1E5F-7441-9ACF-E4D4A208330A}" type="datetime1">
               <a:rPr lang="de-CH" smtClean="0"/>
-              <a:t>11.12.13</a:t>
+              <a:t>25.12.13</a:t>
             </a:fld>
             <a:endParaRPr lang="en-US"/>
           </a:p>
@@ -4820,41 +5373,65 @@
             <p:ph type="title"/>
           </p:nvPr>
         </p:nvSpPr>
-        <p:spPr/>
-        <p:txBody>
-          <a:bodyPr/>
-          <a:lstStyle/>
-          <a:p>
+        <p:spPr>
+          <a:xfrm>
+            <a:off x="565763" y="107577"/>
+            <a:ext cx="8007257" cy="1653988"/>
+          </a:xfrm>
+        </p:spPr>
+        <p:txBody>
+          <a:bodyPr/>
+          <a:lstStyle/>
+          <a:p>
+            <a:r>
+              <a:rPr lang="de-DE" dirty="0"/>
+              <a:t>UML Klassen </a:t>
+            </a:r>
             <a:r>
               <a:rPr lang="de-DE" dirty="0" smtClean="0"/>
-              <a:t>Vorführung</a:t>
-            </a:r>
-            <a:endParaRPr lang="de-DE" dirty="0"/>
-          </a:p>
-        </p:txBody>
-      </p:sp>
-      <p:sp>
-        <p:nvSpPr>
-          <p:cNvPr id="3" name="Inhaltsplatzhalter 2"/>
-          <p:cNvSpPr>
-            <a:spLocks noGrp="1"/>
-          </p:cNvSpPr>
-          <p:nvPr>
-            <p:ph idx="1"/>
-          </p:nvPr>
-        </p:nvSpPr>
-        <p:spPr/>
-        <p:txBody>
-          <a:bodyPr/>
-          <a:lstStyle/>
-          <a:p>
-            <a:endParaRPr lang="de-DE"/>
-          </a:p>
-        </p:txBody>
-      </p:sp>
-      <p:sp>
-        <p:nvSpPr>
-          <p:cNvPr id="6" name="Foliennummernplatzhalter 5"/>
+              <a:t>Diagramme</a:t>
+            </a:r>
+            <a:r>
+              <a:rPr lang="de-DE" dirty="0" smtClean="0"/>
+              <a:t/>
+            </a:r>
+            <a:br>
+              <a:rPr lang="de-DE" dirty="0" smtClean="0"/>
+            </a:br>
+            <a:r>
+              <a:rPr lang="de-DE" sz="3200" dirty="0" smtClean="0"/>
+              <a:t>Hindernisse</a:t>
+            </a:r>
+            <a:endParaRPr lang="de-DE" sz="3200" dirty="0"/>
+          </a:p>
+        </p:txBody>
+      </p:sp>
+      <p:sp>
+        <p:nvSpPr>
+          <p:cNvPr id="4" name="Fußzeilenplatzhalter 3"/>
+          <p:cNvSpPr>
+            <a:spLocks noGrp="1"/>
+          </p:cNvSpPr>
+          <p:nvPr>
+            <p:ph type="ftr" sz="quarter" idx="11"/>
+          </p:nvPr>
+        </p:nvSpPr>
+        <p:spPr/>
+        <p:txBody>
+          <a:bodyPr/>
+          <a:lstStyle/>
+          <a:p>
+            <a:r>
+              <a:rPr lang="en-US" smtClean="0"/>
+              <a:t>gfels4 &amp; zannc2</a:t>
+            </a:r>
+            <a:endParaRPr lang="en-US"/>
+          </a:p>
+        </p:txBody>
+      </p:sp>
+      <p:sp>
+        <p:nvSpPr>
+          <p:cNvPr id="5" name="Foliennummernplatzhalter 4"/>
           <p:cNvSpPr>
             <a:spLocks noGrp="1"/>
           </p:cNvSpPr>
@@ -4870,6 +5447,394 @@
             <a:fld id="{D12AA694-00EB-4F4B-AABB-6F50FB178914}" type="slidenum">
               <a:rPr lang="en-US" smtClean="0"/>
               <a:t>10</a:t>
+            </a:fld>
+            <a:endParaRPr lang="en-US"/>
+          </a:p>
+        </p:txBody>
+      </p:sp>
+    </p:spTree>
+    <p:extLst>
+      <p:ext uri="{BB962C8B-B14F-4D97-AF65-F5344CB8AC3E}">
+        <p14:creationId xmlns:p14="http://schemas.microsoft.com/office/powerpoint/2010/main" val="2913584582"/>
+      </p:ext>
+    </p:extLst>
+  </p:cSld>
+  <p:clrMapOvr>
+    <a:masterClrMapping/>
+  </p:clrMapOvr>
+  <p:timing>
+    <p:tnLst>
+      <p:par>
+        <p:cTn xmlns:p14="http://schemas.microsoft.com/office/powerpoint/2010/main" id="1" dur="indefinite" restart="never" nodeType="tmRoot"/>
+      </p:par>
+    </p:tnLst>
+  </p:timing>
+</p:sld>
+</file>
+
+<file path=ppt/slides/slide11.xml><?xml version="1.0" encoding="utf-8"?>
+<p:sld xmlns:a="http://schemas.openxmlformats.org/drawingml/2006/main" xmlns:r="http://schemas.openxmlformats.org/officeDocument/2006/relationships" xmlns:p="http://schemas.openxmlformats.org/presentationml/2006/main">
+  <p:cSld>
+    <p:spTree>
+      <p:nvGrpSpPr>
+        <p:cNvPr id="1" name=""/>
+        <p:cNvGrpSpPr/>
+        <p:nvPr/>
+      </p:nvGrpSpPr>
+      <p:grpSpPr>
+        <a:xfrm>
+          <a:off x="0" y="0"/>
+          <a:ext cx="0" cy="0"/>
+          <a:chOff x="0" y="0"/>
+          <a:chExt cx="0" cy="0"/>
+        </a:xfrm>
+      </p:grpSpPr>
+      <p:sp>
+        <p:nvSpPr>
+          <p:cNvPr id="2" name="Titel 1"/>
+          <p:cNvSpPr>
+            <a:spLocks noGrp="1"/>
+          </p:cNvSpPr>
+          <p:nvPr>
+            <p:ph type="title"/>
+          </p:nvPr>
+        </p:nvSpPr>
+        <p:spPr>
+          <a:xfrm>
+            <a:off x="565763" y="107577"/>
+            <a:ext cx="8007257" cy="1653988"/>
+          </a:xfrm>
+        </p:spPr>
+        <p:txBody>
+          <a:bodyPr/>
+          <a:lstStyle/>
+          <a:p>
+            <a:r>
+              <a:rPr lang="de-DE" dirty="0"/>
+              <a:t>UML Klassen </a:t>
+            </a:r>
+            <a:r>
+              <a:rPr lang="de-DE" dirty="0" smtClean="0"/>
+              <a:t>Diagramme</a:t>
+            </a:r>
+            <a:r>
+              <a:rPr lang="de-DE" dirty="0" smtClean="0"/>
+              <a:t/>
+            </a:r>
+            <a:br>
+              <a:rPr lang="de-DE" dirty="0" smtClean="0"/>
+            </a:br>
+            <a:r>
+              <a:rPr lang="de-DE" sz="3200" dirty="0" smtClean="0"/>
+              <a:t>Handlers</a:t>
+            </a:r>
+            <a:endParaRPr lang="de-DE" sz="3200" dirty="0"/>
+          </a:p>
+        </p:txBody>
+      </p:sp>
+      <p:sp>
+        <p:nvSpPr>
+          <p:cNvPr id="4" name="Fußzeilenplatzhalter 3"/>
+          <p:cNvSpPr>
+            <a:spLocks noGrp="1"/>
+          </p:cNvSpPr>
+          <p:nvPr>
+            <p:ph type="ftr" sz="quarter" idx="11"/>
+          </p:nvPr>
+        </p:nvSpPr>
+        <p:spPr/>
+        <p:txBody>
+          <a:bodyPr/>
+          <a:lstStyle/>
+          <a:p>
+            <a:r>
+              <a:rPr lang="en-US" smtClean="0"/>
+              <a:t>gfels4 &amp; zannc2</a:t>
+            </a:r>
+            <a:endParaRPr lang="en-US"/>
+          </a:p>
+        </p:txBody>
+      </p:sp>
+      <p:sp>
+        <p:nvSpPr>
+          <p:cNvPr id="5" name="Foliennummernplatzhalter 4"/>
+          <p:cNvSpPr>
+            <a:spLocks noGrp="1"/>
+          </p:cNvSpPr>
+          <p:nvPr>
+            <p:ph type="sldNum" sz="quarter" idx="12"/>
+          </p:nvPr>
+        </p:nvSpPr>
+        <p:spPr/>
+        <p:txBody>
+          <a:bodyPr/>
+          <a:lstStyle/>
+          <a:p>
+            <a:fld id="{D12AA694-00EB-4F4B-AABB-6F50FB178914}" type="slidenum">
+              <a:rPr lang="en-US" smtClean="0"/>
+              <a:t>11</a:t>
+            </a:fld>
+            <a:endParaRPr lang="en-US"/>
+          </a:p>
+        </p:txBody>
+      </p:sp>
+    </p:spTree>
+    <p:extLst>
+      <p:ext uri="{BB962C8B-B14F-4D97-AF65-F5344CB8AC3E}">
+        <p14:creationId xmlns:p14="http://schemas.microsoft.com/office/powerpoint/2010/main" val="3971977397"/>
+      </p:ext>
+    </p:extLst>
+  </p:cSld>
+  <p:clrMapOvr>
+    <a:masterClrMapping/>
+  </p:clrMapOvr>
+  <p:timing>
+    <p:tnLst>
+      <p:par>
+        <p:cTn xmlns:p14="http://schemas.microsoft.com/office/powerpoint/2010/main" id="1" dur="indefinite" restart="never" nodeType="tmRoot"/>
+      </p:par>
+    </p:tnLst>
+  </p:timing>
+</p:sld>
+</file>
+
+<file path=ppt/slides/slide12.xml><?xml version="1.0" encoding="utf-8"?>
+<p:sld xmlns:a="http://schemas.openxmlformats.org/drawingml/2006/main" xmlns:r="http://schemas.openxmlformats.org/officeDocument/2006/relationships" xmlns:p="http://schemas.openxmlformats.org/presentationml/2006/main">
+  <p:cSld>
+    <p:spTree>
+      <p:nvGrpSpPr>
+        <p:cNvPr id="1" name=""/>
+        <p:cNvGrpSpPr/>
+        <p:nvPr/>
+      </p:nvGrpSpPr>
+      <p:grpSpPr>
+        <a:xfrm>
+          <a:off x="0" y="0"/>
+          <a:ext cx="0" cy="0"/>
+          <a:chOff x="0" y="0"/>
+          <a:chExt cx="0" cy="0"/>
+        </a:xfrm>
+      </p:grpSpPr>
+      <p:sp>
+        <p:nvSpPr>
+          <p:cNvPr id="2" name="Titel 1"/>
+          <p:cNvSpPr>
+            <a:spLocks noGrp="1"/>
+          </p:cNvSpPr>
+          <p:nvPr>
+            <p:ph type="title"/>
+          </p:nvPr>
+        </p:nvSpPr>
+        <p:spPr/>
+        <p:txBody>
+          <a:bodyPr/>
+          <a:lstStyle/>
+          <a:p>
+            <a:r>
+              <a:rPr lang="de-DE" dirty="0" smtClean="0"/>
+              <a:t>Robot</a:t>
+            </a:r>
+            <a:endParaRPr lang="de-DE" dirty="0"/>
+          </a:p>
+        </p:txBody>
+      </p:sp>
+      <p:sp>
+        <p:nvSpPr>
+          <p:cNvPr id="3" name="Inhaltsplatzhalter 2"/>
+          <p:cNvSpPr>
+            <a:spLocks noGrp="1"/>
+          </p:cNvSpPr>
+          <p:nvPr>
+            <p:ph idx="1"/>
+          </p:nvPr>
+        </p:nvSpPr>
+        <p:spPr/>
+        <p:txBody>
+          <a:bodyPr/>
+          <a:lstStyle/>
+          <a:p>
+            <a:r>
+              <a:rPr lang="de-DE" dirty="0"/>
+              <a:t>Domain Mode</a:t>
+            </a:r>
+          </a:p>
+          <a:p>
+            <a:r>
+              <a:rPr lang="de-DE" dirty="0" err="1"/>
+              <a:t>Use</a:t>
+            </a:r>
+            <a:r>
+              <a:rPr lang="de-DE" dirty="0"/>
+              <a:t> Cases</a:t>
+            </a:r>
+          </a:p>
+          <a:p>
+            <a:r>
+              <a:rPr lang="de-DE" dirty="0" err="1"/>
+              <a:t>Sequence</a:t>
+            </a:r>
+            <a:r>
+              <a:rPr lang="de-DE" dirty="0"/>
+              <a:t> Diagramme</a:t>
+            </a:r>
+          </a:p>
+          <a:p>
+            <a:r>
+              <a:rPr lang="de-DE" dirty="0"/>
+              <a:t>UML Klassen Diagramme</a:t>
+            </a:r>
+          </a:p>
+          <a:p>
+            <a:pPr marL="0" indent="0">
+              <a:buNone/>
+            </a:pPr>
+            <a:endParaRPr lang="de-DE" dirty="0"/>
+          </a:p>
+        </p:txBody>
+      </p:sp>
+      <p:sp>
+        <p:nvSpPr>
+          <p:cNvPr id="6" name="Foliennummernplatzhalter 5"/>
+          <p:cNvSpPr>
+            <a:spLocks noGrp="1"/>
+          </p:cNvSpPr>
+          <p:nvPr>
+            <p:ph type="sldNum" sz="quarter" idx="12"/>
+          </p:nvPr>
+        </p:nvSpPr>
+        <p:spPr/>
+        <p:txBody>
+          <a:bodyPr/>
+          <a:lstStyle/>
+          <a:p>
+            <a:fld id="{D12AA694-00EB-4F4B-AABB-6F50FB178914}" type="slidenum">
+              <a:rPr lang="en-US" smtClean="0"/>
+              <a:t>12</a:t>
+            </a:fld>
+            <a:endParaRPr lang="en-US"/>
+          </a:p>
+        </p:txBody>
+      </p:sp>
+      <p:sp>
+        <p:nvSpPr>
+          <p:cNvPr id="7" name="Fußzeilenplatzhalter 6"/>
+          <p:cNvSpPr>
+            <a:spLocks noGrp="1"/>
+          </p:cNvSpPr>
+          <p:nvPr>
+            <p:ph type="ftr" sz="quarter" idx="11"/>
+          </p:nvPr>
+        </p:nvSpPr>
+        <p:spPr/>
+        <p:txBody>
+          <a:bodyPr/>
+          <a:lstStyle/>
+          <a:p>
+            <a:r>
+              <a:rPr lang="en-US" smtClean="0"/>
+              <a:t>gfels4 &amp; zannc2</a:t>
+            </a:r>
+            <a:endParaRPr lang="en-US"/>
+          </a:p>
+        </p:txBody>
+      </p:sp>
+    </p:spTree>
+    <p:extLst>
+      <p:ext uri="{BB962C8B-B14F-4D97-AF65-F5344CB8AC3E}">
+        <p14:creationId xmlns:p14="http://schemas.microsoft.com/office/powerpoint/2010/main" val="3514780789"/>
+      </p:ext>
+    </p:extLst>
+  </p:cSld>
+  <p:clrMapOvr>
+    <a:masterClrMapping/>
+  </p:clrMapOvr>
+  <p:timing>
+    <p:tnLst>
+      <p:par>
+        <p:cTn xmlns:p14="http://schemas.microsoft.com/office/powerpoint/2010/main" id="1" dur="indefinite" restart="never" nodeType="tmRoot"/>
+      </p:par>
+    </p:tnLst>
+  </p:timing>
+</p:sld>
+</file>
+
+<file path=ppt/slides/slide13.xml><?xml version="1.0" encoding="utf-8"?>
+<p:sld xmlns:a="http://schemas.openxmlformats.org/drawingml/2006/main" xmlns:r="http://schemas.openxmlformats.org/officeDocument/2006/relationships" xmlns:p="http://schemas.openxmlformats.org/presentationml/2006/main">
+  <p:cSld>
+    <p:spTree>
+      <p:nvGrpSpPr>
+        <p:cNvPr id="1" name=""/>
+        <p:cNvGrpSpPr/>
+        <p:nvPr/>
+      </p:nvGrpSpPr>
+      <p:grpSpPr>
+        <a:xfrm>
+          <a:off x="0" y="0"/>
+          <a:ext cx="0" cy="0"/>
+          <a:chOff x="0" y="0"/>
+          <a:chExt cx="0" cy="0"/>
+        </a:xfrm>
+      </p:grpSpPr>
+      <p:sp>
+        <p:nvSpPr>
+          <p:cNvPr id="2" name="Titel 1"/>
+          <p:cNvSpPr>
+            <a:spLocks noGrp="1"/>
+          </p:cNvSpPr>
+          <p:nvPr>
+            <p:ph type="title"/>
+          </p:nvPr>
+        </p:nvSpPr>
+        <p:spPr/>
+        <p:txBody>
+          <a:bodyPr/>
+          <a:lstStyle/>
+          <a:p>
+            <a:r>
+              <a:rPr lang="de-DE" dirty="0" smtClean="0"/>
+              <a:t>Vorführung</a:t>
+            </a:r>
+            <a:endParaRPr lang="de-DE" dirty="0"/>
+          </a:p>
+        </p:txBody>
+      </p:sp>
+      <p:sp>
+        <p:nvSpPr>
+          <p:cNvPr id="3" name="Inhaltsplatzhalter 2"/>
+          <p:cNvSpPr>
+            <a:spLocks noGrp="1"/>
+          </p:cNvSpPr>
+          <p:nvPr>
+            <p:ph idx="1"/>
+          </p:nvPr>
+        </p:nvSpPr>
+        <p:spPr/>
+        <p:txBody>
+          <a:bodyPr/>
+          <a:lstStyle/>
+          <a:p>
+            <a:endParaRPr lang="de-DE"/>
+          </a:p>
+        </p:txBody>
+      </p:sp>
+      <p:sp>
+        <p:nvSpPr>
+          <p:cNvPr id="6" name="Foliennummernplatzhalter 5"/>
+          <p:cNvSpPr>
+            <a:spLocks noGrp="1"/>
+          </p:cNvSpPr>
+          <p:nvPr>
+            <p:ph type="sldNum" sz="quarter" idx="12"/>
+          </p:nvPr>
+        </p:nvSpPr>
+        <p:spPr/>
+        <p:txBody>
+          <a:bodyPr/>
+          <a:lstStyle/>
+          <a:p>
+            <a:fld id="{D12AA694-00EB-4F4B-AABB-6F50FB178914}" type="slidenum">
+              <a:rPr lang="en-US" smtClean="0"/>
+              <a:t>13</a:t>
             </a:fld>
             <a:endParaRPr lang="en-US"/>
           </a:p>
@@ -4977,14 +5942,9 @@
           <a:p>
             <a:r>
               <a:rPr lang="de-DE" dirty="0" smtClean="0"/>
-              <a:t>Vision</a:t>
-            </a:r>
-          </a:p>
-          <a:p>
-            <a:r>
-              <a:rPr lang="de-DE" dirty="0" smtClean="0"/>
               <a:t>Zeitplan</a:t>
             </a:r>
+            <a:endParaRPr lang="de-DE" dirty="0" smtClean="0"/>
           </a:p>
           <a:p>
             <a:r>
@@ -5107,28 +6067,9 @@
           <a:p>
             <a:r>
               <a:rPr lang="de-DE" dirty="0" smtClean="0"/>
-              <a:t>Vision</a:t>
+              <a:t>Zeitplan</a:t>
             </a:r>
             <a:endParaRPr lang="de-DE" dirty="0"/>
-          </a:p>
-        </p:txBody>
-      </p:sp>
-      <p:sp>
-        <p:nvSpPr>
-          <p:cNvPr id="3" name="Inhaltsplatzhalter 2"/>
-          <p:cNvSpPr>
-            <a:spLocks noGrp="1"/>
-          </p:cNvSpPr>
-          <p:nvPr>
-            <p:ph idx="1"/>
-          </p:nvPr>
-        </p:nvSpPr>
-        <p:spPr/>
-        <p:txBody>
-          <a:bodyPr/>
-          <a:lstStyle/>
-          <a:p>
-            <a:endParaRPr lang="de-DE"/>
           </a:p>
         </p:txBody>
       </p:sp>
@@ -5150,112 +6091,6 @@
             <a:fld id="{D12AA694-00EB-4F4B-AABB-6F50FB178914}" type="slidenum">
               <a:rPr lang="en-US" smtClean="0"/>
               <a:t>3</a:t>
-            </a:fld>
-            <a:endParaRPr lang="en-US"/>
-          </a:p>
-        </p:txBody>
-      </p:sp>
-      <p:sp>
-        <p:nvSpPr>
-          <p:cNvPr id="7" name="Fußzeilenplatzhalter 6"/>
-          <p:cNvSpPr>
-            <a:spLocks noGrp="1"/>
-          </p:cNvSpPr>
-          <p:nvPr>
-            <p:ph type="ftr" sz="quarter" idx="11"/>
-          </p:nvPr>
-        </p:nvSpPr>
-        <p:spPr/>
-        <p:txBody>
-          <a:bodyPr/>
-          <a:lstStyle/>
-          <a:p>
-            <a:r>
-              <a:rPr lang="en-US" smtClean="0"/>
-              <a:t>gfels4 &amp; zannc2</a:t>
-            </a:r>
-            <a:endParaRPr lang="en-US"/>
-          </a:p>
-        </p:txBody>
-      </p:sp>
-    </p:spTree>
-    <p:extLst>
-      <p:ext uri="{BB962C8B-B14F-4D97-AF65-F5344CB8AC3E}">
-        <p14:creationId xmlns:p14="http://schemas.microsoft.com/office/powerpoint/2010/main" val="1064099063"/>
-      </p:ext>
-    </p:extLst>
-  </p:cSld>
-  <p:clrMapOvr>
-    <a:masterClrMapping/>
-  </p:clrMapOvr>
-  <p:timing>
-    <p:tnLst>
-      <p:par>
-        <p:cTn xmlns:p14="http://schemas.microsoft.com/office/powerpoint/2010/main" id="1" dur="indefinite" restart="never" nodeType="tmRoot"/>
-      </p:par>
-    </p:tnLst>
-  </p:timing>
-</p:sld>
-</file>
-
-<file path=ppt/slides/slide4.xml><?xml version="1.0" encoding="utf-8"?>
-<p:sld xmlns:a="http://schemas.openxmlformats.org/drawingml/2006/main" xmlns:r="http://schemas.openxmlformats.org/officeDocument/2006/relationships" xmlns:p="http://schemas.openxmlformats.org/presentationml/2006/main">
-  <p:cSld>
-    <p:spTree>
-      <p:nvGrpSpPr>
-        <p:cNvPr id="1" name=""/>
-        <p:cNvGrpSpPr/>
-        <p:nvPr/>
-      </p:nvGrpSpPr>
-      <p:grpSpPr>
-        <a:xfrm>
-          <a:off x="0" y="0"/>
-          <a:ext cx="0" cy="0"/>
-          <a:chOff x="0" y="0"/>
-          <a:chExt cx="0" cy="0"/>
-        </a:xfrm>
-      </p:grpSpPr>
-      <p:sp>
-        <p:nvSpPr>
-          <p:cNvPr id="2" name="Titel 1"/>
-          <p:cNvSpPr>
-            <a:spLocks noGrp="1"/>
-          </p:cNvSpPr>
-          <p:nvPr>
-            <p:ph type="title"/>
-          </p:nvPr>
-        </p:nvSpPr>
-        <p:spPr/>
-        <p:txBody>
-          <a:bodyPr/>
-          <a:lstStyle/>
-          <a:p>
-            <a:r>
-              <a:rPr lang="de-DE" dirty="0" smtClean="0"/>
-              <a:t>Zeitplan</a:t>
-            </a:r>
-            <a:endParaRPr lang="de-DE" dirty="0"/>
-          </a:p>
-        </p:txBody>
-      </p:sp>
-      <p:sp>
-        <p:nvSpPr>
-          <p:cNvPr id="6" name="Foliennummernplatzhalter 5"/>
-          <p:cNvSpPr>
-            <a:spLocks noGrp="1"/>
-          </p:cNvSpPr>
-          <p:nvPr>
-            <p:ph type="sldNum" sz="quarter" idx="12"/>
-          </p:nvPr>
-        </p:nvSpPr>
-        <p:spPr/>
-        <p:txBody>
-          <a:bodyPr/>
-          <a:lstStyle/>
-          <a:p>
-            <a:fld id="{D12AA694-00EB-4F4B-AABB-6F50FB178914}" type="slidenum">
-              <a:rPr lang="en-US" smtClean="0"/>
-              <a:t>4</a:t>
             </a:fld>
             <a:endParaRPr lang="en-US"/>
           </a:p>
@@ -5328,7 +6163,7 @@
 </p:sld>
 </file>
 
-<file path=ppt/slides/slide5.xml><?xml version="1.0" encoding="utf-8"?>
+<file path=ppt/slides/slide4.xml><?xml version="1.0" encoding="utf-8"?>
 <p:sld xmlns:a="http://schemas.openxmlformats.org/drawingml/2006/main" xmlns:r="http://schemas.openxmlformats.org/officeDocument/2006/relationships" xmlns:p="http://schemas.openxmlformats.org/presentationml/2006/main">
   <p:cSld>
     <p:spTree>
@@ -5434,7 +6269,7 @@
           <a:p>
             <a:fld id="{D12AA694-00EB-4F4B-AABB-6F50FB178914}" type="slidenum">
               <a:rPr lang="en-US" smtClean="0"/>
-              <a:t>5</a:t>
+              <a:t>4</a:t>
             </a:fld>
             <a:endParaRPr lang="en-US"/>
           </a:p>
@@ -5483,7 +6318,7 @@
 </p:sld>
 </file>
 
-<file path=ppt/slides/slide6.xml><?xml version="1.0" encoding="utf-8"?>
+<file path=ppt/slides/slide5.xml><?xml version="1.0" encoding="utf-8"?>
 <p:sld xmlns:a="http://schemas.openxmlformats.org/drawingml/2006/main" xmlns:r="http://schemas.openxmlformats.org/officeDocument/2006/relationships" xmlns:p="http://schemas.openxmlformats.org/presentationml/2006/main">
   <p:cSld>
     <p:spTree>
@@ -5563,7 +6398,7 @@
           <a:p>
             <a:fld id="{D12AA694-00EB-4F4B-AABB-6F50FB178914}" type="slidenum">
               <a:rPr lang="en-US" smtClean="0"/>
-              <a:t>6</a:t>
+              <a:t>5</a:t>
             </a:fld>
             <a:endParaRPr lang="en-US"/>
           </a:p>
@@ -5618,7 +6453,7 @@
 </p:sld>
 </file>
 
-<file path=ppt/slides/slide7.xml><?xml version="1.0" encoding="utf-8"?>
+<file path=ppt/slides/slide6.xml><?xml version="1.0" encoding="utf-8"?>
 <p:sld xmlns:a="http://schemas.openxmlformats.org/drawingml/2006/main" xmlns:r="http://schemas.openxmlformats.org/officeDocument/2006/relationships" xmlns:p="http://schemas.openxmlformats.org/presentationml/2006/main">
   <p:cSld>
     <p:spTree>
@@ -5702,7 +6537,7 @@
           <a:p>
             <a:fld id="{D12AA694-00EB-4F4B-AABB-6F50FB178914}" type="slidenum">
               <a:rPr lang="en-US" smtClean="0"/>
-              <a:t>7</a:t>
+              <a:t>6</a:t>
             </a:fld>
             <a:endParaRPr lang="en-US"/>
           </a:p>
@@ -5757,6 +6592,160 @@
 </p:sld>
 </file>
 
+<file path=ppt/slides/slide7.xml><?xml version="1.0" encoding="utf-8"?>
+<p:sld xmlns:a="http://schemas.openxmlformats.org/drawingml/2006/main" xmlns:r="http://schemas.openxmlformats.org/officeDocument/2006/relationships" xmlns:p="http://schemas.openxmlformats.org/presentationml/2006/main">
+  <p:cSld>
+    <p:spTree>
+      <p:nvGrpSpPr>
+        <p:cNvPr id="1" name=""/>
+        <p:cNvGrpSpPr/>
+        <p:nvPr/>
+      </p:nvGrpSpPr>
+      <p:grpSpPr>
+        <a:xfrm>
+          <a:off x="0" y="0"/>
+          <a:ext cx="0" cy="0"/>
+          <a:chOff x="0" y="0"/>
+          <a:chExt cx="0" cy="0"/>
+        </a:xfrm>
+      </p:grpSpPr>
+      <p:sp>
+        <p:nvSpPr>
+          <p:cNvPr id="2" name="Titel 1"/>
+          <p:cNvSpPr>
+            <a:spLocks noGrp="1"/>
+          </p:cNvSpPr>
+          <p:nvPr>
+            <p:ph type="title"/>
+          </p:nvPr>
+        </p:nvSpPr>
+        <p:spPr/>
+        <p:txBody>
+          <a:bodyPr/>
+          <a:lstStyle/>
+          <a:p>
+            <a:r>
+              <a:rPr lang="de-DE" dirty="0" err="1" smtClean="0"/>
+              <a:t>Sequence</a:t>
+            </a:r>
+            <a:r>
+              <a:rPr lang="de-DE" dirty="0" smtClean="0"/>
+              <a:t> </a:t>
+            </a:r>
+            <a:r>
+              <a:rPr lang="de-DE" dirty="0" err="1" smtClean="0"/>
+              <a:t>Diagram</a:t>
+            </a:r>
+            <a:r>
+              <a:rPr lang="de-DE" dirty="0" smtClean="0"/>
+              <a:t/>
+            </a:r>
+            <a:br>
+              <a:rPr lang="de-DE" dirty="0" smtClean="0"/>
+            </a:br>
+            <a:r>
+              <a:rPr lang="de-DE" sz="3200" dirty="0" smtClean="0"/>
+              <a:t>Hindernisse setzen</a:t>
+            </a:r>
+            <a:endParaRPr lang="de-DE" sz="3200" dirty="0"/>
+          </a:p>
+        </p:txBody>
+      </p:sp>
+      <p:sp>
+        <p:nvSpPr>
+          <p:cNvPr id="4" name="Fußzeilenplatzhalter 3"/>
+          <p:cNvSpPr>
+            <a:spLocks noGrp="1"/>
+          </p:cNvSpPr>
+          <p:nvPr>
+            <p:ph type="ftr" sz="quarter" idx="11"/>
+          </p:nvPr>
+        </p:nvSpPr>
+        <p:spPr/>
+        <p:txBody>
+          <a:bodyPr/>
+          <a:lstStyle/>
+          <a:p>
+            <a:r>
+              <a:rPr lang="en-US" smtClean="0"/>
+              <a:t>gfels4 &amp; zannc2</a:t>
+            </a:r>
+            <a:endParaRPr lang="en-US"/>
+          </a:p>
+        </p:txBody>
+      </p:sp>
+      <p:sp>
+        <p:nvSpPr>
+          <p:cNvPr id="5" name="Foliennummernplatzhalter 4"/>
+          <p:cNvSpPr>
+            <a:spLocks noGrp="1"/>
+          </p:cNvSpPr>
+          <p:nvPr>
+            <p:ph type="sldNum" sz="quarter" idx="12"/>
+          </p:nvPr>
+        </p:nvSpPr>
+        <p:spPr/>
+        <p:txBody>
+          <a:bodyPr/>
+          <a:lstStyle/>
+          <a:p>
+            <a:fld id="{D12AA694-00EB-4F4B-AABB-6F50FB178914}" type="slidenum">
+              <a:rPr lang="en-US" smtClean="0"/>
+              <a:t>7</a:t>
+            </a:fld>
+            <a:endParaRPr lang="en-US"/>
+          </a:p>
+        </p:txBody>
+      </p:sp>
+      <p:pic>
+        <p:nvPicPr>
+          <p:cNvPr id="6" name="Bild 5" descr="spielfeldobjekte_setzen_SD.jpg"/>
+          <p:cNvPicPr>
+            <a:picLocks noChangeAspect="1"/>
+          </p:cNvPicPr>
+          <p:nvPr/>
+        </p:nvPicPr>
+        <p:blipFill rotWithShape="1">
+          <a:blip r:embed="rId3">
+            <a:extLst>
+              <a:ext uri="{28A0092B-C50C-407E-A947-70E740481C1C}">
+                <a14:useLocalDpi xmlns:a14="http://schemas.microsoft.com/office/drawing/2010/main" val="0"/>
+              </a:ext>
+            </a:extLst>
+          </a:blip>
+          <a:srcRect l="3872" t="7232" r="14102" b="54532"/>
+          <a:stretch/>
+        </p:blipFill>
+        <p:spPr>
+          <a:xfrm>
+            <a:off x="779462" y="2359827"/>
+            <a:ext cx="7500406" cy="2116788"/>
+          </a:xfrm>
+          <a:prstGeom prst="rect">
+            <a:avLst/>
+          </a:prstGeom>
+        </p:spPr>
+      </p:pic>
+    </p:spTree>
+    <p:extLst>
+      <p:ext uri="{BB962C8B-B14F-4D97-AF65-F5344CB8AC3E}">
+        <p14:creationId xmlns:p14="http://schemas.microsoft.com/office/powerpoint/2010/main" val="1120940520"/>
+      </p:ext>
+    </p:extLst>
+  </p:cSld>
+  <p:clrMapOvr>
+    <a:masterClrMapping/>
+  </p:clrMapOvr>
+  <p:timing>
+    <p:tnLst>
+      <p:par>
+        <p:cTn xmlns:p14="http://schemas.microsoft.com/office/powerpoint/2010/main" id="1" dur="indefinite" restart="never" nodeType="tmRoot"/>
+      </p:par>
+    </p:tnLst>
+  </p:timing>
+</p:sld>
+</file>
+
 <file path=ppt/slides/slide8.xml><?xml version="1.0" encoding="utf-8"?>
 <p:sld xmlns:a="http://schemas.openxmlformats.org/drawingml/2006/main" xmlns:r="http://schemas.openxmlformats.org/officeDocument/2006/relationships" xmlns:p="http://schemas.openxmlformats.org/presentationml/2006/main">
   <p:cSld>
@@ -5810,7 +6799,7 @@
             </a:br>
             <a:r>
               <a:rPr lang="de-DE" sz="3200" dirty="0" smtClean="0"/>
-              <a:t>Spielobjekte setzen</a:t>
+              <a:t>Spielfeld exportieren</a:t>
             </a:r>
             <a:endParaRPr lang="de-DE" sz="3200" dirty="0"/>
           </a:p>
@@ -5864,27 +6853,27 @@
       </p:sp>
       <p:pic>
         <p:nvPicPr>
-          <p:cNvPr id="6" name="Bild 5" descr="spielfeldobjekte_setzen_SD.jpg"/>
+          <p:cNvPr id="7" name="Bild 6" descr="spielfeld_exportieren_SD.jpg"/>
           <p:cNvPicPr>
             <a:picLocks noChangeAspect="1"/>
           </p:cNvPicPr>
           <p:nvPr/>
         </p:nvPicPr>
         <p:blipFill rotWithShape="1">
-          <a:blip r:embed="rId2">
+          <a:blip r:embed="rId3">
             <a:extLst>
               <a:ext uri="{28A0092B-C50C-407E-A947-70E740481C1C}">
                 <a14:useLocalDpi xmlns:a14="http://schemas.microsoft.com/office/drawing/2010/main" val="0"/>
               </a:ext>
             </a:extLst>
           </a:blip>
-          <a:srcRect l="3872" t="7232" r="14102" b="54532"/>
+          <a:srcRect l="5375" t="6172" r="1626" b="30445"/>
           <a:stretch/>
         </p:blipFill>
         <p:spPr>
           <a:xfrm>
-            <a:off x="779462" y="2359827"/>
-            <a:ext cx="7500406" cy="2116788"/>
+            <a:off x="488440" y="1846757"/>
+            <a:ext cx="8450008" cy="4346793"/>
           </a:xfrm>
           <a:prstGeom prst="rect">
             <a:avLst/>
@@ -5944,70 +6933,58 @@
           <a:lstStyle/>
           <a:p>
             <a:r>
+              <a:rPr lang="de-DE" dirty="0" err="1" smtClean="0"/>
+              <a:t>Sequence</a:t>
+            </a:r>
+            <a:r>
               <a:rPr lang="de-DE" dirty="0" smtClean="0"/>
-              <a:t>Robot</a:t>
-            </a:r>
-            <a:endParaRPr lang="de-DE" dirty="0"/>
-          </a:p>
-        </p:txBody>
-      </p:sp>
-      <p:sp>
-        <p:nvSpPr>
-          <p:cNvPr id="3" name="Inhaltsplatzhalter 2"/>
-          <p:cNvSpPr>
-            <a:spLocks noGrp="1"/>
-          </p:cNvSpPr>
-          <p:nvPr>
-            <p:ph idx="1"/>
-          </p:nvPr>
-        </p:nvSpPr>
-        <p:spPr/>
-        <p:txBody>
-          <a:bodyPr/>
-          <a:lstStyle/>
-          <a:p>
-            <a:r>
-              <a:rPr lang="de-DE" dirty="0"/>
-              <a:t>Domain Mode</a:t>
-            </a:r>
-          </a:p>
-          <a:p>
-            <a:r>
-              <a:rPr lang="de-DE" dirty="0" err="1"/>
-              <a:t>Use</a:t>
-            </a:r>
-            <a:r>
-              <a:rPr lang="de-DE" dirty="0"/>
-              <a:t> Cases</a:t>
-            </a:r>
-          </a:p>
-          <a:p>
-            <a:r>
-              <a:rPr lang="de-DE" dirty="0" err="1"/>
-              <a:t>Sequence</a:t>
-            </a:r>
-            <a:r>
-              <a:rPr lang="de-DE" dirty="0"/>
-              <a:t> Diagramme</a:t>
-            </a:r>
-          </a:p>
-          <a:p>
-            <a:r>
-              <a:rPr lang="de-DE" dirty="0"/>
-              <a:t>UML Klassen Diagramme</a:t>
-            </a:r>
-          </a:p>
-          <a:p>
-            <a:pPr marL="0" indent="0">
-              <a:buNone/>
-            </a:pPr>
-            <a:endParaRPr lang="de-DE" dirty="0"/>
-          </a:p>
-        </p:txBody>
-      </p:sp>
-      <p:sp>
-        <p:nvSpPr>
-          <p:cNvPr id="6" name="Foliennummernplatzhalter 5"/>
+              <a:t> </a:t>
+            </a:r>
+            <a:r>
+              <a:rPr lang="de-DE" dirty="0" err="1" smtClean="0"/>
+              <a:t>Diagram</a:t>
+            </a:r>
+            <a:r>
+              <a:rPr lang="de-DE" dirty="0" smtClean="0"/>
+              <a:t/>
+            </a:r>
+            <a:br>
+              <a:rPr lang="de-DE" dirty="0" smtClean="0"/>
+            </a:br>
+            <a:r>
+              <a:rPr lang="de-DE" sz="3200" dirty="0" smtClean="0"/>
+              <a:t>Spielfeld importieren</a:t>
+            </a:r>
+            <a:endParaRPr lang="de-DE" sz="3200" dirty="0"/>
+          </a:p>
+        </p:txBody>
+      </p:sp>
+      <p:sp>
+        <p:nvSpPr>
+          <p:cNvPr id="4" name="Fußzeilenplatzhalter 3"/>
+          <p:cNvSpPr>
+            <a:spLocks noGrp="1"/>
+          </p:cNvSpPr>
+          <p:nvPr>
+            <p:ph type="ftr" sz="quarter" idx="11"/>
+          </p:nvPr>
+        </p:nvSpPr>
+        <p:spPr/>
+        <p:txBody>
+          <a:bodyPr/>
+          <a:lstStyle/>
+          <a:p>
+            <a:r>
+              <a:rPr lang="en-US" smtClean="0"/>
+              <a:t>gfels4 &amp; zannc2</a:t>
+            </a:r>
+            <a:endParaRPr lang="en-US"/>
+          </a:p>
+        </p:txBody>
+      </p:sp>
+      <p:sp>
+        <p:nvSpPr>
+          <p:cNvPr id="5" name="Foliennummernplatzhalter 4"/>
           <p:cNvSpPr>
             <a:spLocks noGrp="1"/>
           </p:cNvSpPr>
@@ -6028,33 +7005,39 @@
           </a:p>
         </p:txBody>
       </p:sp>
-      <p:sp>
-        <p:nvSpPr>
-          <p:cNvPr id="7" name="Fußzeilenplatzhalter 6"/>
-          <p:cNvSpPr>
-            <a:spLocks noGrp="1"/>
-          </p:cNvSpPr>
-          <p:nvPr>
-            <p:ph type="ftr" sz="quarter" idx="11"/>
-          </p:nvPr>
-        </p:nvSpPr>
-        <p:spPr/>
-        <p:txBody>
-          <a:bodyPr/>
-          <a:lstStyle/>
-          <a:p>
-            <a:r>
-              <a:rPr lang="en-US" smtClean="0"/>
-              <a:t>gfels4 &amp; zannc2</a:t>
-            </a:r>
-            <a:endParaRPr lang="en-US"/>
-          </a:p>
-        </p:txBody>
-      </p:sp>
+      <p:pic>
+        <p:nvPicPr>
+          <p:cNvPr id="7" name="Bild 6" descr="spielfeld_importieren_SD.jpg"/>
+          <p:cNvPicPr>
+            <a:picLocks noChangeAspect="1"/>
+          </p:cNvPicPr>
+          <p:nvPr/>
+        </p:nvPicPr>
+        <p:blipFill rotWithShape="1">
+          <a:blip r:embed="rId3">
+            <a:extLst>
+              <a:ext uri="{28A0092B-C50C-407E-A947-70E740481C1C}">
+                <a14:useLocalDpi xmlns:a14="http://schemas.microsoft.com/office/drawing/2010/main" val="0"/>
+              </a:ext>
+            </a:extLst>
+          </a:blip>
+          <a:srcRect l="3873" t="6786" r="1536" b="32759"/>
+          <a:stretch/>
+        </p:blipFill>
+        <p:spPr>
+          <a:xfrm>
+            <a:off x="354106" y="2005767"/>
+            <a:ext cx="8649468" cy="3402545"/>
+          </a:xfrm>
+          <a:prstGeom prst="rect">
+            <a:avLst/>
+          </a:prstGeom>
+        </p:spPr>
+      </p:pic>
     </p:spTree>
     <p:extLst>
       <p:ext uri="{BB962C8B-B14F-4D97-AF65-F5344CB8AC3E}">
-        <p14:creationId xmlns:p14="http://schemas.microsoft.com/office/powerpoint/2010/main" val="3514780789"/>
+        <p14:creationId xmlns:p14="http://schemas.microsoft.com/office/powerpoint/2010/main" val="4139531276"/>
       </p:ext>
     </p:extLst>
   </p:cSld>

</xml_diff>

<commit_message>
diverse Diagramme für Präsentation
</commit_message>
<xml_diff>
--- a/SearchRobot/doc/presentation.pptx
+++ b/SearchRobot/doc/presentation.pptx
@@ -5,10 +5,10 @@
     <p:sldMasterId id="2147483660" r:id="rId1"/>
   </p:sldMasterIdLst>
   <p:notesMasterIdLst>
-    <p:notesMasterId r:id="rId15"/>
+    <p:notesMasterId r:id="rId21"/>
   </p:notesMasterIdLst>
   <p:handoutMasterIdLst>
-    <p:handoutMasterId r:id="rId16"/>
+    <p:handoutMasterId r:id="rId22"/>
   </p:handoutMasterIdLst>
   <p:sldIdLst>
     <p:sldId id="256" r:id="rId2"/>
@@ -21,9 +21,15 @@
     <p:sldId id="267" r:id="rId9"/>
     <p:sldId id="269" r:id="rId10"/>
     <p:sldId id="270" r:id="rId11"/>
-    <p:sldId id="271" r:id="rId12"/>
-    <p:sldId id="263" r:id="rId13"/>
-    <p:sldId id="264" r:id="rId14"/>
+    <p:sldId id="272" r:id="rId12"/>
+    <p:sldId id="273" r:id="rId13"/>
+    <p:sldId id="274" r:id="rId14"/>
+    <p:sldId id="271" r:id="rId15"/>
+    <p:sldId id="276" r:id="rId16"/>
+    <p:sldId id="277" r:id="rId17"/>
+    <p:sldId id="263" r:id="rId18"/>
+    <p:sldId id="275" r:id="rId19"/>
+    <p:sldId id="264" r:id="rId20"/>
   </p:sldIdLst>
   <p:sldSz cx="9144000" cy="6858000" type="screen4x3"/>
   <p:notesSz cx="6858000" cy="9144000"/>
@@ -736,6 +742,434 @@
 </p:notes>
 </file>
 
+<file path=ppt/notesSlides/notesSlide10.xml><?xml version="1.0" encoding="utf-8"?>
+<p:notes xmlns:a="http://schemas.openxmlformats.org/drawingml/2006/main" xmlns:r="http://schemas.openxmlformats.org/officeDocument/2006/relationships" xmlns:p="http://schemas.openxmlformats.org/presentationml/2006/main">
+  <p:cSld>
+    <p:spTree>
+      <p:nvGrpSpPr>
+        <p:cNvPr id="1" name=""/>
+        <p:cNvGrpSpPr/>
+        <p:nvPr/>
+      </p:nvGrpSpPr>
+      <p:grpSpPr>
+        <a:xfrm>
+          <a:off x="0" y="0"/>
+          <a:ext cx="0" cy="0"/>
+          <a:chOff x="0" y="0"/>
+          <a:chExt cx="0" cy="0"/>
+        </a:xfrm>
+      </p:grpSpPr>
+      <p:sp>
+        <p:nvSpPr>
+          <p:cNvPr id="2" name="Folienbildplatzhalter 1"/>
+          <p:cNvSpPr>
+            <a:spLocks noGrp="1" noRot="1" noChangeAspect="1"/>
+          </p:cNvSpPr>
+          <p:nvPr>
+            <p:ph type="sldImg"/>
+          </p:nvPr>
+        </p:nvSpPr>
+        <p:spPr/>
+      </p:sp>
+      <p:sp>
+        <p:nvSpPr>
+          <p:cNvPr id="3" name="Notizenplatzhalter 2"/>
+          <p:cNvSpPr>
+            <a:spLocks noGrp="1"/>
+          </p:cNvSpPr>
+          <p:nvPr>
+            <p:ph type="body" idx="1"/>
+          </p:nvPr>
+        </p:nvSpPr>
+        <p:spPr/>
+        <p:txBody>
+          <a:bodyPr/>
+          <a:lstStyle/>
+          <a:p>
+            <a:endParaRPr lang="de-DE" dirty="0"/>
+          </a:p>
+        </p:txBody>
+      </p:sp>
+      <p:sp>
+        <p:nvSpPr>
+          <p:cNvPr id="4" name="Foliennummernplatzhalter 3"/>
+          <p:cNvSpPr>
+            <a:spLocks noGrp="1"/>
+          </p:cNvSpPr>
+          <p:nvPr>
+            <p:ph type="sldNum" sz="quarter" idx="10"/>
+          </p:nvPr>
+        </p:nvSpPr>
+        <p:spPr/>
+        <p:txBody>
+          <a:bodyPr/>
+          <a:lstStyle/>
+          <a:p>
+            <a:fld id="{6A2CFF65-CB9C-5A47-B7DE-47882B59B3DA}" type="slidenum">
+              <a:rPr lang="de-DE" smtClean="0"/>
+              <a:t>14</a:t>
+            </a:fld>
+            <a:endParaRPr lang="de-DE"/>
+          </a:p>
+        </p:txBody>
+      </p:sp>
+    </p:spTree>
+    <p:extLst>
+      <p:ext uri="{BB962C8B-B14F-4D97-AF65-F5344CB8AC3E}">
+        <p14:creationId xmlns:p14="http://schemas.microsoft.com/office/powerpoint/2010/main" val="660173880"/>
+      </p:ext>
+    </p:extLst>
+  </p:cSld>
+  <p:clrMapOvr>
+    <a:masterClrMapping/>
+  </p:clrMapOvr>
+</p:notes>
+</file>
+
+<file path=ppt/notesSlides/notesSlide11.xml><?xml version="1.0" encoding="utf-8"?>
+<p:notes xmlns:a="http://schemas.openxmlformats.org/drawingml/2006/main" xmlns:r="http://schemas.openxmlformats.org/officeDocument/2006/relationships" xmlns:p="http://schemas.openxmlformats.org/presentationml/2006/main">
+  <p:cSld>
+    <p:spTree>
+      <p:nvGrpSpPr>
+        <p:cNvPr id="1" name=""/>
+        <p:cNvGrpSpPr/>
+        <p:nvPr/>
+      </p:nvGrpSpPr>
+      <p:grpSpPr>
+        <a:xfrm>
+          <a:off x="0" y="0"/>
+          <a:ext cx="0" cy="0"/>
+          <a:chOff x="0" y="0"/>
+          <a:chExt cx="0" cy="0"/>
+        </a:xfrm>
+      </p:grpSpPr>
+      <p:sp>
+        <p:nvSpPr>
+          <p:cNvPr id="2" name="Folienbildplatzhalter 1"/>
+          <p:cNvSpPr>
+            <a:spLocks noGrp="1" noRot="1" noChangeAspect="1"/>
+          </p:cNvSpPr>
+          <p:nvPr>
+            <p:ph type="sldImg"/>
+          </p:nvPr>
+        </p:nvSpPr>
+        <p:spPr/>
+      </p:sp>
+      <p:sp>
+        <p:nvSpPr>
+          <p:cNvPr id="3" name="Notizenplatzhalter 2"/>
+          <p:cNvSpPr>
+            <a:spLocks noGrp="1"/>
+          </p:cNvSpPr>
+          <p:nvPr>
+            <p:ph type="body" idx="1"/>
+          </p:nvPr>
+        </p:nvSpPr>
+        <p:spPr/>
+        <p:txBody>
+          <a:bodyPr/>
+          <a:lstStyle/>
+          <a:p>
+            <a:endParaRPr lang="de-DE" dirty="0"/>
+          </a:p>
+        </p:txBody>
+      </p:sp>
+      <p:sp>
+        <p:nvSpPr>
+          <p:cNvPr id="4" name="Foliennummernplatzhalter 3"/>
+          <p:cNvSpPr>
+            <a:spLocks noGrp="1"/>
+          </p:cNvSpPr>
+          <p:nvPr>
+            <p:ph type="sldNum" sz="quarter" idx="10"/>
+          </p:nvPr>
+        </p:nvSpPr>
+        <p:spPr/>
+        <p:txBody>
+          <a:bodyPr/>
+          <a:lstStyle/>
+          <a:p>
+            <a:fld id="{6A2CFF65-CB9C-5A47-B7DE-47882B59B3DA}" type="slidenum">
+              <a:rPr lang="de-DE" smtClean="0"/>
+              <a:t>15</a:t>
+            </a:fld>
+            <a:endParaRPr lang="de-DE"/>
+          </a:p>
+        </p:txBody>
+      </p:sp>
+    </p:spTree>
+    <p:extLst>
+      <p:ext uri="{BB962C8B-B14F-4D97-AF65-F5344CB8AC3E}">
+        <p14:creationId xmlns:p14="http://schemas.microsoft.com/office/powerpoint/2010/main" val="660173880"/>
+      </p:ext>
+    </p:extLst>
+  </p:cSld>
+  <p:clrMapOvr>
+    <a:masterClrMapping/>
+  </p:clrMapOvr>
+</p:notes>
+</file>
+
+<file path=ppt/notesSlides/notesSlide12.xml><?xml version="1.0" encoding="utf-8"?>
+<p:notes xmlns:a="http://schemas.openxmlformats.org/drawingml/2006/main" xmlns:r="http://schemas.openxmlformats.org/officeDocument/2006/relationships" xmlns:p="http://schemas.openxmlformats.org/presentationml/2006/main">
+  <p:cSld>
+    <p:spTree>
+      <p:nvGrpSpPr>
+        <p:cNvPr id="1" name=""/>
+        <p:cNvGrpSpPr/>
+        <p:nvPr/>
+      </p:nvGrpSpPr>
+      <p:grpSpPr>
+        <a:xfrm>
+          <a:off x="0" y="0"/>
+          <a:ext cx="0" cy="0"/>
+          <a:chOff x="0" y="0"/>
+          <a:chExt cx="0" cy="0"/>
+        </a:xfrm>
+      </p:grpSpPr>
+      <p:sp>
+        <p:nvSpPr>
+          <p:cNvPr id="2" name="Folienbildplatzhalter 1"/>
+          <p:cNvSpPr>
+            <a:spLocks noGrp="1" noRot="1" noChangeAspect="1"/>
+          </p:cNvSpPr>
+          <p:nvPr>
+            <p:ph type="sldImg"/>
+          </p:nvPr>
+        </p:nvSpPr>
+        <p:spPr/>
+      </p:sp>
+      <p:sp>
+        <p:nvSpPr>
+          <p:cNvPr id="3" name="Notizenplatzhalter 2"/>
+          <p:cNvSpPr>
+            <a:spLocks noGrp="1"/>
+          </p:cNvSpPr>
+          <p:nvPr>
+            <p:ph type="body" idx="1"/>
+          </p:nvPr>
+        </p:nvSpPr>
+        <p:spPr/>
+        <p:txBody>
+          <a:bodyPr/>
+          <a:lstStyle/>
+          <a:p>
+            <a:endParaRPr lang="de-DE" dirty="0"/>
+          </a:p>
+        </p:txBody>
+      </p:sp>
+      <p:sp>
+        <p:nvSpPr>
+          <p:cNvPr id="4" name="Foliennummernplatzhalter 3"/>
+          <p:cNvSpPr>
+            <a:spLocks noGrp="1"/>
+          </p:cNvSpPr>
+          <p:nvPr>
+            <p:ph type="sldNum" sz="quarter" idx="10"/>
+          </p:nvPr>
+        </p:nvSpPr>
+        <p:spPr/>
+        <p:txBody>
+          <a:bodyPr/>
+          <a:lstStyle/>
+          <a:p>
+            <a:fld id="{6A2CFF65-CB9C-5A47-B7DE-47882B59B3DA}" type="slidenum">
+              <a:rPr lang="de-DE" smtClean="0"/>
+              <a:t>16</a:t>
+            </a:fld>
+            <a:endParaRPr lang="de-DE"/>
+          </a:p>
+        </p:txBody>
+      </p:sp>
+    </p:spTree>
+    <p:extLst>
+      <p:ext uri="{BB962C8B-B14F-4D97-AF65-F5344CB8AC3E}">
+        <p14:creationId xmlns:p14="http://schemas.microsoft.com/office/powerpoint/2010/main" val="660173880"/>
+      </p:ext>
+    </p:extLst>
+  </p:cSld>
+  <p:clrMapOvr>
+    <a:masterClrMapping/>
+  </p:clrMapOvr>
+</p:notes>
+</file>
+
+<file path=ppt/notesSlides/notesSlide13.xml><?xml version="1.0" encoding="utf-8"?>
+<p:notes xmlns:a="http://schemas.openxmlformats.org/drawingml/2006/main" xmlns:r="http://schemas.openxmlformats.org/officeDocument/2006/relationships" xmlns:p="http://schemas.openxmlformats.org/presentationml/2006/main">
+  <p:cSld>
+    <p:spTree>
+      <p:nvGrpSpPr>
+        <p:cNvPr id="1" name=""/>
+        <p:cNvGrpSpPr/>
+        <p:nvPr/>
+      </p:nvGrpSpPr>
+      <p:grpSpPr>
+        <a:xfrm>
+          <a:off x="0" y="0"/>
+          <a:ext cx="0" cy="0"/>
+          <a:chOff x="0" y="0"/>
+          <a:chExt cx="0" cy="0"/>
+        </a:xfrm>
+      </p:grpSpPr>
+      <p:sp>
+        <p:nvSpPr>
+          <p:cNvPr id="2" name="Folienbildplatzhalter 1"/>
+          <p:cNvSpPr>
+            <a:spLocks noGrp="1" noRot="1" noChangeAspect="1"/>
+          </p:cNvSpPr>
+          <p:nvPr>
+            <p:ph type="sldImg"/>
+          </p:nvPr>
+        </p:nvSpPr>
+        <p:spPr/>
+      </p:sp>
+      <p:sp>
+        <p:nvSpPr>
+          <p:cNvPr id="3" name="Notizenplatzhalter 2"/>
+          <p:cNvSpPr>
+            <a:spLocks noGrp="1"/>
+          </p:cNvSpPr>
+          <p:nvPr>
+            <p:ph type="body" idx="1"/>
+          </p:nvPr>
+        </p:nvSpPr>
+        <p:spPr/>
+        <p:txBody>
+          <a:bodyPr/>
+          <a:lstStyle/>
+          <a:p>
+            <a:r>
+              <a:rPr lang="de-DE" dirty="0" smtClean="0"/>
+              <a:t>Design Pattern: </a:t>
+            </a:r>
+            <a:r>
+              <a:rPr lang="de-DE" dirty="0" err="1" smtClean="0"/>
+              <a:t>Strategy</a:t>
+            </a:r>
+            <a:endParaRPr lang="de-DE" dirty="0" smtClean="0"/>
+          </a:p>
+        </p:txBody>
+      </p:sp>
+      <p:sp>
+        <p:nvSpPr>
+          <p:cNvPr id="4" name="Foliennummernplatzhalter 3"/>
+          <p:cNvSpPr>
+            <a:spLocks noGrp="1"/>
+          </p:cNvSpPr>
+          <p:nvPr>
+            <p:ph type="sldNum" sz="quarter" idx="10"/>
+          </p:nvPr>
+        </p:nvSpPr>
+        <p:spPr/>
+        <p:txBody>
+          <a:bodyPr/>
+          <a:lstStyle/>
+          <a:p>
+            <a:fld id="{6A2CFF65-CB9C-5A47-B7DE-47882B59B3DA}" type="slidenum">
+              <a:rPr lang="de-DE" smtClean="0"/>
+              <a:t>18</a:t>
+            </a:fld>
+            <a:endParaRPr lang="de-DE"/>
+          </a:p>
+        </p:txBody>
+      </p:sp>
+    </p:spTree>
+    <p:extLst>
+      <p:ext uri="{BB962C8B-B14F-4D97-AF65-F5344CB8AC3E}">
+        <p14:creationId xmlns:p14="http://schemas.microsoft.com/office/powerpoint/2010/main" val="660173880"/>
+      </p:ext>
+    </p:extLst>
+  </p:cSld>
+  <p:clrMapOvr>
+    <a:masterClrMapping/>
+  </p:clrMapOvr>
+</p:notes>
+</file>
+
+<file path=ppt/notesSlides/notesSlide14.xml><?xml version="1.0" encoding="utf-8"?>
+<p:notes xmlns:a="http://schemas.openxmlformats.org/drawingml/2006/main" xmlns:r="http://schemas.openxmlformats.org/officeDocument/2006/relationships" xmlns:p="http://schemas.openxmlformats.org/presentationml/2006/main">
+  <p:cSld>
+    <p:spTree>
+      <p:nvGrpSpPr>
+        <p:cNvPr id="1" name=""/>
+        <p:cNvGrpSpPr/>
+        <p:nvPr/>
+      </p:nvGrpSpPr>
+      <p:grpSpPr>
+        <a:xfrm>
+          <a:off x="0" y="0"/>
+          <a:ext cx="0" cy="0"/>
+          <a:chOff x="0" y="0"/>
+          <a:chExt cx="0" cy="0"/>
+        </a:xfrm>
+      </p:grpSpPr>
+      <p:sp>
+        <p:nvSpPr>
+          <p:cNvPr id="2" name="Folienbildplatzhalter 1"/>
+          <p:cNvSpPr>
+            <a:spLocks noGrp="1" noRot="1" noChangeAspect="1"/>
+          </p:cNvSpPr>
+          <p:nvPr>
+            <p:ph type="sldImg"/>
+          </p:nvPr>
+        </p:nvSpPr>
+        <p:spPr/>
+      </p:sp>
+      <p:sp>
+        <p:nvSpPr>
+          <p:cNvPr id="3" name="Notizenplatzhalter 2"/>
+          <p:cNvSpPr>
+            <a:spLocks noGrp="1"/>
+          </p:cNvSpPr>
+          <p:nvPr>
+            <p:ph type="body" idx="1"/>
+          </p:nvPr>
+        </p:nvSpPr>
+        <p:spPr/>
+        <p:txBody>
+          <a:bodyPr/>
+          <a:lstStyle/>
+          <a:p>
+            <a:endParaRPr lang="de-DE"/>
+          </a:p>
+        </p:txBody>
+      </p:sp>
+      <p:sp>
+        <p:nvSpPr>
+          <p:cNvPr id="4" name="Foliennummernplatzhalter 3"/>
+          <p:cNvSpPr>
+            <a:spLocks noGrp="1"/>
+          </p:cNvSpPr>
+          <p:nvPr>
+            <p:ph type="sldNum" sz="quarter" idx="10"/>
+          </p:nvPr>
+        </p:nvSpPr>
+        <p:spPr/>
+        <p:txBody>
+          <a:bodyPr/>
+          <a:lstStyle/>
+          <a:p>
+            <a:fld id="{6A2CFF65-CB9C-5A47-B7DE-47882B59B3DA}" type="slidenum">
+              <a:rPr lang="de-DE" smtClean="0"/>
+              <a:t>19</a:t>
+            </a:fld>
+            <a:endParaRPr lang="de-DE"/>
+          </a:p>
+        </p:txBody>
+      </p:sp>
+    </p:spTree>
+    <p:extLst>
+      <p:ext uri="{BB962C8B-B14F-4D97-AF65-F5344CB8AC3E}">
+        <p14:creationId xmlns:p14="http://schemas.microsoft.com/office/powerpoint/2010/main" val="865758175"/>
+      </p:ext>
+    </p:extLst>
+  </p:cSld>
+  <p:clrMapOvr>
+    <a:masterClrMapping/>
+  </p:clrMapOvr>
+</p:notes>
+</file>
+
 <file path=ppt/notesSlides/notesSlide2.xml><?xml version="1.0" encoding="utf-8"?>
 <p:notes xmlns:a="http://schemas.openxmlformats.org/drawingml/2006/main" xmlns:r="http://schemas.openxmlformats.org/officeDocument/2006/relationships" xmlns:p="http://schemas.openxmlformats.org/presentationml/2006/main">
   <p:cSld>
@@ -1374,7 +1808,28 @@
             </a:r>
             <a:r>
               <a:rPr lang="de-DE" baseline="0" dirty="0" smtClean="0"/>
-              <a:t> setzten gleich</a:t>
+              <a:t> setzten </a:t>
+            </a:r>
+            <a:r>
+              <a:rPr lang="de-DE" baseline="0" dirty="0" smtClean="0"/>
+              <a:t>gleich</a:t>
+            </a:r>
+          </a:p>
+          <a:p>
+            <a:r>
+              <a:rPr lang="de-DE" baseline="0" dirty="0" smtClean="0"/>
+              <a:t>Design Pattern: </a:t>
+            </a:r>
+            <a:r>
+              <a:rPr lang="de-DE" baseline="0" dirty="0" err="1" smtClean="0"/>
+              <a:t>Decorator</a:t>
+            </a:r>
+            <a:endParaRPr lang="de-DE" baseline="0" dirty="0" smtClean="0"/>
+          </a:p>
+          <a:p>
+            <a:r>
+              <a:rPr lang="de-DE" baseline="0" dirty="0" smtClean="0"/>
+              <a:t>-&gt; Abstract Item und dann diverse Versionen davon, diese könnten durch Vererbung einzeln noch spezifiziert werden</a:t>
             </a:r>
             <a:endParaRPr lang="de-DE" dirty="0"/>
           </a:p>
@@ -1460,6 +1915,20 @@
           <a:bodyPr/>
           <a:lstStyle/>
           <a:p>
+            <a:r>
+              <a:rPr lang="de-DE" dirty="0" smtClean="0"/>
+              <a:t>Design Pattern: Factory</a:t>
+            </a:r>
+          </a:p>
+          <a:p>
+            <a:r>
+              <a:rPr lang="de-DE" dirty="0" smtClean="0"/>
+              <a:t>Für jedes Item gibt es ein Tool, welches</a:t>
+            </a:r>
+            <a:r>
+              <a:rPr lang="de-DE" baseline="0" dirty="0" smtClean="0"/>
+              <a:t> diese Erstellt. </a:t>
+            </a:r>
             <a:endParaRPr lang="de-DE" dirty="0"/>
           </a:p>
         </p:txBody>
@@ -1544,7 +2013,159 @@
           <a:bodyPr/>
           <a:lstStyle/>
           <a:p>
+            <a:r>
+              <a:rPr lang="de-DE" dirty="0" smtClean="0"/>
+              <a:t>Design Pattern: Observer</a:t>
+            </a:r>
+          </a:p>
+          <a:p>
+            <a:r>
+              <a:rPr lang="de-DE" dirty="0" smtClean="0"/>
+              <a:t>Jedes Item besitz</a:t>
+            </a:r>
+            <a:r>
+              <a:rPr lang="de-DE" baseline="0" dirty="0" smtClean="0"/>
+              <a:t> mehrere </a:t>
+            </a:r>
+            <a:r>
+              <a:rPr lang="de-DE" baseline="0" dirty="0" err="1" smtClean="0"/>
+              <a:t>ItemChangedListeners</a:t>
+            </a:r>
+            <a:r>
+              <a:rPr lang="de-DE" baseline="0" dirty="0" smtClean="0"/>
+              <a:t> (Observer), dieser gibt eine Änderung (durch </a:t>
+            </a:r>
+            <a:r>
+              <a:rPr lang="de-DE" baseline="0" dirty="0" err="1" smtClean="0"/>
+              <a:t>notify</a:t>
+            </a:r>
+            <a:r>
+              <a:rPr lang="de-DE" baseline="0" dirty="0" smtClean="0"/>
+              <a:t> ausgelöst) des Items weiter an das Field und löst bspw. Ein </a:t>
+            </a:r>
+            <a:r>
+              <a:rPr lang="de-DE" baseline="0" dirty="0" err="1" smtClean="0"/>
+              <a:t>repaint</a:t>
+            </a:r>
+            <a:r>
+              <a:rPr lang="de-DE" baseline="0" dirty="0" smtClean="0"/>
+              <a:t> aus. </a:t>
+            </a:r>
+            <a:endParaRPr lang="de-DE" dirty="0"/>
+          </a:p>
+        </p:txBody>
+      </p:sp>
+      <p:sp>
+        <p:nvSpPr>
+          <p:cNvPr id="4" name="Foliennummernplatzhalter 3"/>
+          <p:cNvSpPr>
+            <a:spLocks noGrp="1"/>
+          </p:cNvSpPr>
+          <p:nvPr>
+            <p:ph type="sldNum" sz="quarter" idx="10"/>
+          </p:nvPr>
+        </p:nvSpPr>
+        <p:spPr/>
+        <p:txBody>
+          <a:bodyPr/>
+          <a:lstStyle/>
+          <a:p>
+            <a:fld id="{6A2CFF65-CB9C-5A47-B7DE-47882B59B3DA}" type="slidenum">
+              <a:rPr lang="de-DE" smtClean="0"/>
+              <a:t>12</a:t>
+            </a:fld>
             <a:endParaRPr lang="de-DE"/>
+          </a:p>
+        </p:txBody>
+      </p:sp>
+    </p:spTree>
+    <p:extLst>
+      <p:ext uri="{BB962C8B-B14F-4D97-AF65-F5344CB8AC3E}">
+        <p14:creationId xmlns:p14="http://schemas.microsoft.com/office/powerpoint/2010/main" val="660173880"/>
+      </p:ext>
+    </p:extLst>
+  </p:cSld>
+  <p:clrMapOvr>
+    <a:masterClrMapping/>
+  </p:clrMapOvr>
+</p:notes>
+</file>
+
+<file path=ppt/notesSlides/notesSlide9.xml><?xml version="1.0" encoding="utf-8"?>
+<p:notes xmlns:a="http://schemas.openxmlformats.org/drawingml/2006/main" xmlns:r="http://schemas.openxmlformats.org/officeDocument/2006/relationships" xmlns:p="http://schemas.openxmlformats.org/presentationml/2006/main">
+  <p:cSld>
+    <p:spTree>
+      <p:nvGrpSpPr>
+        <p:cNvPr id="1" name=""/>
+        <p:cNvGrpSpPr/>
+        <p:nvPr/>
+      </p:nvGrpSpPr>
+      <p:grpSpPr>
+        <a:xfrm>
+          <a:off x="0" y="0"/>
+          <a:ext cx="0" cy="0"/>
+          <a:chOff x="0" y="0"/>
+          <a:chExt cx="0" cy="0"/>
+        </a:xfrm>
+      </p:grpSpPr>
+      <p:sp>
+        <p:nvSpPr>
+          <p:cNvPr id="2" name="Folienbildplatzhalter 1"/>
+          <p:cNvSpPr>
+            <a:spLocks noGrp="1" noRot="1" noChangeAspect="1"/>
+          </p:cNvSpPr>
+          <p:nvPr>
+            <p:ph type="sldImg"/>
+          </p:nvPr>
+        </p:nvSpPr>
+        <p:spPr/>
+      </p:sp>
+      <p:sp>
+        <p:nvSpPr>
+          <p:cNvPr id="3" name="Notizenplatzhalter 2"/>
+          <p:cNvSpPr>
+            <a:spLocks noGrp="1"/>
+          </p:cNvSpPr>
+          <p:nvPr>
+            <p:ph type="body" idx="1"/>
+          </p:nvPr>
+        </p:nvSpPr>
+        <p:spPr/>
+        <p:txBody>
+          <a:bodyPr/>
+          <a:lstStyle/>
+          <a:p>
+            <a:r>
+              <a:rPr lang="de-DE" dirty="0" smtClean="0"/>
+              <a:t>Design Pattern: Observer</a:t>
+            </a:r>
+          </a:p>
+          <a:p>
+            <a:r>
+              <a:rPr lang="de-DE" dirty="0" smtClean="0"/>
+              <a:t>Das Field ein</a:t>
+            </a:r>
+            <a:r>
+              <a:rPr lang="de-DE" baseline="0" dirty="0" smtClean="0"/>
+              <a:t> </a:t>
+            </a:r>
+            <a:r>
+              <a:rPr lang="de-DE" baseline="0" dirty="0" err="1" smtClean="0"/>
+              <a:t>FieldChangedListener</a:t>
+            </a:r>
+            <a:r>
+              <a:rPr lang="de-DE" baseline="0" dirty="0" smtClean="0"/>
+              <a:t> (Observer), dieser gibt Änderungen (durch </a:t>
+            </a:r>
+            <a:r>
+              <a:rPr lang="de-DE" baseline="0" dirty="0" err="1" smtClean="0"/>
+              <a:t>notify</a:t>
+            </a:r>
+            <a:r>
+              <a:rPr lang="de-DE" baseline="0" dirty="0" smtClean="0"/>
+              <a:t> im Field aufgelöst) weiter an die View und löst bspw. Ein Repaint aus. </a:t>
+            </a:r>
+            <a:endParaRPr lang="de-DE" dirty="0"/>
           </a:p>
         </p:txBody>
       </p:sp>
@@ -1574,7 +2195,7 @@
     </p:spTree>
     <p:extLst>
       <p:ext uri="{BB962C8B-B14F-4D97-AF65-F5344CB8AC3E}">
-        <p14:creationId xmlns:p14="http://schemas.microsoft.com/office/powerpoint/2010/main" val="865758175"/>
+        <p14:creationId xmlns:p14="http://schemas.microsoft.com/office/powerpoint/2010/main" val="660173880"/>
       </p:ext>
     </p:extLst>
   </p:cSld>
@@ -5391,10 +6012,6 @@
               <a:rPr lang="de-DE" dirty="0" smtClean="0"/>
               <a:t>Diagramme</a:t>
             </a:r>
-            <a:r>
-              <a:rPr lang="de-DE" dirty="0" smtClean="0"/>
-              <a:t/>
-            </a:r>
             <a:br>
               <a:rPr lang="de-DE" dirty="0" smtClean="0"/>
             </a:br>
@@ -5452,6 +6069,36 @@
           </a:p>
         </p:txBody>
       </p:sp>
+      <p:pic>
+        <p:nvPicPr>
+          <p:cNvPr id="3" name="Bild 2" descr="uml_diagramm_items.jpg"/>
+          <p:cNvPicPr>
+            <a:picLocks noChangeAspect="1"/>
+          </p:cNvPicPr>
+          <p:nvPr/>
+        </p:nvPicPr>
+        <p:blipFill>
+          <a:blip r:embed="rId3">
+            <a:extLst>
+              <a:ext uri="{28A0092B-C50C-407E-A947-70E740481C1C}">
+                <a14:useLocalDpi xmlns:a14="http://schemas.microsoft.com/office/drawing/2010/main" val="0"/>
+              </a:ext>
+            </a:extLst>
+          </a:blip>
+          <a:stretch>
+            <a:fillRect/>
+          </a:stretch>
+        </p:blipFill>
+        <p:spPr>
+          <a:xfrm>
+            <a:off x="1644415" y="1640302"/>
+            <a:ext cx="5421682" cy="5217698"/>
+          </a:xfrm>
+          <a:prstGeom prst="rect">
+            <a:avLst/>
+          </a:prstGeom>
+        </p:spPr>
+      </p:pic>
     </p:spTree>
     <p:extLst>
       <p:ext uri="{BB962C8B-B14F-4D97-AF65-F5344CB8AC3E}">
@@ -5517,16 +6164,12 @@
               <a:rPr lang="de-DE" dirty="0" smtClean="0"/>
               <a:t>Diagramme</a:t>
             </a:r>
-            <a:r>
-              <a:rPr lang="de-DE" dirty="0" smtClean="0"/>
-              <a:t/>
-            </a:r>
             <a:br>
               <a:rPr lang="de-DE" dirty="0" smtClean="0"/>
             </a:br>
             <a:r>
               <a:rPr lang="de-DE" sz="3200" dirty="0" smtClean="0"/>
-              <a:t>Handlers</a:t>
+              <a:t>Tools</a:t>
             </a:r>
             <a:endParaRPr lang="de-DE" sz="3200" dirty="0"/>
           </a:p>
@@ -5578,10 +6221,40 @@
           </a:p>
         </p:txBody>
       </p:sp>
+      <p:pic>
+        <p:nvPicPr>
+          <p:cNvPr id="3" name="Bild 2" descr="uml_diagramm_tools.jpg"/>
+          <p:cNvPicPr>
+            <a:picLocks noChangeAspect="1"/>
+          </p:cNvPicPr>
+          <p:nvPr/>
+        </p:nvPicPr>
+        <p:blipFill>
+          <a:blip r:embed="rId3">
+            <a:extLst>
+              <a:ext uri="{28A0092B-C50C-407E-A947-70E740481C1C}">
+                <a14:useLocalDpi xmlns:a14="http://schemas.microsoft.com/office/drawing/2010/main" val="0"/>
+              </a:ext>
+            </a:extLst>
+          </a:blip>
+          <a:stretch>
+            <a:fillRect/>
+          </a:stretch>
+        </p:blipFill>
+        <p:spPr>
+          <a:xfrm>
+            <a:off x="354106" y="1661304"/>
+            <a:ext cx="8573020" cy="4792726"/>
+          </a:xfrm>
+          <a:prstGeom prst="rect">
+            <a:avLst/>
+          </a:prstGeom>
+        </p:spPr>
+      </p:pic>
     </p:spTree>
     <p:extLst>
       <p:ext uri="{BB962C8B-B14F-4D97-AF65-F5344CB8AC3E}">
-        <p14:creationId xmlns:p14="http://schemas.microsoft.com/office/powerpoint/2010/main" val="3971977397"/>
+        <p14:creationId xmlns:p14="http://schemas.microsoft.com/office/powerpoint/2010/main" val="2365112028"/>
       </p:ext>
     </p:extLst>
   </p:cSld>
@@ -5625,76 +6298,61 @@
             <p:ph type="title"/>
           </p:nvPr>
         </p:nvSpPr>
-        <p:spPr/>
-        <p:txBody>
-          <a:bodyPr/>
-          <a:lstStyle/>
-          <a:p>
+        <p:spPr>
+          <a:xfrm>
+            <a:off x="565763" y="107577"/>
+            <a:ext cx="8007257" cy="1653988"/>
+          </a:xfrm>
+        </p:spPr>
+        <p:txBody>
+          <a:bodyPr/>
+          <a:lstStyle/>
+          <a:p>
+            <a:r>
+              <a:rPr lang="de-DE" dirty="0"/>
+              <a:t>UML Klassen </a:t>
+            </a:r>
             <a:r>
               <a:rPr lang="de-DE" dirty="0" smtClean="0"/>
-              <a:t>Robot</a:t>
-            </a:r>
-            <a:endParaRPr lang="de-DE" dirty="0"/>
-          </a:p>
-        </p:txBody>
-      </p:sp>
-      <p:sp>
-        <p:nvSpPr>
-          <p:cNvPr id="3" name="Inhaltsplatzhalter 2"/>
-          <p:cNvSpPr>
-            <a:spLocks noGrp="1"/>
-          </p:cNvSpPr>
-          <p:nvPr>
-            <p:ph idx="1"/>
-          </p:nvPr>
-        </p:nvSpPr>
-        <p:spPr/>
-        <p:txBody>
-          <a:bodyPr/>
-          <a:lstStyle/>
-          <a:p>
-            <a:r>
-              <a:rPr lang="de-DE" dirty="0"/>
-              <a:t>Domain Mode</a:t>
-            </a:r>
-          </a:p>
-          <a:p>
-            <a:r>
-              <a:rPr lang="de-DE" dirty="0" err="1"/>
-              <a:t>Use</a:t>
-            </a:r>
-            <a:r>
-              <a:rPr lang="de-DE" dirty="0"/>
-              <a:t> Cases</a:t>
-            </a:r>
-          </a:p>
-          <a:p>
-            <a:r>
-              <a:rPr lang="de-DE" dirty="0" err="1"/>
-              <a:t>Sequence</a:t>
-            </a:r>
-            <a:r>
-              <a:rPr lang="de-DE" dirty="0"/>
-              <a:t> Diagramme</a:t>
-            </a:r>
-          </a:p>
-          <a:p>
-            <a:r>
-              <a:rPr lang="de-DE" dirty="0"/>
-              <a:t>UML Klassen Diagramme</a:t>
-            </a:r>
-          </a:p>
-          <a:p>
-            <a:pPr marL="0" indent="0">
-              <a:buNone/>
-            </a:pPr>
-            <a:endParaRPr lang="de-DE" dirty="0"/>
-          </a:p>
-        </p:txBody>
-      </p:sp>
-      <p:sp>
-        <p:nvSpPr>
-          <p:cNvPr id="6" name="Foliennummernplatzhalter 5"/>
+              <a:t>Diagramme</a:t>
+            </a:r>
+            <a:br>
+              <a:rPr lang="de-DE" dirty="0" smtClean="0"/>
+            </a:br>
+            <a:r>
+              <a:rPr lang="de-DE" sz="3200" dirty="0" smtClean="0"/>
+              <a:t>Observer Hindernisse</a:t>
+            </a:r>
+            <a:endParaRPr lang="de-DE" sz="3200" dirty="0"/>
+          </a:p>
+        </p:txBody>
+      </p:sp>
+      <p:sp>
+        <p:nvSpPr>
+          <p:cNvPr id="4" name="Fußzeilenplatzhalter 3"/>
+          <p:cNvSpPr>
+            <a:spLocks noGrp="1"/>
+          </p:cNvSpPr>
+          <p:nvPr>
+            <p:ph type="ftr" sz="quarter" idx="11"/>
+          </p:nvPr>
+        </p:nvSpPr>
+        <p:spPr/>
+        <p:txBody>
+          <a:bodyPr/>
+          <a:lstStyle/>
+          <a:p>
+            <a:r>
+              <a:rPr lang="en-US" smtClean="0"/>
+              <a:t>gfels4 &amp; zannc2</a:t>
+            </a:r>
+            <a:endParaRPr lang="en-US"/>
+          </a:p>
+        </p:txBody>
+      </p:sp>
+      <p:sp>
+        <p:nvSpPr>
+          <p:cNvPr id="5" name="Foliennummernplatzhalter 4"/>
           <p:cNvSpPr>
             <a:spLocks noGrp="1"/>
           </p:cNvSpPr>
@@ -5715,33 +6373,40 @@
           </a:p>
         </p:txBody>
       </p:sp>
-      <p:sp>
-        <p:nvSpPr>
-          <p:cNvPr id="7" name="Fußzeilenplatzhalter 6"/>
-          <p:cNvSpPr>
-            <a:spLocks noGrp="1"/>
-          </p:cNvSpPr>
-          <p:nvPr>
-            <p:ph type="ftr" sz="quarter" idx="11"/>
-          </p:nvPr>
-        </p:nvSpPr>
-        <p:spPr/>
-        <p:txBody>
-          <a:bodyPr/>
-          <a:lstStyle/>
-          <a:p>
-            <a:r>
-              <a:rPr lang="en-US" smtClean="0"/>
-              <a:t>gfels4 &amp; zannc2</a:t>
-            </a:r>
-            <a:endParaRPr lang="en-US"/>
-          </a:p>
-        </p:txBody>
-      </p:sp>
+      <p:pic>
+        <p:nvPicPr>
+          <p:cNvPr id="3" name="Bild 2" descr="uml_diagramm_itemObserver.jpg"/>
+          <p:cNvPicPr>
+            <a:picLocks noChangeAspect="1"/>
+          </p:cNvPicPr>
+          <p:nvPr/>
+        </p:nvPicPr>
+        <p:blipFill>
+          <a:blip r:embed="rId3">
+            <a:extLst>
+              <a:ext uri="{28A0092B-C50C-407E-A947-70E740481C1C}">
+                <a14:useLocalDpi xmlns:a14="http://schemas.microsoft.com/office/drawing/2010/main" val="0"/>
+              </a:ext>
+            </a:extLst>
+          </a:blip>
+          <a:stretch>
+            <a:fillRect/>
+          </a:stretch>
+        </p:blipFill>
+        <p:spPr>
+          <a:xfrm>
+            <a:off x="0" y="1890866"/>
+            <a:ext cx="9144000" cy="4465484"/>
+          </a:xfrm>
+          <a:prstGeom prst="rect">
+            <a:avLst/>
+          </a:prstGeom>
+        </p:spPr>
+      </p:pic>
     </p:spTree>
     <p:extLst>
       <p:ext uri="{BB962C8B-B14F-4D97-AF65-F5344CB8AC3E}">
-        <p14:creationId xmlns:p14="http://schemas.microsoft.com/office/powerpoint/2010/main" val="3514780789"/>
+        <p14:creationId xmlns:p14="http://schemas.microsoft.com/office/powerpoint/2010/main" val="4244342565"/>
       </p:ext>
     </p:extLst>
   </p:cSld>
@@ -5785,41 +6450,61 @@
             <p:ph type="title"/>
           </p:nvPr>
         </p:nvSpPr>
-        <p:spPr/>
-        <p:txBody>
-          <a:bodyPr/>
-          <a:lstStyle/>
-          <a:p>
+        <p:spPr>
+          <a:xfrm>
+            <a:off x="565763" y="107577"/>
+            <a:ext cx="8007257" cy="1653988"/>
+          </a:xfrm>
+        </p:spPr>
+        <p:txBody>
+          <a:bodyPr/>
+          <a:lstStyle/>
+          <a:p>
+            <a:r>
+              <a:rPr lang="de-DE" dirty="0"/>
+              <a:t>UML Klassen </a:t>
+            </a:r>
             <a:r>
               <a:rPr lang="de-DE" dirty="0" smtClean="0"/>
-              <a:t>Vorführung</a:t>
-            </a:r>
-            <a:endParaRPr lang="de-DE" dirty="0"/>
-          </a:p>
-        </p:txBody>
-      </p:sp>
-      <p:sp>
-        <p:nvSpPr>
-          <p:cNvPr id="3" name="Inhaltsplatzhalter 2"/>
-          <p:cNvSpPr>
-            <a:spLocks noGrp="1"/>
-          </p:cNvSpPr>
-          <p:nvPr>
-            <p:ph idx="1"/>
-          </p:nvPr>
-        </p:nvSpPr>
-        <p:spPr/>
-        <p:txBody>
-          <a:bodyPr/>
-          <a:lstStyle/>
-          <a:p>
-            <a:endParaRPr lang="de-DE"/>
-          </a:p>
-        </p:txBody>
-      </p:sp>
-      <p:sp>
-        <p:nvSpPr>
-          <p:cNvPr id="6" name="Foliennummernplatzhalter 5"/>
+              <a:t>Diagramme</a:t>
+            </a:r>
+            <a:br>
+              <a:rPr lang="de-DE" dirty="0" smtClean="0"/>
+            </a:br>
+            <a:r>
+              <a:rPr lang="de-DE" sz="3200" dirty="0" smtClean="0"/>
+              <a:t>Observer Field</a:t>
+            </a:r>
+            <a:endParaRPr lang="de-DE" sz="3200" dirty="0"/>
+          </a:p>
+        </p:txBody>
+      </p:sp>
+      <p:sp>
+        <p:nvSpPr>
+          <p:cNvPr id="4" name="Fußzeilenplatzhalter 3"/>
+          <p:cNvSpPr>
+            <a:spLocks noGrp="1"/>
+          </p:cNvSpPr>
+          <p:nvPr>
+            <p:ph type="ftr" sz="quarter" idx="11"/>
+          </p:nvPr>
+        </p:nvSpPr>
+        <p:spPr/>
+        <p:txBody>
+          <a:bodyPr/>
+          <a:lstStyle/>
+          <a:p>
+            <a:r>
+              <a:rPr lang="en-US" smtClean="0"/>
+              <a:t>gfels4 &amp; zannc2</a:t>
+            </a:r>
+            <a:endParaRPr lang="en-US"/>
+          </a:p>
+        </p:txBody>
+      </p:sp>
+      <p:sp>
+        <p:nvSpPr>
+          <p:cNvPr id="5" name="Foliennummernplatzhalter 4"/>
           <p:cNvSpPr>
             <a:spLocks noGrp="1"/>
           </p:cNvSpPr>
@@ -5835,6 +6520,875 @@
             <a:fld id="{D12AA694-00EB-4F4B-AABB-6F50FB178914}" type="slidenum">
               <a:rPr lang="en-US" smtClean="0"/>
               <a:t>13</a:t>
+            </a:fld>
+            <a:endParaRPr lang="en-US"/>
+          </a:p>
+        </p:txBody>
+      </p:sp>
+      <p:pic>
+        <p:nvPicPr>
+          <p:cNvPr id="6" name="Bild 5" descr="uml_diagramm_fieldObserver.jpg"/>
+          <p:cNvPicPr>
+            <a:picLocks noChangeAspect="1"/>
+          </p:cNvPicPr>
+          <p:nvPr/>
+        </p:nvPicPr>
+        <p:blipFill>
+          <a:blip r:embed="rId3">
+            <a:extLst>
+              <a:ext uri="{28A0092B-C50C-407E-A947-70E740481C1C}">
+                <a14:useLocalDpi xmlns:a14="http://schemas.microsoft.com/office/drawing/2010/main" val="0"/>
+              </a:ext>
+            </a:extLst>
+          </a:blip>
+          <a:stretch>
+            <a:fillRect/>
+          </a:stretch>
+        </p:blipFill>
+        <p:spPr>
+          <a:xfrm>
+            <a:off x="177832" y="1680165"/>
+            <a:ext cx="8803354" cy="4722829"/>
+          </a:xfrm>
+          <a:prstGeom prst="rect">
+            <a:avLst/>
+          </a:prstGeom>
+        </p:spPr>
+      </p:pic>
+    </p:spTree>
+    <p:extLst>
+      <p:ext uri="{BB962C8B-B14F-4D97-AF65-F5344CB8AC3E}">
+        <p14:creationId xmlns:p14="http://schemas.microsoft.com/office/powerpoint/2010/main" val="2983411036"/>
+      </p:ext>
+    </p:extLst>
+  </p:cSld>
+  <p:clrMapOvr>
+    <a:masterClrMapping/>
+  </p:clrMapOvr>
+  <p:timing>
+    <p:tnLst>
+      <p:par>
+        <p:cTn xmlns:p14="http://schemas.microsoft.com/office/powerpoint/2010/main" id="1" dur="indefinite" restart="never" nodeType="tmRoot"/>
+      </p:par>
+    </p:tnLst>
+  </p:timing>
+</p:sld>
+</file>
+
+<file path=ppt/slides/slide14.xml><?xml version="1.0" encoding="utf-8"?>
+<p:sld xmlns:a="http://schemas.openxmlformats.org/drawingml/2006/main" xmlns:r="http://schemas.openxmlformats.org/officeDocument/2006/relationships" xmlns:p="http://schemas.openxmlformats.org/presentationml/2006/main">
+  <p:cSld>
+    <p:spTree>
+      <p:nvGrpSpPr>
+        <p:cNvPr id="1" name=""/>
+        <p:cNvGrpSpPr/>
+        <p:nvPr/>
+      </p:nvGrpSpPr>
+      <p:grpSpPr>
+        <a:xfrm>
+          <a:off x="0" y="0"/>
+          <a:ext cx="0" cy="0"/>
+          <a:chOff x="0" y="0"/>
+          <a:chExt cx="0" cy="0"/>
+        </a:xfrm>
+      </p:grpSpPr>
+      <p:sp>
+        <p:nvSpPr>
+          <p:cNvPr id="2" name="Titel 1"/>
+          <p:cNvSpPr>
+            <a:spLocks noGrp="1"/>
+          </p:cNvSpPr>
+          <p:nvPr>
+            <p:ph type="title"/>
+          </p:nvPr>
+        </p:nvSpPr>
+        <p:spPr>
+          <a:xfrm>
+            <a:off x="565763" y="107577"/>
+            <a:ext cx="8007257" cy="1653988"/>
+          </a:xfrm>
+        </p:spPr>
+        <p:txBody>
+          <a:bodyPr/>
+          <a:lstStyle/>
+          <a:p>
+            <a:r>
+              <a:rPr lang="de-DE" dirty="0"/>
+              <a:t>UML Klassen </a:t>
+            </a:r>
+            <a:r>
+              <a:rPr lang="de-DE" dirty="0" smtClean="0"/>
+              <a:t>Diagramme</a:t>
+            </a:r>
+            <a:br>
+              <a:rPr lang="de-DE" dirty="0" smtClean="0"/>
+            </a:br>
+            <a:r>
+              <a:rPr lang="de-DE" sz="3200" dirty="0" smtClean="0"/>
+              <a:t>Handlers</a:t>
+            </a:r>
+            <a:endParaRPr lang="de-DE" sz="3200" dirty="0"/>
+          </a:p>
+        </p:txBody>
+      </p:sp>
+      <p:sp>
+        <p:nvSpPr>
+          <p:cNvPr id="4" name="Fußzeilenplatzhalter 3"/>
+          <p:cNvSpPr>
+            <a:spLocks noGrp="1"/>
+          </p:cNvSpPr>
+          <p:nvPr>
+            <p:ph type="ftr" sz="quarter" idx="11"/>
+          </p:nvPr>
+        </p:nvSpPr>
+        <p:spPr/>
+        <p:txBody>
+          <a:bodyPr/>
+          <a:lstStyle/>
+          <a:p>
+            <a:r>
+              <a:rPr lang="en-US" smtClean="0"/>
+              <a:t>gfels4 &amp; zannc2</a:t>
+            </a:r>
+            <a:endParaRPr lang="en-US"/>
+          </a:p>
+        </p:txBody>
+      </p:sp>
+      <p:sp>
+        <p:nvSpPr>
+          <p:cNvPr id="5" name="Foliennummernplatzhalter 4"/>
+          <p:cNvSpPr>
+            <a:spLocks noGrp="1"/>
+          </p:cNvSpPr>
+          <p:nvPr>
+            <p:ph type="sldNum" sz="quarter" idx="12"/>
+          </p:nvPr>
+        </p:nvSpPr>
+        <p:spPr/>
+        <p:txBody>
+          <a:bodyPr/>
+          <a:lstStyle/>
+          <a:p>
+            <a:fld id="{D12AA694-00EB-4F4B-AABB-6F50FB178914}" type="slidenum">
+              <a:rPr lang="en-US" smtClean="0"/>
+              <a:t>14</a:t>
+            </a:fld>
+            <a:endParaRPr lang="en-US"/>
+          </a:p>
+        </p:txBody>
+      </p:sp>
+    </p:spTree>
+    <p:extLst>
+      <p:ext uri="{BB962C8B-B14F-4D97-AF65-F5344CB8AC3E}">
+        <p14:creationId xmlns:p14="http://schemas.microsoft.com/office/powerpoint/2010/main" val="3971977397"/>
+      </p:ext>
+    </p:extLst>
+  </p:cSld>
+  <p:clrMapOvr>
+    <a:masterClrMapping/>
+  </p:clrMapOvr>
+  <p:timing>
+    <p:tnLst>
+      <p:par>
+        <p:cTn xmlns:p14="http://schemas.microsoft.com/office/powerpoint/2010/main" id="1" dur="indefinite" restart="never" nodeType="tmRoot"/>
+      </p:par>
+    </p:tnLst>
+  </p:timing>
+</p:sld>
+</file>
+
+<file path=ppt/slides/slide15.xml><?xml version="1.0" encoding="utf-8"?>
+<p:sld xmlns:a="http://schemas.openxmlformats.org/drawingml/2006/main" xmlns:r="http://schemas.openxmlformats.org/officeDocument/2006/relationships" xmlns:p="http://schemas.openxmlformats.org/presentationml/2006/main">
+  <p:cSld>
+    <p:spTree>
+      <p:nvGrpSpPr>
+        <p:cNvPr id="1" name=""/>
+        <p:cNvGrpSpPr/>
+        <p:nvPr/>
+      </p:nvGrpSpPr>
+      <p:grpSpPr>
+        <a:xfrm>
+          <a:off x="0" y="0"/>
+          <a:ext cx="0" cy="0"/>
+          <a:chOff x="0" y="0"/>
+          <a:chExt cx="0" cy="0"/>
+        </a:xfrm>
+      </p:grpSpPr>
+      <p:sp>
+        <p:nvSpPr>
+          <p:cNvPr id="2" name="Titel 1"/>
+          <p:cNvSpPr>
+            <a:spLocks noGrp="1"/>
+          </p:cNvSpPr>
+          <p:nvPr>
+            <p:ph type="title"/>
+          </p:nvPr>
+        </p:nvSpPr>
+        <p:spPr>
+          <a:xfrm>
+            <a:off x="565763" y="107577"/>
+            <a:ext cx="8007257" cy="1653988"/>
+          </a:xfrm>
+        </p:spPr>
+        <p:txBody>
+          <a:bodyPr/>
+          <a:lstStyle/>
+          <a:p>
+            <a:r>
+              <a:rPr lang="de-DE" dirty="0"/>
+              <a:t>UML Klassen </a:t>
+            </a:r>
+            <a:r>
+              <a:rPr lang="de-DE" dirty="0" smtClean="0"/>
+              <a:t>Diagramme</a:t>
+            </a:r>
+            <a:br>
+              <a:rPr lang="de-DE" dirty="0" smtClean="0"/>
+            </a:br>
+            <a:r>
+              <a:rPr lang="de-DE" sz="3200" dirty="0" smtClean="0"/>
+              <a:t>State</a:t>
+            </a:r>
+            <a:endParaRPr lang="de-DE" sz="3200" dirty="0"/>
+          </a:p>
+        </p:txBody>
+      </p:sp>
+      <p:sp>
+        <p:nvSpPr>
+          <p:cNvPr id="4" name="Fußzeilenplatzhalter 3"/>
+          <p:cNvSpPr>
+            <a:spLocks noGrp="1"/>
+          </p:cNvSpPr>
+          <p:nvPr>
+            <p:ph type="ftr" sz="quarter" idx="11"/>
+          </p:nvPr>
+        </p:nvSpPr>
+        <p:spPr/>
+        <p:txBody>
+          <a:bodyPr/>
+          <a:lstStyle/>
+          <a:p>
+            <a:r>
+              <a:rPr lang="en-US" smtClean="0"/>
+              <a:t>gfels4 &amp; zannc2</a:t>
+            </a:r>
+            <a:endParaRPr lang="en-US"/>
+          </a:p>
+        </p:txBody>
+      </p:sp>
+      <p:sp>
+        <p:nvSpPr>
+          <p:cNvPr id="5" name="Foliennummernplatzhalter 4"/>
+          <p:cNvSpPr>
+            <a:spLocks noGrp="1"/>
+          </p:cNvSpPr>
+          <p:nvPr>
+            <p:ph type="sldNum" sz="quarter" idx="12"/>
+          </p:nvPr>
+        </p:nvSpPr>
+        <p:spPr/>
+        <p:txBody>
+          <a:bodyPr/>
+          <a:lstStyle/>
+          <a:p>
+            <a:fld id="{D12AA694-00EB-4F4B-AABB-6F50FB178914}" type="slidenum">
+              <a:rPr lang="en-US" smtClean="0"/>
+              <a:t>15</a:t>
+            </a:fld>
+            <a:endParaRPr lang="en-US"/>
+          </a:p>
+        </p:txBody>
+      </p:sp>
+      <p:pic>
+        <p:nvPicPr>
+          <p:cNvPr id="3" name="Bild 2" descr="StateDiagramm.jpg"/>
+          <p:cNvPicPr>
+            <a:picLocks noChangeAspect="1"/>
+          </p:cNvPicPr>
+          <p:nvPr/>
+        </p:nvPicPr>
+        <p:blipFill rotWithShape="1">
+          <a:blip r:embed="rId3">
+            <a:extLst>
+              <a:ext uri="{28A0092B-C50C-407E-A947-70E740481C1C}">
+                <a14:useLocalDpi xmlns:a14="http://schemas.microsoft.com/office/drawing/2010/main" val="0"/>
+              </a:ext>
+            </a:extLst>
+          </a:blip>
+          <a:srcRect l="3872" t="10752" r="12753" b="15418"/>
+          <a:stretch/>
+        </p:blipFill>
+        <p:spPr>
+          <a:xfrm>
+            <a:off x="1141128" y="1641320"/>
+            <a:ext cx="7194911" cy="4747590"/>
+          </a:xfrm>
+          <a:prstGeom prst="rect">
+            <a:avLst/>
+          </a:prstGeom>
+        </p:spPr>
+      </p:pic>
+    </p:spTree>
+    <p:extLst>
+      <p:ext uri="{BB962C8B-B14F-4D97-AF65-F5344CB8AC3E}">
+        <p14:creationId xmlns:p14="http://schemas.microsoft.com/office/powerpoint/2010/main" val="1542750506"/>
+      </p:ext>
+    </p:extLst>
+  </p:cSld>
+  <p:clrMapOvr>
+    <a:masterClrMapping/>
+  </p:clrMapOvr>
+  <p:timing>
+    <p:tnLst>
+      <p:par>
+        <p:cTn xmlns:p14="http://schemas.microsoft.com/office/powerpoint/2010/main" id="1" dur="indefinite" restart="never" nodeType="tmRoot"/>
+      </p:par>
+    </p:tnLst>
+  </p:timing>
+</p:sld>
+</file>
+
+<file path=ppt/slides/slide16.xml><?xml version="1.0" encoding="utf-8"?>
+<p:sld xmlns:a="http://schemas.openxmlformats.org/drawingml/2006/main" xmlns:r="http://schemas.openxmlformats.org/officeDocument/2006/relationships" xmlns:p="http://schemas.openxmlformats.org/presentationml/2006/main">
+  <p:cSld>
+    <p:spTree>
+      <p:nvGrpSpPr>
+        <p:cNvPr id="1" name=""/>
+        <p:cNvGrpSpPr/>
+        <p:nvPr/>
+      </p:nvGrpSpPr>
+      <p:grpSpPr>
+        <a:xfrm>
+          <a:off x="0" y="0"/>
+          <a:ext cx="0" cy="0"/>
+          <a:chOff x="0" y="0"/>
+          <a:chExt cx="0" cy="0"/>
+        </a:xfrm>
+      </p:grpSpPr>
+      <p:sp>
+        <p:nvSpPr>
+          <p:cNvPr id="2" name="Titel 1"/>
+          <p:cNvSpPr>
+            <a:spLocks noGrp="1"/>
+          </p:cNvSpPr>
+          <p:nvPr>
+            <p:ph type="title"/>
+          </p:nvPr>
+        </p:nvSpPr>
+        <p:spPr>
+          <a:xfrm>
+            <a:off x="565763" y="107577"/>
+            <a:ext cx="8007257" cy="1653988"/>
+          </a:xfrm>
+        </p:spPr>
+        <p:txBody>
+          <a:bodyPr/>
+          <a:lstStyle/>
+          <a:p>
+            <a:r>
+              <a:rPr lang="de-DE" dirty="0"/>
+              <a:t>UML Klassen </a:t>
+            </a:r>
+            <a:r>
+              <a:rPr lang="de-DE" dirty="0" smtClean="0"/>
+              <a:t>Diagramme</a:t>
+            </a:r>
+            <a:br>
+              <a:rPr lang="de-DE" dirty="0" smtClean="0"/>
+            </a:br>
+            <a:r>
+              <a:rPr lang="de-DE" sz="3200" dirty="0" smtClean="0"/>
+              <a:t>State</a:t>
+            </a:r>
+            <a:endParaRPr lang="de-DE" sz="3200" dirty="0"/>
+          </a:p>
+        </p:txBody>
+      </p:sp>
+      <p:sp>
+        <p:nvSpPr>
+          <p:cNvPr id="4" name="Fußzeilenplatzhalter 3"/>
+          <p:cNvSpPr>
+            <a:spLocks noGrp="1"/>
+          </p:cNvSpPr>
+          <p:nvPr>
+            <p:ph type="ftr" sz="quarter" idx="11"/>
+          </p:nvPr>
+        </p:nvSpPr>
+        <p:spPr/>
+        <p:txBody>
+          <a:bodyPr/>
+          <a:lstStyle/>
+          <a:p>
+            <a:r>
+              <a:rPr lang="en-US" smtClean="0"/>
+              <a:t>gfels4 &amp; zannc2</a:t>
+            </a:r>
+            <a:endParaRPr lang="en-US"/>
+          </a:p>
+        </p:txBody>
+      </p:sp>
+      <p:sp>
+        <p:nvSpPr>
+          <p:cNvPr id="5" name="Foliennummernplatzhalter 4"/>
+          <p:cNvSpPr>
+            <a:spLocks noGrp="1"/>
+          </p:cNvSpPr>
+          <p:nvPr>
+            <p:ph type="sldNum" sz="quarter" idx="12"/>
+          </p:nvPr>
+        </p:nvSpPr>
+        <p:spPr/>
+        <p:txBody>
+          <a:bodyPr/>
+          <a:lstStyle/>
+          <a:p>
+            <a:fld id="{D12AA694-00EB-4F4B-AABB-6F50FB178914}" type="slidenum">
+              <a:rPr lang="en-US" smtClean="0"/>
+              <a:t>16</a:t>
+            </a:fld>
+            <a:endParaRPr lang="en-US"/>
+          </a:p>
+        </p:txBody>
+      </p:sp>
+      <p:pic>
+        <p:nvPicPr>
+          <p:cNvPr id="6" name="Bild 5" descr="uml_diagramm_state.jpg"/>
+          <p:cNvPicPr>
+            <a:picLocks noChangeAspect="1"/>
+          </p:cNvPicPr>
+          <p:nvPr/>
+        </p:nvPicPr>
+        <p:blipFill>
+          <a:blip r:embed="rId3">
+            <a:extLst>
+              <a:ext uri="{28A0092B-C50C-407E-A947-70E740481C1C}">
+                <a14:useLocalDpi xmlns:a14="http://schemas.microsoft.com/office/drawing/2010/main" val="0"/>
+              </a:ext>
+            </a:extLst>
+          </a:blip>
+          <a:stretch>
+            <a:fillRect/>
+          </a:stretch>
+        </p:blipFill>
+        <p:spPr>
+          <a:xfrm>
+            <a:off x="1439456" y="1585548"/>
+            <a:ext cx="6024091" cy="5272451"/>
+          </a:xfrm>
+          <a:prstGeom prst="rect">
+            <a:avLst/>
+          </a:prstGeom>
+        </p:spPr>
+      </p:pic>
+    </p:spTree>
+    <p:extLst>
+      <p:ext uri="{BB962C8B-B14F-4D97-AF65-F5344CB8AC3E}">
+        <p14:creationId xmlns:p14="http://schemas.microsoft.com/office/powerpoint/2010/main" val="3304946398"/>
+      </p:ext>
+    </p:extLst>
+  </p:cSld>
+  <p:clrMapOvr>
+    <a:masterClrMapping/>
+  </p:clrMapOvr>
+  <p:timing>
+    <p:tnLst>
+      <p:par>
+        <p:cTn xmlns:p14="http://schemas.microsoft.com/office/powerpoint/2010/main" id="1" dur="indefinite" restart="never" nodeType="tmRoot"/>
+      </p:par>
+    </p:tnLst>
+  </p:timing>
+</p:sld>
+</file>
+
+<file path=ppt/slides/slide17.xml><?xml version="1.0" encoding="utf-8"?>
+<p:sld xmlns:a="http://schemas.openxmlformats.org/drawingml/2006/main" xmlns:r="http://schemas.openxmlformats.org/officeDocument/2006/relationships" xmlns:p="http://schemas.openxmlformats.org/presentationml/2006/main">
+  <p:cSld>
+    <p:spTree>
+      <p:nvGrpSpPr>
+        <p:cNvPr id="1" name=""/>
+        <p:cNvGrpSpPr/>
+        <p:nvPr/>
+      </p:nvGrpSpPr>
+      <p:grpSpPr>
+        <a:xfrm>
+          <a:off x="0" y="0"/>
+          <a:ext cx="0" cy="0"/>
+          <a:chOff x="0" y="0"/>
+          <a:chExt cx="0" cy="0"/>
+        </a:xfrm>
+      </p:grpSpPr>
+      <p:sp>
+        <p:nvSpPr>
+          <p:cNvPr id="2" name="Titel 1"/>
+          <p:cNvSpPr>
+            <a:spLocks noGrp="1"/>
+          </p:cNvSpPr>
+          <p:nvPr>
+            <p:ph type="title"/>
+          </p:nvPr>
+        </p:nvSpPr>
+        <p:spPr/>
+        <p:txBody>
+          <a:bodyPr/>
+          <a:lstStyle/>
+          <a:p>
+            <a:r>
+              <a:rPr lang="de-DE" dirty="0" smtClean="0"/>
+              <a:t>Robot</a:t>
+            </a:r>
+            <a:endParaRPr lang="de-DE" dirty="0"/>
+          </a:p>
+        </p:txBody>
+      </p:sp>
+      <p:sp>
+        <p:nvSpPr>
+          <p:cNvPr id="3" name="Inhaltsplatzhalter 2"/>
+          <p:cNvSpPr>
+            <a:spLocks noGrp="1"/>
+          </p:cNvSpPr>
+          <p:nvPr>
+            <p:ph idx="1"/>
+          </p:nvPr>
+        </p:nvSpPr>
+        <p:spPr/>
+        <p:txBody>
+          <a:bodyPr/>
+          <a:lstStyle/>
+          <a:p>
+            <a:r>
+              <a:rPr lang="de-DE" dirty="0"/>
+              <a:t>Domain Mode</a:t>
+            </a:r>
+          </a:p>
+          <a:p>
+            <a:r>
+              <a:rPr lang="de-DE" dirty="0" err="1"/>
+              <a:t>Use</a:t>
+            </a:r>
+            <a:r>
+              <a:rPr lang="de-DE" dirty="0"/>
+              <a:t> Cases</a:t>
+            </a:r>
+          </a:p>
+          <a:p>
+            <a:r>
+              <a:rPr lang="de-DE" dirty="0" err="1"/>
+              <a:t>Sequence</a:t>
+            </a:r>
+            <a:r>
+              <a:rPr lang="de-DE" dirty="0"/>
+              <a:t> Diagramme</a:t>
+            </a:r>
+          </a:p>
+          <a:p>
+            <a:r>
+              <a:rPr lang="de-DE" dirty="0"/>
+              <a:t>UML Klassen Diagramme</a:t>
+            </a:r>
+          </a:p>
+          <a:p>
+            <a:pPr marL="0" indent="0">
+              <a:buNone/>
+            </a:pPr>
+            <a:endParaRPr lang="de-DE" dirty="0"/>
+          </a:p>
+        </p:txBody>
+      </p:sp>
+      <p:sp>
+        <p:nvSpPr>
+          <p:cNvPr id="6" name="Foliennummernplatzhalter 5"/>
+          <p:cNvSpPr>
+            <a:spLocks noGrp="1"/>
+          </p:cNvSpPr>
+          <p:nvPr>
+            <p:ph type="sldNum" sz="quarter" idx="12"/>
+          </p:nvPr>
+        </p:nvSpPr>
+        <p:spPr/>
+        <p:txBody>
+          <a:bodyPr/>
+          <a:lstStyle/>
+          <a:p>
+            <a:fld id="{D12AA694-00EB-4F4B-AABB-6F50FB178914}" type="slidenum">
+              <a:rPr lang="en-US" smtClean="0"/>
+              <a:t>17</a:t>
+            </a:fld>
+            <a:endParaRPr lang="en-US"/>
+          </a:p>
+        </p:txBody>
+      </p:sp>
+      <p:sp>
+        <p:nvSpPr>
+          <p:cNvPr id="7" name="Fußzeilenplatzhalter 6"/>
+          <p:cNvSpPr>
+            <a:spLocks noGrp="1"/>
+          </p:cNvSpPr>
+          <p:nvPr>
+            <p:ph type="ftr" sz="quarter" idx="11"/>
+          </p:nvPr>
+        </p:nvSpPr>
+        <p:spPr/>
+        <p:txBody>
+          <a:bodyPr/>
+          <a:lstStyle/>
+          <a:p>
+            <a:r>
+              <a:rPr lang="en-US" smtClean="0"/>
+              <a:t>gfels4 &amp; zannc2</a:t>
+            </a:r>
+            <a:endParaRPr lang="en-US"/>
+          </a:p>
+        </p:txBody>
+      </p:sp>
+    </p:spTree>
+    <p:extLst>
+      <p:ext uri="{BB962C8B-B14F-4D97-AF65-F5344CB8AC3E}">
+        <p14:creationId xmlns:p14="http://schemas.microsoft.com/office/powerpoint/2010/main" val="3514780789"/>
+      </p:ext>
+    </p:extLst>
+  </p:cSld>
+  <p:clrMapOvr>
+    <a:masterClrMapping/>
+  </p:clrMapOvr>
+  <p:timing>
+    <p:tnLst>
+      <p:par>
+        <p:cTn xmlns:p14="http://schemas.microsoft.com/office/powerpoint/2010/main" id="1" dur="indefinite" restart="never" nodeType="tmRoot"/>
+      </p:par>
+    </p:tnLst>
+  </p:timing>
+</p:sld>
+</file>
+
+<file path=ppt/slides/slide18.xml><?xml version="1.0" encoding="utf-8"?>
+<p:sld xmlns:a="http://schemas.openxmlformats.org/drawingml/2006/main" xmlns:r="http://schemas.openxmlformats.org/officeDocument/2006/relationships" xmlns:p="http://schemas.openxmlformats.org/presentationml/2006/main">
+  <p:cSld>
+    <p:spTree>
+      <p:nvGrpSpPr>
+        <p:cNvPr id="1" name=""/>
+        <p:cNvGrpSpPr/>
+        <p:nvPr/>
+      </p:nvGrpSpPr>
+      <p:grpSpPr>
+        <a:xfrm>
+          <a:off x="0" y="0"/>
+          <a:ext cx="0" cy="0"/>
+          <a:chOff x="0" y="0"/>
+          <a:chExt cx="0" cy="0"/>
+        </a:xfrm>
+      </p:grpSpPr>
+      <p:sp>
+        <p:nvSpPr>
+          <p:cNvPr id="2" name="Titel 1"/>
+          <p:cNvSpPr>
+            <a:spLocks noGrp="1"/>
+          </p:cNvSpPr>
+          <p:nvPr>
+            <p:ph type="title"/>
+          </p:nvPr>
+        </p:nvSpPr>
+        <p:spPr>
+          <a:xfrm>
+            <a:off x="565763" y="107577"/>
+            <a:ext cx="8007257" cy="1653988"/>
+          </a:xfrm>
+        </p:spPr>
+        <p:txBody>
+          <a:bodyPr/>
+          <a:lstStyle/>
+          <a:p>
+            <a:r>
+              <a:rPr lang="de-DE" dirty="0"/>
+              <a:t>UML Klassen </a:t>
+            </a:r>
+            <a:r>
+              <a:rPr lang="de-DE" dirty="0" smtClean="0"/>
+              <a:t>Diagramme</a:t>
+            </a:r>
+            <a:br>
+              <a:rPr lang="de-DE" dirty="0" smtClean="0"/>
+            </a:br>
+            <a:r>
+              <a:rPr lang="de-DE" sz="3200" dirty="0" smtClean="0"/>
+              <a:t>Strategie</a:t>
+            </a:r>
+            <a:endParaRPr lang="de-DE" sz="3200" dirty="0"/>
+          </a:p>
+        </p:txBody>
+      </p:sp>
+      <p:sp>
+        <p:nvSpPr>
+          <p:cNvPr id="4" name="Fußzeilenplatzhalter 3"/>
+          <p:cNvSpPr>
+            <a:spLocks noGrp="1"/>
+          </p:cNvSpPr>
+          <p:nvPr>
+            <p:ph type="ftr" sz="quarter" idx="11"/>
+          </p:nvPr>
+        </p:nvSpPr>
+        <p:spPr/>
+        <p:txBody>
+          <a:bodyPr/>
+          <a:lstStyle/>
+          <a:p>
+            <a:r>
+              <a:rPr lang="en-US" smtClean="0"/>
+              <a:t>gfels4 &amp; zannc2</a:t>
+            </a:r>
+            <a:endParaRPr lang="en-US"/>
+          </a:p>
+        </p:txBody>
+      </p:sp>
+      <p:sp>
+        <p:nvSpPr>
+          <p:cNvPr id="5" name="Foliennummernplatzhalter 4"/>
+          <p:cNvSpPr>
+            <a:spLocks noGrp="1"/>
+          </p:cNvSpPr>
+          <p:nvPr>
+            <p:ph type="sldNum" sz="quarter" idx="12"/>
+          </p:nvPr>
+        </p:nvSpPr>
+        <p:spPr/>
+        <p:txBody>
+          <a:bodyPr/>
+          <a:lstStyle/>
+          <a:p>
+            <a:fld id="{D12AA694-00EB-4F4B-AABB-6F50FB178914}" type="slidenum">
+              <a:rPr lang="en-US" smtClean="0"/>
+              <a:t>18</a:t>
+            </a:fld>
+            <a:endParaRPr lang="en-US"/>
+          </a:p>
+        </p:txBody>
+      </p:sp>
+      <p:pic>
+        <p:nvPicPr>
+          <p:cNvPr id="7" name="Bild 6" descr="uml_diagramm_strategy.jpg"/>
+          <p:cNvPicPr>
+            <a:picLocks noChangeAspect="1"/>
+          </p:cNvPicPr>
+          <p:nvPr/>
+        </p:nvPicPr>
+        <p:blipFill>
+          <a:blip r:embed="rId3">
+            <a:extLst>
+              <a:ext uri="{28A0092B-C50C-407E-A947-70E740481C1C}">
+                <a14:useLocalDpi xmlns:a14="http://schemas.microsoft.com/office/drawing/2010/main" val="0"/>
+              </a:ext>
+            </a:extLst>
+          </a:blip>
+          <a:stretch>
+            <a:fillRect/>
+          </a:stretch>
+        </p:blipFill>
+        <p:spPr>
+          <a:xfrm>
+            <a:off x="1579290" y="1628842"/>
+            <a:ext cx="6089216" cy="5229157"/>
+          </a:xfrm>
+          <a:prstGeom prst="rect">
+            <a:avLst/>
+          </a:prstGeom>
+        </p:spPr>
+      </p:pic>
+    </p:spTree>
+    <p:extLst>
+      <p:ext uri="{BB962C8B-B14F-4D97-AF65-F5344CB8AC3E}">
+        <p14:creationId xmlns:p14="http://schemas.microsoft.com/office/powerpoint/2010/main" val="3750446629"/>
+      </p:ext>
+    </p:extLst>
+  </p:cSld>
+  <p:clrMapOvr>
+    <a:masterClrMapping/>
+  </p:clrMapOvr>
+  <p:timing>
+    <p:tnLst>
+      <p:par>
+        <p:cTn xmlns:p14="http://schemas.microsoft.com/office/powerpoint/2010/main" id="1" dur="indefinite" restart="never" nodeType="tmRoot"/>
+      </p:par>
+    </p:tnLst>
+  </p:timing>
+</p:sld>
+</file>
+
+<file path=ppt/slides/slide19.xml><?xml version="1.0" encoding="utf-8"?>
+<p:sld xmlns:a="http://schemas.openxmlformats.org/drawingml/2006/main" xmlns:r="http://schemas.openxmlformats.org/officeDocument/2006/relationships" xmlns:p="http://schemas.openxmlformats.org/presentationml/2006/main">
+  <p:cSld>
+    <p:spTree>
+      <p:nvGrpSpPr>
+        <p:cNvPr id="1" name=""/>
+        <p:cNvGrpSpPr/>
+        <p:nvPr/>
+      </p:nvGrpSpPr>
+      <p:grpSpPr>
+        <a:xfrm>
+          <a:off x="0" y="0"/>
+          <a:ext cx="0" cy="0"/>
+          <a:chOff x="0" y="0"/>
+          <a:chExt cx="0" cy="0"/>
+        </a:xfrm>
+      </p:grpSpPr>
+      <p:sp>
+        <p:nvSpPr>
+          <p:cNvPr id="2" name="Titel 1"/>
+          <p:cNvSpPr>
+            <a:spLocks noGrp="1"/>
+          </p:cNvSpPr>
+          <p:nvPr>
+            <p:ph type="title"/>
+          </p:nvPr>
+        </p:nvSpPr>
+        <p:spPr/>
+        <p:txBody>
+          <a:bodyPr/>
+          <a:lstStyle/>
+          <a:p>
+            <a:r>
+              <a:rPr lang="de-DE" dirty="0" smtClean="0"/>
+              <a:t>Vorführung</a:t>
+            </a:r>
+            <a:endParaRPr lang="de-DE" dirty="0"/>
+          </a:p>
+        </p:txBody>
+      </p:sp>
+      <p:sp>
+        <p:nvSpPr>
+          <p:cNvPr id="3" name="Inhaltsplatzhalter 2"/>
+          <p:cNvSpPr>
+            <a:spLocks noGrp="1"/>
+          </p:cNvSpPr>
+          <p:nvPr>
+            <p:ph idx="1"/>
+          </p:nvPr>
+        </p:nvSpPr>
+        <p:spPr/>
+        <p:txBody>
+          <a:bodyPr/>
+          <a:lstStyle/>
+          <a:p>
+            <a:endParaRPr lang="de-DE"/>
+          </a:p>
+        </p:txBody>
+      </p:sp>
+      <p:sp>
+        <p:nvSpPr>
+          <p:cNvPr id="6" name="Foliennummernplatzhalter 5"/>
+          <p:cNvSpPr>
+            <a:spLocks noGrp="1"/>
+          </p:cNvSpPr>
+          <p:nvPr>
+            <p:ph type="sldNum" sz="quarter" idx="12"/>
+          </p:nvPr>
+        </p:nvSpPr>
+        <p:spPr/>
+        <p:txBody>
+          <a:bodyPr/>
+          <a:lstStyle/>
+          <a:p>
+            <a:fld id="{D12AA694-00EB-4F4B-AABB-6F50FB178914}" type="slidenum">
+              <a:rPr lang="en-US" smtClean="0"/>
+              <a:t>19</a:t>
             </a:fld>
             <a:endParaRPr lang="en-US"/>
           </a:p>
@@ -5944,7 +7498,6 @@
               <a:rPr lang="de-DE" dirty="0" smtClean="0"/>
               <a:t>Zeitplan</a:t>
             </a:r>
-            <a:endParaRPr lang="de-DE" dirty="0" smtClean="0"/>
           </a:p>
           <a:p>
             <a:r>

</xml_diff>

<commit_message>
Präsentation Strategie und diverse Kommentare
</commit_message>
<xml_diff>
--- a/SearchRobot/doc/presentation.pptx
+++ b/SearchRobot/doc/presentation.pptx
@@ -700,13 +700,7 @@
               <a:rPr lang="de-DE" dirty="0" smtClean="0"/>
               <a:t>Aufgabenstellung Robot erwähnen (Einleitung)</a:t>
             </a:r>
-          </a:p>
-          <a:p>
-            <a:r>
-              <a:rPr lang="de-DE" dirty="0" smtClean="0"/>
-              <a:t>Teilung Frontend/Robot</a:t>
-            </a:r>
-            <a:endParaRPr lang="de-DE" dirty="0"/>
+            <a:endParaRPr lang="de-DE" dirty="0" smtClean="0"/>
           </a:p>
         </p:txBody>
       </p:sp>
@@ -727,7 +721,7 @@
           <a:p>
             <a:fld id="{6A2CFF65-CB9C-5A47-B7DE-47882B59B3DA}" type="slidenum">
               <a:rPr lang="de-DE" smtClean="0"/>
-              <a:t>2</a:t>
+              <a:t>1</a:t>
             </a:fld>
             <a:endParaRPr lang="de-DE"/>
           </a:p>
@@ -736,7 +730,7 @@
     </p:spTree>
     <p:extLst>
       <p:ext uri="{BB962C8B-B14F-4D97-AF65-F5344CB8AC3E}">
-        <p14:creationId xmlns:p14="http://schemas.microsoft.com/office/powerpoint/2010/main" val="1841319628"/>
+        <p14:creationId xmlns:p14="http://schemas.microsoft.com/office/powerpoint/2010/main" val="1423677949"/>
       </p:ext>
     </p:extLst>
   </p:cSld>
@@ -790,6 +784,44 @@
           <a:bodyPr/>
           <a:lstStyle/>
           <a:p>
+            <a:r>
+              <a:rPr lang="de-DE" dirty="0" smtClean="0"/>
+              <a:t>Design Pattern: Observer</a:t>
+            </a:r>
+          </a:p>
+          <a:p>
+            <a:r>
+              <a:rPr lang="de-DE" dirty="0" smtClean="0"/>
+              <a:t>Jedes Item besitz</a:t>
+            </a:r>
+            <a:r>
+              <a:rPr lang="de-DE" baseline="0" dirty="0" smtClean="0"/>
+              <a:t> mehrere </a:t>
+            </a:r>
+            <a:r>
+              <a:rPr lang="de-DE" baseline="0" dirty="0" err="1" smtClean="0"/>
+              <a:t>ItemChangedListeners</a:t>
+            </a:r>
+            <a:r>
+              <a:rPr lang="de-DE" baseline="0" dirty="0" smtClean="0"/>
+              <a:t> (Observer), dieser gibt eine Änderung (durch </a:t>
+            </a:r>
+            <a:r>
+              <a:rPr lang="de-DE" baseline="0" dirty="0" err="1" smtClean="0"/>
+              <a:t>notify</a:t>
+            </a:r>
+            <a:r>
+              <a:rPr lang="de-DE" baseline="0" dirty="0" smtClean="0"/>
+              <a:t> ausgelöst) des Items weiter an das Field und löst bspw. Ein </a:t>
+            </a:r>
+            <a:r>
+              <a:rPr lang="de-DE" baseline="0" dirty="0" err="1" smtClean="0"/>
+              <a:t>repaint</a:t>
+            </a:r>
+            <a:r>
+              <a:rPr lang="de-DE" baseline="0" dirty="0" smtClean="0"/>
+              <a:t> aus. </a:t>
+            </a:r>
             <a:endParaRPr lang="de-DE" dirty="0"/>
           </a:p>
         </p:txBody>
@@ -811,7 +843,7 @@
           <a:p>
             <a:fld id="{6A2CFF65-CB9C-5A47-B7DE-47882B59B3DA}" type="slidenum">
               <a:rPr lang="de-DE" smtClean="0"/>
-              <a:t>14</a:t>
+              <a:t>12</a:t>
             </a:fld>
             <a:endParaRPr lang="de-DE"/>
           </a:p>
@@ -874,6 +906,36 @@
           <a:bodyPr/>
           <a:lstStyle/>
           <a:p>
+            <a:r>
+              <a:rPr lang="de-DE" dirty="0" smtClean="0"/>
+              <a:t>Design Pattern: Observer</a:t>
+            </a:r>
+          </a:p>
+          <a:p>
+            <a:r>
+              <a:rPr lang="de-DE" dirty="0" smtClean="0"/>
+              <a:t>Das Field ein</a:t>
+            </a:r>
+            <a:r>
+              <a:rPr lang="de-DE" baseline="0" dirty="0" smtClean="0"/>
+              <a:t> </a:t>
+            </a:r>
+            <a:r>
+              <a:rPr lang="de-DE" baseline="0" dirty="0" err="1" smtClean="0"/>
+              <a:t>FieldChangedListener</a:t>
+            </a:r>
+            <a:r>
+              <a:rPr lang="de-DE" baseline="0" dirty="0" smtClean="0"/>
+              <a:t> (Observer), dieser gibt Änderungen (durch </a:t>
+            </a:r>
+            <a:r>
+              <a:rPr lang="de-DE" baseline="0" dirty="0" err="1" smtClean="0"/>
+              <a:t>notify</a:t>
+            </a:r>
+            <a:r>
+              <a:rPr lang="de-DE" baseline="0" dirty="0" smtClean="0"/>
+              <a:t> im Field aufgelöst) weiter an die View und löst bspw. Ein Repaint aus. </a:t>
+            </a:r>
             <a:endParaRPr lang="de-DE" dirty="0"/>
           </a:p>
         </p:txBody>
@@ -895,7 +957,7 @@
           <a:p>
             <a:fld id="{6A2CFF65-CB9C-5A47-B7DE-47882B59B3DA}" type="slidenum">
               <a:rPr lang="de-DE" smtClean="0"/>
-              <a:t>15</a:t>
+              <a:t>13</a:t>
             </a:fld>
             <a:endParaRPr lang="de-DE"/>
           </a:p>
@@ -958,41 +1020,7 @@
           <a:bodyPr/>
           <a:lstStyle/>
           <a:p>
-            <a:r>
-              <a:rPr lang="de-DE" b="1" dirty="0" smtClean="0"/>
-              <a:t>Ziel suchen:</a:t>
-            </a:r>
-          </a:p>
-          <a:p>
-            <a:pPr marL="0" marR="0" indent="0" algn="l" defTabSz="457200" rtl="0" eaLnBrk="1" fontAlgn="auto" latinLnBrk="0" hangingPunct="1">
-              <a:lnSpc>
-                <a:spcPct val="100000"/>
-              </a:lnSpc>
-              <a:spcBef>
-                <a:spcPts val="0"/>
-              </a:spcBef>
-              <a:spcAft>
-                <a:spcPts val="0"/>
-              </a:spcAft>
-              <a:buClrTx/>
-              <a:buSzTx/>
-              <a:buFontTx/>
-              <a:buNone/>
-              <a:tabLst/>
-              <a:defRPr/>
-            </a:pPr>
-            <a:r>
-              <a:rPr lang="de-DE" sz="1200" kern="1200" dirty="0" smtClean="0">
-                <a:solidFill>
-                  <a:schemeClr val="tx1"/>
-                </a:solidFill>
-                <a:effectLst/>
-                <a:latin typeface="+mn-lt"/>
-                <a:ea typeface="+mn-ea"/>
-                <a:cs typeface="+mn-cs"/>
-              </a:rPr>
-              <a:t>Der Roboter sucht nach einem bestimmten Algorithmus das Spielfeld ab, d.h. Er kann sich fortbewegen, jeweils -90° und +90° scannen und die Hindernisse und die Spielrandfläche so erforschen. </a:t>
-            </a:r>
+            <a:endParaRPr lang="de-DE" dirty="0"/>
           </a:p>
         </p:txBody>
       </p:sp>
@@ -1013,7 +1041,7 @@
           <a:p>
             <a:fld id="{6A2CFF65-CB9C-5A47-B7DE-47882B59B3DA}" type="slidenum">
               <a:rPr lang="de-DE" smtClean="0"/>
-              <a:t>17</a:t>
+              <a:t>14</a:t>
             </a:fld>
             <a:endParaRPr lang="de-DE"/>
           </a:p>
@@ -1022,7 +1050,7 @@
     </p:spTree>
     <p:extLst>
       <p:ext uri="{BB962C8B-B14F-4D97-AF65-F5344CB8AC3E}">
-        <p14:creationId xmlns:p14="http://schemas.microsoft.com/office/powerpoint/2010/main" val="4154515398"/>
+        <p14:creationId xmlns:p14="http://schemas.microsoft.com/office/powerpoint/2010/main" val="660173880"/>
       </p:ext>
     </p:extLst>
   </p:cSld>
@@ -1076,7 +1104,75 @@
           <a:bodyPr/>
           <a:lstStyle/>
           <a:p>
-            <a:endParaRPr lang="de-DE" dirty="0" smtClean="0"/>
+            <a:r>
+              <a:rPr lang="de-DE" dirty="0" smtClean="0"/>
+              <a:t>State Pattern</a:t>
+            </a:r>
+          </a:p>
+          <a:p>
+            <a:r>
+              <a:rPr lang="de-DE" dirty="0" smtClean="0"/>
+              <a:t>Die States geben alle</a:t>
+            </a:r>
+            <a:r>
+              <a:rPr lang="de-DE" baseline="0" dirty="0" smtClean="0"/>
+              <a:t> Aktivitäten weiter an das </a:t>
+            </a:r>
+            <a:r>
+              <a:rPr lang="de-DE" baseline="0" dirty="0" err="1" smtClean="0"/>
+              <a:t>AbstractState</a:t>
+            </a:r>
+            <a:r>
+              <a:rPr lang="de-DE" baseline="0" dirty="0" smtClean="0"/>
+              <a:t> welches </a:t>
+            </a:r>
+            <a:r>
+              <a:rPr lang="de-DE" baseline="0" dirty="0" err="1" smtClean="0"/>
+              <a:t>hanhand</a:t>
+            </a:r>
+            <a:r>
+              <a:rPr lang="de-DE" baseline="0" dirty="0" smtClean="0"/>
+              <a:t> seines </a:t>
+            </a:r>
+            <a:r>
+              <a:rPr lang="de-DE" baseline="0" dirty="0" err="1" smtClean="0"/>
+              <a:t>Context</a:t>
+            </a:r>
+            <a:r>
+              <a:rPr lang="de-DE" baseline="0" dirty="0" smtClean="0"/>
+              <a:t> (</a:t>
+            </a:r>
+            <a:r>
+              <a:rPr lang="de-DE" baseline="0" dirty="0" err="1" smtClean="0"/>
+              <a:t>SelectionTool</a:t>
+            </a:r>
+            <a:r>
+              <a:rPr lang="de-DE" baseline="0" dirty="0" smtClean="0"/>
+              <a:t>) die entsprechenden Funktionen ausführt. </a:t>
+            </a:r>
+          </a:p>
+          <a:p>
+            <a:r>
+              <a:rPr lang="de-DE" baseline="0" dirty="0" smtClean="0"/>
+              <a:t>Das </a:t>
+            </a:r>
+            <a:r>
+              <a:rPr lang="de-DE" baseline="0" dirty="0" err="1" smtClean="0"/>
+              <a:t>Selection</a:t>
+            </a:r>
+            <a:r>
+              <a:rPr lang="de-DE" baseline="0" dirty="0" smtClean="0"/>
+              <a:t> Tool gibt die Aktivitäten weiter an das Field und somit auch direkt an die </a:t>
+            </a:r>
+            <a:r>
+              <a:rPr lang="de-DE" baseline="0" dirty="0" err="1" smtClean="0"/>
+              <a:t>entprechenden</a:t>
+            </a:r>
+            <a:r>
+              <a:rPr lang="de-DE" baseline="0" dirty="0" smtClean="0"/>
+              <a:t> Items.</a:t>
+            </a:r>
+            <a:endParaRPr lang="de-DE" dirty="0"/>
           </a:p>
         </p:txBody>
       </p:sp>
@@ -1097,7 +1193,7 @@
           <a:p>
             <a:fld id="{6A2CFF65-CB9C-5A47-B7DE-47882B59B3DA}" type="slidenum">
               <a:rPr lang="de-DE" smtClean="0"/>
-              <a:t>18</a:t>
+              <a:t>15</a:t>
             </a:fld>
             <a:endParaRPr lang="de-DE"/>
           </a:p>
@@ -1160,7 +1256,41 @@
           <a:bodyPr/>
           <a:lstStyle/>
           <a:p>
-            <a:endParaRPr lang="de-DE" dirty="0" smtClean="0"/>
+            <a:r>
+              <a:rPr lang="de-DE" b="1" dirty="0" smtClean="0"/>
+              <a:t>Ziel suchen:</a:t>
+            </a:r>
+          </a:p>
+          <a:p>
+            <a:pPr marL="0" marR="0" indent="0" algn="l" defTabSz="457200" rtl="0" eaLnBrk="1" fontAlgn="auto" latinLnBrk="0" hangingPunct="1">
+              <a:lnSpc>
+                <a:spcPct val="100000"/>
+              </a:lnSpc>
+              <a:spcBef>
+                <a:spcPts val="0"/>
+              </a:spcBef>
+              <a:spcAft>
+                <a:spcPts val="0"/>
+              </a:spcAft>
+              <a:buClrTx/>
+              <a:buSzTx/>
+              <a:buFontTx/>
+              <a:buNone/>
+              <a:tabLst/>
+              <a:defRPr/>
+            </a:pPr>
+            <a:r>
+              <a:rPr lang="de-DE" sz="1200" kern="1200" dirty="0" smtClean="0">
+                <a:solidFill>
+                  <a:schemeClr val="tx1"/>
+                </a:solidFill>
+                <a:effectLst/>
+                <a:latin typeface="+mn-lt"/>
+                <a:ea typeface="+mn-ea"/>
+                <a:cs typeface="+mn-cs"/>
+              </a:rPr>
+              <a:t>Der Roboter sucht nach einem bestimmten Algorithmus das Spielfeld ab, d.h. Er kann sich fortbewegen, jeweils -90° und +90° scannen und die Hindernisse und die Spielrandfläche so erforschen. </a:t>
+            </a:r>
           </a:p>
         </p:txBody>
       </p:sp>
@@ -1181,7 +1311,7 @@
           <a:p>
             <a:fld id="{6A2CFF65-CB9C-5A47-B7DE-47882B59B3DA}" type="slidenum">
               <a:rPr lang="de-DE" smtClean="0"/>
-              <a:t>19</a:t>
+              <a:t>17</a:t>
             </a:fld>
             <a:endParaRPr lang="de-DE"/>
           </a:p>
@@ -1190,7 +1320,7 @@
     </p:spTree>
     <p:extLst>
       <p:ext uri="{BB962C8B-B14F-4D97-AF65-F5344CB8AC3E}">
-        <p14:creationId xmlns:p14="http://schemas.microsoft.com/office/powerpoint/2010/main" val="660173880"/>
+        <p14:creationId xmlns:p14="http://schemas.microsoft.com/office/powerpoint/2010/main" val="4154515398"/>
       </p:ext>
     </p:extLst>
   </p:cSld>
@@ -1245,8 +1375,46 @@
           <a:lstStyle/>
           <a:p>
             <a:r>
-              <a:rPr lang="de-DE" dirty="0" err="1" smtClean="0"/>
-              <a:t>computePath</a:t>
+              <a:rPr lang="de-DE" dirty="0" smtClean="0"/>
+              <a:t>Die Matrix mit den</a:t>
+            </a:r>
+            <a:r>
+              <a:rPr lang="de-DE" baseline="0" dirty="0" smtClean="0"/>
+              <a:t> bestehenden Items ist vom Roboter nicht erreichbar. </a:t>
+            </a:r>
+          </a:p>
+          <a:p>
+            <a:r>
+              <a:rPr lang="de-DE" baseline="0" dirty="0" smtClean="0"/>
+              <a:t>Der Roboter muss dass Field scannen d.h. jedes </a:t>
+            </a:r>
+            <a:r>
+              <a:rPr lang="de-DE" baseline="0" dirty="0" err="1" smtClean="0"/>
+              <a:t>Grid</a:t>
+            </a:r>
+            <a:r>
+              <a:rPr lang="de-DE" baseline="0" dirty="0" smtClean="0"/>
+              <a:t> einzeln abfragen. Durch die Matrix konnte aber die Geschwindigkeit des Scannens verbessert werden, da nicht </a:t>
+            </a:r>
+            <a:r>
+              <a:rPr lang="de-DE" baseline="0" dirty="0" err="1" smtClean="0"/>
+              <a:t>jedesmal</a:t>
+            </a:r>
+            <a:r>
+              <a:rPr lang="de-DE" baseline="0" dirty="0" smtClean="0"/>
+              <a:t> alle Items durchgecheckt werden müssen. </a:t>
+            </a:r>
+          </a:p>
+          <a:p>
+            <a:r>
+              <a:rPr lang="de-DE" baseline="0" dirty="0" smtClean="0"/>
+              <a:t>Die Roboter Matrix wird jeweils kontinuierlich abgefüllt. Je nach dem was der Roboter bereits entdeckt hat. </a:t>
+            </a:r>
+          </a:p>
+          <a:p>
+            <a:r>
+              <a:rPr lang="de-DE" baseline="0" dirty="0" smtClean="0"/>
+              <a:t>Der Roboter scannt das Feld, indem er jeden Winkel bis zu einem Item oder dem Spielfeldrand abfragt. </a:t>
             </a:r>
             <a:endParaRPr lang="de-DE" dirty="0" smtClean="0"/>
           </a:p>
@@ -1269,7 +1437,7 @@
           <a:p>
             <a:fld id="{6A2CFF65-CB9C-5A47-B7DE-47882B59B3DA}" type="slidenum">
               <a:rPr lang="de-DE" smtClean="0"/>
-              <a:t>20</a:t>
+              <a:t>18</a:t>
             </a:fld>
             <a:endParaRPr lang="de-DE"/>
           </a:p>
@@ -1334,11 +1502,19 @@
           <a:p>
             <a:r>
               <a:rPr lang="de-DE" dirty="0" smtClean="0"/>
-              <a:t>Design Pattern: </a:t>
-            </a:r>
-            <a:r>
-              <a:rPr lang="de-DE" dirty="0" err="1" smtClean="0"/>
-              <a:t>Strategy</a:t>
+              <a:t>Der Roboter dreht sich an jedem neuen Standort 360°,</a:t>
+            </a:r>
+            <a:r>
+              <a:rPr lang="de-DE" baseline="0" dirty="0" smtClean="0"/>
+              <a:t> so dass er jeweils die bestmögliche Fläche </a:t>
+            </a:r>
+            <a:r>
+              <a:rPr lang="de-DE" baseline="0" dirty="0" err="1" smtClean="0"/>
+              <a:t>abscannen</a:t>
+            </a:r>
+            <a:r>
+              <a:rPr lang="de-DE" baseline="0" dirty="0" smtClean="0"/>
+              <a:t> kann. </a:t>
             </a:r>
             <a:endParaRPr lang="de-DE" dirty="0" smtClean="0"/>
           </a:p>
@@ -1361,7 +1537,7 @@
           <a:p>
             <a:fld id="{6A2CFF65-CB9C-5A47-B7DE-47882B59B3DA}" type="slidenum">
               <a:rPr lang="de-DE" smtClean="0"/>
-              <a:t>21</a:t>
+              <a:t>19</a:t>
             </a:fld>
             <a:endParaRPr lang="de-DE"/>
           </a:p>
@@ -1424,7 +1600,11 @@
           <a:bodyPr/>
           <a:lstStyle/>
           <a:p>
-            <a:endParaRPr lang="de-DE"/>
+            <a:r>
+              <a:rPr lang="de-DE" dirty="0" err="1" smtClean="0"/>
+              <a:t>computePath</a:t>
+            </a:r>
+            <a:endParaRPr lang="de-DE" dirty="0" smtClean="0"/>
           </a:p>
         </p:txBody>
       </p:sp>
@@ -1445,7 +1625,7 @@
           <a:p>
             <a:fld id="{6A2CFF65-CB9C-5A47-B7DE-47882B59B3DA}" type="slidenum">
               <a:rPr lang="de-DE" smtClean="0"/>
-              <a:t>22</a:t>
+              <a:t>20</a:t>
             </a:fld>
             <a:endParaRPr lang="de-DE"/>
           </a:p>
@@ -1454,7 +1634,7 @@
     </p:spTree>
     <p:extLst>
       <p:ext uri="{BB962C8B-B14F-4D97-AF65-F5344CB8AC3E}">
-        <p14:creationId xmlns:p14="http://schemas.microsoft.com/office/powerpoint/2010/main" val="865758175"/>
+        <p14:creationId xmlns:p14="http://schemas.microsoft.com/office/powerpoint/2010/main" val="660173880"/>
       </p:ext>
     </p:extLst>
   </p:cSld>
@@ -1508,7 +1688,66 @@
           <a:bodyPr/>
           <a:lstStyle/>
           <a:p>
-            <a:endParaRPr lang="de-DE"/>
+            <a:r>
+              <a:rPr lang="de-DE" dirty="0" smtClean="0"/>
+              <a:t>Design Pattern: </a:t>
+            </a:r>
+            <a:r>
+              <a:rPr lang="de-DE" dirty="0" err="1" smtClean="0"/>
+              <a:t>Strategy</a:t>
+            </a:r>
+            <a:endParaRPr lang="de-DE" dirty="0" smtClean="0"/>
+          </a:p>
+          <a:p>
+            <a:r>
+              <a:rPr lang="de-DE" dirty="0" smtClean="0"/>
+              <a:t>Mit der </a:t>
+            </a:r>
+            <a:r>
+              <a:rPr lang="de-DE" dirty="0" err="1" smtClean="0"/>
+              <a:t>setDetaultStrategie</a:t>
+            </a:r>
+            <a:r>
+              <a:rPr lang="de-DE" dirty="0" smtClean="0"/>
+              <a:t>() Methode wird im </a:t>
+            </a:r>
+            <a:r>
+              <a:rPr lang="de-DE" dirty="0" err="1" smtClean="0"/>
+              <a:t>RobotController</a:t>
+            </a:r>
+            <a:r>
+              <a:rPr lang="de-DE" dirty="0" smtClean="0"/>
+              <a:t> die Strategie definiert. Durch die </a:t>
+            </a:r>
+            <a:r>
+              <a:rPr lang="de-DE" dirty="0" err="1" smtClean="0"/>
+              <a:t>verwendung</a:t>
+            </a:r>
+            <a:r>
+              <a:rPr lang="de-DE" dirty="0" smtClean="0"/>
+              <a:t> des </a:t>
+            </a:r>
+            <a:r>
+              <a:rPr lang="de-DE" dirty="0" err="1" smtClean="0"/>
+              <a:t>Strategy</a:t>
+            </a:r>
+            <a:r>
+              <a:rPr lang="de-DE" dirty="0" smtClean="0"/>
+              <a:t> Patterns,</a:t>
+            </a:r>
+            <a:r>
+              <a:rPr lang="de-DE" baseline="0" dirty="0" smtClean="0"/>
+              <a:t> wäre es ohne </a:t>
+            </a:r>
+            <a:r>
+              <a:rPr lang="de-DE" baseline="0" dirty="0" err="1" smtClean="0"/>
+              <a:t>grössere</a:t>
+            </a:r>
+            <a:r>
+              <a:rPr lang="de-DE" baseline="0" dirty="0" smtClean="0"/>
+              <a:t> Umstände möglich andere Strategien zu implementieren. </a:t>
+            </a:r>
+            <a:endParaRPr lang="de-DE" dirty="0" smtClean="0"/>
           </a:p>
         </p:txBody>
       </p:sp>
@@ -1529,7 +1768,91 @@
           <a:p>
             <a:fld id="{6A2CFF65-CB9C-5A47-B7DE-47882B59B3DA}" type="slidenum">
               <a:rPr lang="de-DE" smtClean="0"/>
-              <a:t>23</a:t>
+              <a:t>21</a:t>
+            </a:fld>
+            <a:endParaRPr lang="de-DE"/>
+          </a:p>
+        </p:txBody>
+      </p:sp>
+    </p:spTree>
+    <p:extLst>
+      <p:ext uri="{BB962C8B-B14F-4D97-AF65-F5344CB8AC3E}">
+        <p14:creationId xmlns:p14="http://schemas.microsoft.com/office/powerpoint/2010/main" val="660173880"/>
+      </p:ext>
+    </p:extLst>
+  </p:cSld>
+  <p:clrMapOvr>
+    <a:masterClrMapping/>
+  </p:clrMapOvr>
+</p:notes>
+</file>
+
+<file path=ppt/notesSlides/notesSlide19.xml><?xml version="1.0" encoding="utf-8"?>
+<p:notes xmlns:a="http://schemas.openxmlformats.org/drawingml/2006/main" xmlns:r="http://schemas.openxmlformats.org/officeDocument/2006/relationships" xmlns:p="http://schemas.openxmlformats.org/presentationml/2006/main">
+  <p:cSld>
+    <p:spTree>
+      <p:nvGrpSpPr>
+        <p:cNvPr id="1" name=""/>
+        <p:cNvGrpSpPr/>
+        <p:nvPr/>
+      </p:nvGrpSpPr>
+      <p:grpSpPr>
+        <a:xfrm>
+          <a:off x="0" y="0"/>
+          <a:ext cx="0" cy="0"/>
+          <a:chOff x="0" y="0"/>
+          <a:chExt cx="0" cy="0"/>
+        </a:xfrm>
+      </p:grpSpPr>
+      <p:sp>
+        <p:nvSpPr>
+          <p:cNvPr id="2" name="Folienbildplatzhalter 1"/>
+          <p:cNvSpPr>
+            <a:spLocks noGrp="1" noRot="1" noChangeAspect="1"/>
+          </p:cNvSpPr>
+          <p:nvPr>
+            <p:ph type="sldImg"/>
+          </p:nvPr>
+        </p:nvSpPr>
+        <p:spPr/>
+      </p:sp>
+      <p:sp>
+        <p:nvSpPr>
+          <p:cNvPr id="3" name="Notizenplatzhalter 2"/>
+          <p:cNvSpPr>
+            <a:spLocks noGrp="1"/>
+          </p:cNvSpPr>
+          <p:nvPr>
+            <p:ph type="body" idx="1"/>
+          </p:nvPr>
+        </p:nvSpPr>
+        <p:spPr/>
+        <p:txBody>
+          <a:bodyPr/>
+          <a:lstStyle/>
+          <a:p>
+            <a:endParaRPr lang="de-DE"/>
+          </a:p>
+        </p:txBody>
+      </p:sp>
+      <p:sp>
+        <p:nvSpPr>
+          <p:cNvPr id="4" name="Foliennummernplatzhalter 3"/>
+          <p:cNvSpPr>
+            <a:spLocks noGrp="1"/>
+          </p:cNvSpPr>
+          <p:nvPr>
+            <p:ph type="sldNum" sz="quarter" idx="10"/>
+          </p:nvPr>
+        </p:nvSpPr>
+        <p:spPr/>
+        <p:txBody>
+          <a:bodyPr/>
+          <a:lstStyle/>
+          <a:p>
+            <a:fld id="{6A2CFF65-CB9C-5A47-B7DE-47882B59B3DA}" type="slidenum">
+              <a:rPr lang="de-DE" smtClean="0"/>
+              <a:t>22</a:t>
             </a:fld>
             <a:endParaRPr lang="de-DE"/>
           </a:p>
@@ -1593,229 +1916,27 @@
           <a:lstStyle/>
           <a:p>
             <a:r>
-              <a:rPr lang="de-DE" sz="1200" b="1" kern="1200" dirty="0" smtClean="0">
-                <a:solidFill>
-                  <a:schemeClr val="tx1"/>
-                </a:solidFill>
-                <a:effectLst/>
-                <a:latin typeface="+mn-lt"/>
-                <a:ea typeface="+mn-ea"/>
-                <a:cs typeface="+mn-cs"/>
-              </a:rPr>
-              <a:t>Hindernisse setzen</a:t>
-            </a:r>
-          </a:p>
-          <a:p>
-            <a:r>
-              <a:rPr lang="de-DE" sz="1200" kern="1200" dirty="0" smtClean="0">
-                <a:solidFill>
-                  <a:schemeClr val="tx1"/>
-                </a:solidFill>
-                <a:effectLst/>
-                <a:latin typeface="+mn-lt"/>
-                <a:ea typeface="+mn-ea"/>
-                <a:cs typeface="+mn-cs"/>
-              </a:rPr>
-              <a:t>Ein Spieler setzt alle gewünschte Hindernisse (2D Hindernisse) auf dem Spielfeld. </a:t>
-            </a:r>
-          </a:p>
-          <a:p>
-            <a:r>
-              <a:rPr lang="de-DE" sz="1200" b="1" kern="1200" dirty="0" smtClean="0">
-                <a:solidFill>
-                  <a:schemeClr val="tx1"/>
-                </a:solidFill>
-                <a:effectLst/>
-                <a:latin typeface="+mn-lt"/>
-                <a:ea typeface="+mn-ea"/>
-                <a:cs typeface="+mn-cs"/>
-              </a:rPr>
-              <a:t>Roboter setzen</a:t>
-            </a:r>
-          </a:p>
-          <a:p>
-            <a:r>
-              <a:rPr lang="de-DE" sz="1200" kern="1200" dirty="0" smtClean="0">
-                <a:solidFill>
-                  <a:schemeClr val="tx1"/>
-                </a:solidFill>
-                <a:effectLst/>
-                <a:latin typeface="+mn-lt"/>
-                <a:ea typeface="+mn-ea"/>
-                <a:cs typeface="+mn-cs"/>
-              </a:rPr>
-              <a:t>Der Spieler setzt den Roboter auf das Spielfeld. Diese Position wird zugleich die Startposition des Roboters sein. </a:t>
-            </a:r>
-          </a:p>
-          <a:p>
-            <a:r>
-              <a:rPr lang="de-DE" sz="1200" b="1" kern="1200" dirty="0" smtClean="0">
-                <a:solidFill>
-                  <a:schemeClr val="tx1"/>
-                </a:solidFill>
-                <a:effectLst/>
-                <a:latin typeface="+mn-lt"/>
-                <a:ea typeface="+mn-ea"/>
-                <a:cs typeface="+mn-cs"/>
-              </a:rPr>
-              <a:t>Ziel setzten</a:t>
-            </a:r>
-          </a:p>
-          <a:p>
-            <a:r>
-              <a:rPr lang="de-DE" sz="1200" kern="1200" dirty="0" smtClean="0">
-                <a:solidFill>
-                  <a:schemeClr val="tx1"/>
-                </a:solidFill>
-                <a:effectLst/>
-                <a:latin typeface="+mn-lt"/>
-                <a:ea typeface="+mn-ea"/>
-                <a:cs typeface="+mn-cs"/>
-              </a:rPr>
-              <a:t>Der Spieler setzt das Ziel, das der Roboter suchen muss, auf das Spielfeld. </a:t>
-            </a:r>
-          </a:p>
-          <a:p>
-            <a:r>
-              <a:rPr lang="de-DE" sz="1200" b="1" kern="1200" dirty="0" smtClean="0">
-                <a:solidFill>
-                  <a:schemeClr val="tx1"/>
-                </a:solidFill>
-                <a:effectLst/>
-                <a:latin typeface="+mn-lt"/>
-                <a:ea typeface="+mn-ea"/>
-                <a:cs typeface="+mn-cs"/>
-              </a:rPr>
-              <a:t>Roboter starten</a:t>
-            </a:r>
-          </a:p>
-          <a:p>
-            <a:r>
-              <a:rPr lang="de-DE" sz="1200" kern="1200" dirty="0" smtClean="0">
-                <a:solidFill>
-                  <a:schemeClr val="tx1"/>
-                </a:solidFill>
-                <a:effectLst/>
-                <a:latin typeface="+mn-lt"/>
-                <a:ea typeface="+mn-ea"/>
-                <a:cs typeface="+mn-cs"/>
-              </a:rPr>
-              <a:t>Der Spieler startet das Spiel, d.h. der Roboter beginnt das Ziel zu suchen. </a:t>
-            </a:r>
-          </a:p>
-          <a:p>
-            <a:r>
-              <a:rPr lang="de-DE" sz="1200" b="1" kern="1200" dirty="0" smtClean="0">
-                <a:solidFill>
-                  <a:schemeClr val="tx1"/>
-                </a:solidFill>
-                <a:effectLst/>
-                <a:latin typeface="+mn-lt"/>
-                <a:ea typeface="+mn-ea"/>
-                <a:cs typeface="+mn-cs"/>
-              </a:rPr>
-              <a:t>Suche abbrechen</a:t>
-            </a:r>
-          </a:p>
-          <a:p>
-            <a:r>
-              <a:rPr lang="de-DE" sz="1200" kern="1200" dirty="0" smtClean="0">
-                <a:solidFill>
-                  <a:schemeClr val="tx1"/>
-                </a:solidFill>
-                <a:effectLst/>
-                <a:latin typeface="+mn-lt"/>
-                <a:ea typeface="+mn-ea"/>
-                <a:cs typeface="+mn-cs"/>
-              </a:rPr>
-              <a:t>Der Spieler unterbricht die Suche nach dem Ziel und kehrt zum Spielfeldeditor zurück</a:t>
-            </a:r>
-          </a:p>
-          <a:p>
-            <a:r>
-              <a:rPr lang="de-DE" sz="1200" b="1" kern="1200" dirty="0" smtClean="0">
-                <a:solidFill>
-                  <a:schemeClr val="tx1"/>
-                </a:solidFill>
-                <a:effectLst/>
-                <a:latin typeface="+mn-lt"/>
-                <a:ea typeface="+mn-ea"/>
-                <a:cs typeface="+mn-cs"/>
-              </a:rPr>
-              <a:t>Spielfeld löschen</a:t>
-            </a:r>
-          </a:p>
-          <a:p>
-            <a:r>
-              <a:rPr lang="de-DE" sz="1200" kern="1200" dirty="0" smtClean="0">
-                <a:solidFill>
-                  <a:schemeClr val="tx1"/>
-                </a:solidFill>
-                <a:effectLst/>
-                <a:latin typeface="+mn-lt"/>
-                <a:ea typeface="+mn-ea"/>
-                <a:cs typeface="+mn-cs"/>
-              </a:rPr>
-              <a:t>Der Spieler hat die Möglichkeit das Spiel jederzeit zurückzusetzten, d.h. Hindernisse, Ziel und Roboter werden vom Spielfeld entfernt. </a:t>
-            </a:r>
-          </a:p>
-          <a:p>
-            <a:r>
-              <a:rPr lang="de-DE" sz="1200" b="1" kern="1200" dirty="0" smtClean="0">
-                <a:solidFill>
-                  <a:schemeClr val="tx1"/>
-                </a:solidFill>
-                <a:effectLst/>
-                <a:latin typeface="+mn-lt"/>
-                <a:ea typeface="+mn-ea"/>
-                <a:cs typeface="+mn-cs"/>
-              </a:rPr>
-              <a:t>Spielfeld importieren</a:t>
-            </a:r>
-          </a:p>
-          <a:p>
-            <a:r>
-              <a:rPr lang="de-DE" sz="1200" kern="1200" dirty="0" smtClean="0">
-                <a:solidFill>
-                  <a:schemeClr val="tx1"/>
-                </a:solidFill>
-                <a:effectLst/>
-                <a:latin typeface="+mn-lt"/>
-                <a:ea typeface="+mn-ea"/>
-                <a:cs typeface="+mn-cs"/>
-              </a:rPr>
-              <a:t>Das Spielfeld kann anhand eines XML-Files importiert werden.</a:t>
-            </a:r>
-          </a:p>
-          <a:p>
-            <a:r>
-              <a:rPr lang="de-DE" sz="1200" b="1" kern="1200" dirty="0" smtClean="0">
-                <a:solidFill>
-                  <a:schemeClr val="tx1"/>
-                </a:solidFill>
-                <a:effectLst/>
-                <a:latin typeface="+mn-lt"/>
-                <a:ea typeface="+mn-ea"/>
-                <a:cs typeface="+mn-cs"/>
-              </a:rPr>
-              <a:t>Spielfeld exportieren</a:t>
-            </a:r>
-          </a:p>
-          <a:p>
-            <a:r>
-              <a:rPr lang="de-DE" sz="1200" kern="1200" dirty="0" smtClean="0">
-                <a:solidFill>
-                  <a:schemeClr val="tx1"/>
-                </a:solidFill>
-                <a:effectLst/>
-                <a:latin typeface="+mn-lt"/>
-                <a:ea typeface="+mn-ea"/>
-                <a:cs typeface="+mn-cs"/>
-              </a:rPr>
-              <a:t>Das Spielfeld wird in ein neu erstelltes XML-File abgespeichert. </a:t>
-            </a:r>
-          </a:p>
-          <a:p>
+              <a:rPr lang="de-DE" dirty="0" smtClean="0"/>
+              <a:t>Teilung </a:t>
+            </a:r>
+            <a:r>
+              <a:rPr lang="de-DE" dirty="0" smtClean="0"/>
+              <a:t>Frontend/</a:t>
+            </a:r>
+            <a:r>
+              <a:rPr lang="de-DE" dirty="0" smtClean="0"/>
+              <a:t>Robot</a:t>
+            </a:r>
+          </a:p>
+          <a:p>
+            <a:r>
+              <a:rPr lang="de-DE" dirty="0" smtClean="0"/>
+              <a:t>Dadurch konnten wir den Editor programmieren und den Algorithmus getrennt voneinander implementieren.</a:t>
+            </a:r>
+            <a:r>
+              <a:rPr lang="de-DE" baseline="0" dirty="0" smtClean="0"/>
+              <a:t> </a:t>
+            </a:r>
             <a:endParaRPr lang="de-DE" dirty="0"/>
           </a:p>
         </p:txBody>
@@ -1837,7 +1958,7 @@
           <a:p>
             <a:fld id="{6A2CFF65-CB9C-5A47-B7DE-47882B59B3DA}" type="slidenum">
               <a:rPr lang="de-DE" smtClean="0"/>
-              <a:t>6</a:t>
+              <a:t>2</a:t>
             </a:fld>
             <a:endParaRPr lang="de-DE"/>
           </a:p>
@@ -1846,7 +1967,91 @@
     </p:spTree>
     <p:extLst>
       <p:ext uri="{BB962C8B-B14F-4D97-AF65-F5344CB8AC3E}">
-        <p14:creationId xmlns:p14="http://schemas.microsoft.com/office/powerpoint/2010/main" val="4154515398"/>
+        <p14:creationId xmlns:p14="http://schemas.microsoft.com/office/powerpoint/2010/main" val="1841319628"/>
+      </p:ext>
+    </p:extLst>
+  </p:cSld>
+  <p:clrMapOvr>
+    <a:masterClrMapping/>
+  </p:clrMapOvr>
+</p:notes>
+</file>
+
+<file path=ppt/notesSlides/notesSlide20.xml><?xml version="1.0" encoding="utf-8"?>
+<p:notes xmlns:a="http://schemas.openxmlformats.org/drawingml/2006/main" xmlns:r="http://schemas.openxmlformats.org/officeDocument/2006/relationships" xmlns:p="http://schemas.openxmlformats.org/presentationml/2006/main">
+  <p:cSld>
+    <p:spTree>
+      <p:nvGrpSpPr>
+        <p:cNvPr id="1" name=""/>
+        <p:cNvGrpSpPr/>
+        <p:nvPr/>
+      </p:nvGrpSpPr>
+      <p:grpSpPr>
+        <a:xfrm>
+          <a:off x="0" y="0"/>
+          <a:ext cx="0" cy="0"/>
+          <a:chOff x="0" y="0"/>
+          <a:chExt cx="0" cy="0"/>
+        </a:xfrm>
+      </p:grpSpPr>
+      <p:sp>
+        <p:nvSpPr>
+          <p:cNvPr id="2" name="Folienbildplatzhalter 1"/>
+          <p:cNvSpPr>
+            <a:spLocks noGrp="1" noRot="1" noChangeAspect="1"/>
+          </p:cNvSpPr>
+          <p:nvPr>
+            <p:ph type="sldImg"/>
+          </p:nvPr>
+        </p:nvSpPr>
+        <p:spPr/>
+      </p:sp>
+      <p:sp>
+        <p:nvSpPr>
+          <p:cNvPr id="3" name="Notizenplatzhalter 2"/>
+          <p:cNvSpPr>
+            <a:spLocks noGrp="1"/>
+          </p:cNvSpPr>
+          <p:nvPr>
+            <p:ph type="body" idx="1"/>
+          </p:nvPr>
+        </p:nvSpPr>
+        <p:spPr/>
+        <p:txBody>
+          <a:bodyPr/>
+          <a:lstStyle/>
+          <a:p>
+            <a:endParaRPr lang="de-DE"/>
+          </a:p>
+        </p:txBody>
+      </p:sp>
+      <p:sp>
+        <p:nvSpPr>
+          <p:cNvPr id="4" name="Foliennummernplatzhalter 3"/>
+          <p:cNvSpPr>
+            <a:spLocks noGrp="1"/>
+          </p:cNvSpPr>
+          <p:nvPr>
+            <p:ph type="sldNum" sz="quarter" idx="10"/>
+          </p:nvPr>
+        </p:nvSpPr>
+        <p:spPr/>
+        <p:txBody>
+          <a:bodyPr/>
+          <a:lstStyle/>
+          <a:p>
+            <a:fld id="{6A2CFF65-CB9C-5A47-B7DE-47882B59B3DA}" type="slidenum">
+              <a:rPr lang="de-DE" smtClean="0"/>
+              <a:t>23</a:t>
+            </a:fld>
+            <a:endParaRPr lang="de-DE"/>
+          </a:p>
+        </p:txBody>
+      </p:sp>
+    </p:spTree>
+    <p:extLst>
+      <p:ext uri="{BB962C8B-B14F-4D97-AF65-F5344CB8AC3E}">
+        <p14:creationId xmlns:p14="http://schemas.microsoft.com/office/powerpoint/2010/main" val="865758175"/>
       </p:ext>
     </p:extLst>
   </p:cSld>
@@ -1902,17 +2107,21 @@
           <a:p>
             <a:r>
               <a:rPr lang="de-DE" dirty="0" smtClean="0"/>
-              <a:t>Funktioniert bei Roboter/Ziel</a:t>
+              <a:t>Das Domain Model zeigt</a:t>
             </a:r>
             <a:r>
               <a:rPr lang="de-DE" baseline="0" dirty="0" smtClean="0"/>
-              <a:t> </a:t>
-            </a:r>
-            <a:r>
-              <a:rPr lang="de-DE" baseline="0" smtClean="0"/>
-              <a:t>setzten gleich</a:t>
-            </a:r>
-            <a:endParaRPr lang="de-DE"/>
+              <a:t> alle Objekte die im Search Robot von „</a:t>
+            </a:r>
+            <a:r>
+              <a:rPr lang="de-DE" baseline="0" dirty="0" err="1" smtClean="0"/>
+              <a:t>aussen</a:t>
+            </a:r>
+            <a:r>
+              <a:rPr lang="de-DE" baseline="0" dirty="0" smtClean="0"/>
+              <a:t>“ gesehen enthalten sind. Die ganze Logik geschieht in diversen anderen Klassen die hier nicht aufgezeigt werden. </a:t>
+            </a:r>
+            <a:endParaRPr lang="de-DE" dirty="0"/>
           </a:p>
         </p:txBody>
       </p:sp>
@@ -1933,7 +2142,7 @@
           <a:p>
             <a:fld id="{6A2CFF65-CB9C-5A47-B7DE-47882B59B3DA}" type="slidenum">
               <a:rPr lang="de-DE" smtClean="0"/>
-              <a:t>7</a:t>
+              <a:t>4</a:t>
             </a:fld>
             <a:endParaRPr lang="de-DE"/>
           </a:p>
@@ -1942,7 +2151,7 @@
     </p:spTree>
     <p:extLst>
       <p:ext uri="{BB962C8B-B14F-4D97-AF65-F5344CB8AC3E}">
-        <p14:creationId xmlns:p14="http://schemas.microsoft.com/office/powerpoint/2010/main" val="660173880"/>
+        <p14:creationId xmlns:p14="http://schemas.microsoft.com/office/powerpoint/2010/main" val="217755"/>
       </p:ext>
     </p:extLst>
   </p:cSld>
@@ -1997,13 +2206,229 @@
           <a:lstStyle/>
           <a:p>
             <a:r>
-              <a:rPr lang="de-DE" dirty="0" smtClean="0"/>
-              <a:t>Funktioniert bei Roboter/Ziel</a:t>
-            </a:r>
-            <a:r>
-              <a:rPr lang="de-DE" baseline="0" dirty="0" smtClean="0"/>
-              <a:t> setzten gleich</a:t>
-            </a:r>
+              <a:rPr lang="de-DE" sz="1200" b="1" kern="1200" dirty="0" smtClean="0">
+                <a:solidFill>
+                  <a:schemeClr val="tx1"/>
+                </a:solidFill>
+                <a:effectLst/>
+                <a:latin typeface="+mn-lt"/>
+                <a:ea typeface="+mn-ea"/>
+                <a:cs typeface="+mn-cs"/>
+              </a:rPr>
+              <a:t>Hindernisse setzen</a:t>
+            </a:r>
+          </a:p>
+          <a:p>
+            <a:r>
+              <a:rPr lang="de-DE" sz="1200" kern="1200" dirty="0" smtClean="0">
+                <a:solidFill>
+                  <a:schemeClr val="tx1"/>
+                </a:solidFill>
+                <a:effectLst/>
+                <a:latin typeface="+mn-lt"/>
+                <a:ea typeface="+mn-ea"/>
+                <a:cs typeface="+mn-cs"/>
+              </a:rPr>
+              <a:t>Ein Spieler setzt alle gewünschte Hindernisse (2D Hindernisse) auf dem Spielfeld. </a:t>
+            </a:r>
+          </a:p>
+          <a:p>
+            <a:r>
+              <a:rPr lang="de-DE" sz="1200" b="1" kern="1200" dirty="0" smtClean="0">
+                <a:solidFill>
+                  <a:schemeClr val="tx1"/>
+                </a:solidFill>
+                <a:effectLst/>
+                <a:latin typeface="+mn-lt"/>
+                <a:ea typeface="+mn-ea"/>
+                <a:cs typeface="+mn-cs"/>
+              </a:rPr>
+              <a:t>Roboter setzen</a:t>
+            </a:r>
+          </a:p>
+          <a:p>
+            <a:r>
+              <a:rPr lang="de-DE" sz="1200" kern="1200" dirty="0" smtClean="0">
+                <a:solidFill>
+                  <a:schemeClr val="tx1"/>
+                </a:solidFill>
+                <a:effectLst/>
+                <a:latin typeface="+mn-lt"/>
+                <a:ea typeface="+mn-ea"/>
+                <a:cs typeface="+mn-cs"/>
+              </a:rPr>
+              <a:t>Der Spieler setzt den Roboter auf das Spielfeld. Diese Position wird zugleich die Startposition des Roboters sein. </a:t>
+            </a:r>
+          </a:p>
+          <a:p>
+            <a:r>
+              <a:rPr lang="de-DE" sz="1200" b="1" kern="1200" dirty="0" smtClean="0">
+                <a:solidFill>
+                  <a:schemeClr val="tx1"/>
+                </a:solidFill>
+                <a:effectLst/>
+                <a:latin typeface="+mn-lt"/>
+                <a:ea typeface="+mn-ea"/>
+                <a:cs typeface="+mn-cs"/>
+              </a:rPr>
+              <a:t>Ziel setzten</a:t>
+            </a:r>
+          </a:p>
+          <a:p>
+            <a:r>
+              <a:rPr lang="de-DE" sz="1200" kern="1200" dirty="0" smtClean="0">
+                <a:solidFill>
+                  <a:schemeClr val="tx1"/>
+                </a:solidFill>
+                <a:effectLst/>
+                <a:latin typeface="+mn-lt"/>
+                <a:ea typeface="+mn-ea"/>
+                <a:cs typeface="+mn-cs"/>
+              </a:rPr>
+              <a:t>Der Spieler setzt das Ziel, das der Roboter suchen muss, auf das Spielfeld. </a:t>
+            </a:r>
+          </a:p>
+          <a:p>
+            <a:r>
+              <a:rPr lang="de-DE" sz="1200" b="1" kern="1200" dirty="0" smtClean="0">
+                <a:solidFill>
+                  <a:schemeClr val="tx1"/>
+                </a:solidFill>
+                <a:effectLst/>
+                <a:latin typeface="+mn-lt"/>
+                <a:ea typeface="+mn-ea"/>
+                <a:cs typeface="+mn-cs"/>
+              </a:rPr>
+              <a:t>Roboter starten</a:t>
+            </a:r>
+          </a:p>
+          <a:p>
+            <a:r>
+              <a:rPr lang="de-DE" sz="1200" kern="1200" dirty="0" smtClean="0">
+                <a:solidFill>
+                  <a:schemeClr val="tx1"/>
+                </a:solidFill>
+                <a:effectLst/>
+                <a:latin typeface="+mn-lt"/>
+                <a:ea typeface="+mn-ea"/>
+                <a:cs typeface="+mn-cs"/>
+              </a:rPr>
+              <a:t>Der Spieler startet das Spiel, d.h. der Roboter beginnt das Ziel zu suchen. </a:t>
+            </a:r>
+          </a:p>
+          <a:p>
+            <a:r>
+              <a:rPr lang="de-DE" sz="1200" b="1" kern="1200" dirty="0" smtClean="0">
+                <a:solidFill>
+                  <a:schemeClr val="tx1"/>
+                </a:solidFill>
+                <a:effectLst/>
+                <a:latin typeface="+mn-lt"/>
+                <a:ea typeface="+mn-ea"/>
+                <a:cs typeface="+mn-cs"/>
+              </a:rPr>
+              <a:t>Suche abbrechen</a:t>
+            </a:r>
+          </a:p>
+          <a:p>
+            <a:r>
+              <a:rPr lang="de-DE" sz="1200" kern="1200" dirty="0" smtClean="0">
+                <a:solidFill>
+                  <a:schemeClr val="tx1"/>
+                </a:solidFill>
+                <a:effectLst/>
+                <a:latin typeface="+mn-lt"/>
+                <a:ea typeface="+mn-ea"/>
+                <a:cs typeface="+mn-cs"/>
+              </a:rPr>
+              <a:t>Der Spieler unterbricht die Suche nach dem Ziel und kehrt zum Spielfeldeditor zurück</a:t>
+            </a:r>
+          </a:p>
+          <a:p>
+            <a:r>
+              <a:rPr lang="de-DE" sz="1200" b="1" kern="1200" dirty="0" smtClean="0">
+                <a:solidFill>
+                  <a:schemeClr val="tx1"/>
+                </a:solidFill>
+                <a:effectLst/>
+                <a:latin typeface="+mn-lt"/>
+                <a:ea typeface="+mn-ea"/>
+                <a:cs typeface="+mn-cs"/>
+              </a:rPr>
+              <a:t>Spielfeld löschen</a:t>
+            </a:r>
+          </a:p>
+          <a:p>
+            <a:r>
+              <a:rPr lang="de-DE" sz="1200" kern="1200" dirty="0" smtClean="0">
+                <a:solidFill>
+                  <a:schemeClr val="tx1"/>
+                </a:solidFill>
+                <a:effectLst/>
+                <a:latin typeface="+mn-lt"/>
+                <a:ea typeface="+mn-ea"/>
+                <a:cs typeface="+mn-cs"/>
+              </a:rPr>
+              <a:t>Der Spieler hat die Möglichkeit das Spiel jederzeit zurückzusetzten, d.h. Hindernisse, Ziel und Roboter werden vom Spielfeld entfernt. </a:t>
+            </a:r>
+          </a:p>
+          <a:p>
+            <a:r>
+              <a:rPr lang="de-DE" sz="1200" b="1" kern="1200" dirty="0" smtClean="0">
+                <a:solidFill>
+                  <a:schemeClr val="tx1"/>
+                </a:solidFill>
+                <a:effectLst/>
+                <a:latin typeface="+mn-lt"/>
+                <a:ea typeface="+mn-ea"/>
+                <a:cs typeface="+mn-cs"/>
+              </a:rPr>
+              <a:t>Spielfeld importieren</a:t>
+            </a:r>
+          </a:p>
+          <a:p>
+            <a:r>
+              <a:rPr lang="de-DE" sz="1200" kern="1200" dirty="0" smtClean="0">
+                <a:solidFill>
+                  <a:schemeClr val="tx1"/>
+                </a:solidFill>
+                <a:effectLst/>
+                <a:latin typeface="+mn-lt"/>
+                <a:ea typeface="+mn-ea"/>
+                <a:cs typeface="+mn-cs"/>
+              </a:rPr>
+              <a:t>Das Spielfeld kann anhand eines XML-Files importiert werden.</a:t>
+            </a:r>
+          </a:p>
+          <a:p>
+            <a:r>
+              <a:rPr lang="de-DE" sz="1200" b="1" kern="1200" dirty="0" smtClean="0">
+                <a:solidFill>
+                  <a:schemeClr val="tx1"/>
+                </a:solidFill>
+                <a:effectLst/>
+                <a:latin typeface="+mn-lt"/>
+                <a:ea typeface="+mn-ea"/>
+                <a:cs typeface="+mn-cs"/>
+              </a:rPr>
+              <a:t>Spielfeld exportieren</a:t>
+            </a:r>
+          </a:p>
+          <a:p>
+            <a:r>
+              <a:rPr lang="de-DE" sz="1200" kern="1200" dirty="0" smtClean="0">
+                <a:solidFill>
+                  <a:schemeClr val="tx1"/>
+                </a:solidFill>
+                <a:effectLst/>
+                <a:latin typeface="+mn-lt"/>
+                <a:ea typeface="+mn-ea"/>
+                <a:cs typeface="+mn-cs"/>
+              </a:rPr>
+              <a:t>Das Spielfeld wird in ein neu erstelltes XML-File abgespeichert. </a:t>
+            </a:r>
+          </a:p>
+          <a:p>
             <a:endParaRPr lang="de-DE" dirty="0"/>
           </a:p>
         </p:txBody>
@@ -2025,7 +2450,7 @@
           <a:p>
             <a:fld id="{6A2CFF65-CB9C-5A47-B7DE-47882B59B3DA}" type="slidenum">
               <a:rPr lang="de-DE" smtClean="0"/>
-              <a:t>8</a:t>
+              <a:t>6</a:t>
             </a:fld>
             <a:endParaRPr lang="de-DE"/>
           </a:p>
@@ -2034,7 +2459,7 @@
     </p:spTree>
     <p:extLst>
       <p:ext uri="{BB962C8B-B14F-4D97-AF65-F5344CB8AC3E}">
-        <p14:creationId xmlns:p14="http://schemas.microsoft.com/office/powerpoint/2010/main" val="660173880"/>
+        <p14:creationId xmlns:p14="http://schemas.microsoft.com/office/powerpoint/2010/main" val="4154515398"/>
       </p:ext>
     </p:extLst>
   </p:cSld>
@@ -2094,9 +2519,13 @@
             </a:r>
             <a:r>
               <a:rPr lang="de-DE" baseline="0" dirty="0" smtClean="0"/>
-              <a:t> setzten gleich</a:t>
-            </a:r>
-            <a:endParaRPr lang="de-DE" dirty="0"/>
+              <a:t> </a:t>
+            </a:r>
+            <a:r>
+              <a:rPr lang="de-DE" baseline="0" smtClean="0"/>
+              <a:t>setzten gleich</a:t>
+            </a:r>
+            <a:endParaRPr lang="de-DE"/>
           </a:p>
         </p:txBody>
       </p:sp>
@@ -2117,7 +2546,7 @@
           <a:p>
             <a:fld id="{6A2CFF65-CB9C-5A47-B7DE-47882B59B3DA}" type="slidenum">
               <a:rPr lang="de-DE" smtClean="0"/>
-              <a:t>9</a:t>
+              <a:t>7</a:t>
             </a:fld>
             <a:endParaRPr lang="de-DE"/>
           </a:p>
@@ -2188,23 +2617,6 @@
               <a:rPr lang="de-DE" baseline="0" dirty="0" smtClean="0"/>
               <a:t> setzten gleich</a:t>
             </a:r>
-          </a:p>
-          <a:p>
-            <a:r>
-              <a:rPr lang="de-DE" baseline="0" dirty="0" smtClean="0"/>
-              <a:t>Design Pattern: </a:t>
-            </a:r>
-            <a:r>
-              <a:rPr lang="de-DE" baseline="0" dirty="0" err="1" smtClean="0"/>
-              <a:t>Decorator</a:t>
-            </a:r>
-            <a:endParaRPr lang="de-DE" baseline="0" dirty="0" smtClean="0"/>
-          </a:p>
-          <a:p>
-            <a:r>
-              <a:rPr lang="de-DE" baseline="0" dirty="0" smtClean="0"/>
-              <a:t>-&gt; Abstract Item und dann diverse Versionen davon, diese könnten durch Vererbung einzeln noch spezifiziert werden</a:t>
-            </a:r>
             <a:endParaRPr lang="de-DE" dirty="0"/>
           </a:p>
         </p:txBody>
@@ -2226,7 +2638,7 @@
           <a:p>
             <a:fld id="{6A2CFF65-CB9C-5A47-B7DE-47882B59B3DA}" type="slidenum">
               <a:rPr lang="de-DE" smtClean="0"/>
-              <a:t>10</a:t>
+              <a:t>8</a:t>
             </a:fld>
             <a:endParaRPr lang="de-DE"/>
           </a:p>
@@ -2291,17 +2703,11 @@
           <a:p>
             <a:r>
               <a:rPr lang="de-DE" dirty="0" smtClean="0"/>
-              <a:t>Design Pattern: Factory</a:t>
-            </a:r>
-          </a:p>
-          <a:p>
-            <a:r>
-              <a:rPr lang="de-DE" dirty="0" smtClean="0"/>
-              <a:t>Für jedes Item gibt es ein Tool, welches</a:t>
+              <a:t>Funktioniert bei Roboter/Ziel</a:t>
             </a:r>
             <a:r>
               <a:rPr lang="de-DE" baseline="0" dirty="0" smtClean="0"/>
-              <a:t> diese Erstellt. </a:t>
+              <a:t> setzten gleich</a:t>
             </a:r>
             <a:endParaRPr lang="de-DE" dirty="0"/>
           </a:p>
@@ -2324,7 +2730,7 @@
           <a:p>
             <a:fld id="{6A2CFF65-CB9C-5A47-B7DE-47882B59B3DA}" type="slidenum">
               <a:rPr lang="de-DE" smtClean="0"/>
-              <a:t>11</a:t>
+              <a:t>9</a:t>
             </a:fld>
             <a:endParaRPr lang="de-DE"/>
           </a:p>
@@ -2389,41 +2795,28 @@
           <a:p>
             <a:r>
               <a:rPr lang="de-DE" dirty="0" smtClean="0"/>
-              <a:t>Design Pattern: Observer</a:t>
-            </a:r>
-          </a:p>
-          <a:p>
-            <a:r>
-              <a:rPr lang="de-DE" dirty="0" smtClean="0"/>
-              <a:t>Jedes Item besitz</a:t>
+              <a:t>Funktioniert bei Roboter/Ziel</a:t>
             </a:r>
             <a:r>
               <a:rPr lang="de-DE" baseline="0" dirty="0" smtClean="0"/>
-              <a:t> mehrere </a:t>
+              <a:t> setzten gleich</a:t>
+            </a:r>
+          </a:p>
+          <a:p>
+            <a:r>
+              <a:rPr lang="de-DE" baseline="0" dirty="0" smtClean="0"/>
+              <a:t>Design Pattern: </a:t>
             </a:r>
             <a:r>
               <a:rPr lang="de-DE" baseline="0" dirty="0" err="1" smtClean="0"/>
-              <a:t>ItemChangedListeners</a:t>
-            </a:r>
+              <a:t>Decorator</a:t>
+            </a:r>
+            <a:endParaRPr lang="de-DE" baseline="0" dirty="0" smtClean="0"/>
+          </a:p>
+          <a:p>
             <a:r>
               <a:rPr lang="de-DE" baseline="0" dirty="0" smtClean="0"/>
-              <a:t> (Observer), dieser gibt eine Änderung (durch </a:t>
-            </a:r>
-            <a:r>
-              <a:rPr lang="de-DE" baseline="0" dirty="0" err="1" smtClean="0"/>
-              <a:t>notify</a:t>
-            </a:r>
-            <a:r>
-              <a:rPr lang="de-DE" baseline="0" dirty="0" smtClean="0"/>
-              <a:t> ausgelöst) des Items weiter an das Field und löst bspw. Ein </a:t>
-            </a:r>
-            <a:r>
-              <a:rPr lang="de-DE" baseline="0" dirty="0" err="1" smtClean="0"/>
-              <a:t>repaint</a:t>
-            </a:r>
-            <a:r>
-              <a:rPr lang="de-DE" baseline="0" dirty="0" smtClean="0"/>
-              <a:t> aus. </a:t>
+              <a:t>-&gt; Abstract Item und dann diverse Versionen davon, diese könnten durch Vererbung einzeln noch spezifiziert werden</a:t>
             </a:r>
             <a:endParaRPr lang="de-DE" dirty="0"/>
           </a:p>
@@ -2446,7 +2839,7 @@
           <a:p>
             <a:fld id="{6A2CFF65-CB9C-5A47-B7DE-47882B59B3DA}" type="slidenum">
               <a:rPr lang="de-DE" smtClean="0"/>
-              <a:t>12</a:t>
+              <a:t>10</a:t>
             </a:fld>
             <a:endParaRPr lang="de-DE"/>
           </a:p>
@@ -2511,33 +2904,17 @@
           <a:p>
             <a:r>
               <a:rPr lang="de-DE" dirty="0" smtClean="0"/>
-              <a:t>Design Pattern: Observer</a:t>
+              <a:t>Design Pattern: Factory</a:t>
             </a:r>
           </a:p>
           <a:p>
             <a:r>
               <a:rPr lang="de-DE" dirty="0" smtClean="0"/>
-              <a:t>Das Field ein</a:t>
+              <a:t>Für jedes Item gibt es ein Tool, welches</a:t>
             </a:r>
             <a:r>
               <a:rPr lang="de-DE" baseline="0" dirty="0" smtClean="0"/>
-              <a:t> </a:t>
-            </a:r>
-            <a:r>
-              <a:rPr lang="de-DE" baseline="0" dirty="0" err="1" smtClean="0"/>
-              <a:t>FieldChangedListener</a:t>
-            </a:r>
-            <a:r>
-              <a:rPr lang="de-DE" baseline="0" dirty="0" smtClean="0"/>
-              <a:t> (Observer), dieser gibt Änderungen (durch </a:t>
-            </a:r>
-            <a:r>
-              <a:rPr lang="de-DE" baseline="0" dirty="0" err="1" smtClean="0"/>
-              <a:t>notify</a:t>
-            </a:r>
-            <a:r>
-              <a:rPr lang="de-DE" baseline="0" dirty="0" smtClean="0"/>
-              <a:t> im Field aufgelöst) weiter an die View und löst bspw. Ein Repaint aus. </a:t>
+              <a:t> diese Erstellt. </a:t>
             </a:r>
             <a:endParaRPr lang="de-DE" dirty="0"/>
           </a:p>
@@ -2560,7 +2937,7 @@
           <a:p>
             <a:fld id="{6A2CFF65-CB9C-5A47-B7DE-47882B59B3DA}" type="slidenum">
               <a:rPr lang="de-DE" smtClean="0"/>
-              <a:t>13</a:t>
+              <a:t>11</a:t>
             </a:fld>
             <a:endParaRPr lang="de-DE"/>
           </a:p>
@@ -6695,7 +7072,11 @@
             </a:br>
             <a:r>
               <a:rPr lang="de-DE" sz="3200" dirty="0" smtClean="0"/>
-              <a:t>Hindernisse</a:t>
+              <a:t>Observer der H</a:t>
+            </a:r>
+            <a:r>
+              <a:rPr lang="de-DE" sz="3200" dirty="0" smtClean="0"/>
+              <a:t>indernisse</a:t>
             </a:r>
             <a:endParaRPr lang="de-DE" sz="3200" dirty="0"/>
           </a:p>
@@ -6847,7 +7228,11 @@
             </a:br>
             <a:r>
               <a:rPr lang="de-DE" sz="3200" dirty="0" smtClean="0"/>
-              <a:t>Field</a:t>
+              <a:t>Observer des F</a:t>
+            </a:r>
+            <a:r>
+              <a:rPr lang="de-DE" sz="3200" dirty="0" smtClean="0"/>
+              <a:t>ields</a:t>
             </a:r>
             <a:endParaRPr lang="de-DE" sz="3200" dirty="0"/>
           </a:p>
@@ -6998,8 +7383,12 @@
               <a:rPr lang="de-DE" dirty="0" smtClean="0"/>
             </a:br>
             <a:r>
+              <a:rPr lang="de-DE" sz="3200" dirty="0" err="1" smtClean="0"/>
+              <a:t>Selection</a:t>
+            </a:r>
+            <a:r>
               <a:rPr lang="de-DE" sz="3200" dirty="0" smtClean="0"/>
-              <a:t>State</a:t>
+              <a:t> State</a:t>
             </a:r>
             <a:endParaRPr lang="de-DE" sz="3200" dirty="0"/>
           </a:p>
@@ -7053,7 +7442,7 @@
       </p:sp>
       <p:pic>
         <p:nvPicPr>
-          <p:cNvPr id="3" name="Bild 2" descr="StateDiagramm.jpg"/>
+          <p:cNvPr id="6" name="Bild 5" descr="StateDiagramm.jpg"/>
           <p:cNvPicPr>
             <a:picLocks noChangeAspect="1"/>
           </p:cNvPicPr>
@@ -7067,13 +7456,13 @@
               </a:ext>
             </a:extLst>
           </a:blip>
-          <a:srcRect l="3872" t="10752" r="12753" b="15418"/>
+          <a:srcRect l="2407" t="10653" r="1666" b="8728"/>
           <a:stretch/>
         </p:blipFill>
         <p:spPr>
           <a:xfrm>
-            <a:off x="1141128" y="1641320"/>
-            <a:ext cx="7194911" cy="4747590"/>
+            <a:off x="303307" y="1625443"/>
+            <a:ext cx="8483601" cy="4798639"/>
           </a:xfrm>
           <a:prstGeom prst="rect">
             <a:avLst/>
@@ -7149,8 +7538,12 @@
               <a:rPr lang="de-DE" dirty="0" smtClean="0"/>
             </a:br>
             <a:r>
+              <a:rPr lang="de-DE" sz="3200" dirty="0" err="1" smtClean="0"/>
+              <a:t>Selection</a:t>
+            </a:r>
+            <a:r>
               <a:rPr lang="de-DE" sz="3200" dirty="0" smtClean="0"/>
-              <a:t>State</a:t>
+              <a:t> State</a:t>
             </a:r>
             <a:endParaRPr lang="de-DE" sz="3200" dirty="0"/>
           </a:p>
@@ -7321,7 +7714,6 @@
               <a:rPr lang="de-DE" dirty="0" smtClean="0"/>
               <a:t>Roboter Suche</a:t>
             </a:r>
-            <a:endParaRPr lang="de-DE" dirty="0" smtClean="0"/>
           </a:p>
           <a:p>
             <a:r>
@@ -7526,8 +7918,8 @@
         </p:blipFill>
         <p:spPr>
           <a:xfrm>
-            <a:off x="2713884" y="2720877"/>
-            <a:ext cx="3700959" cy="1414274"/>
+            <a:off x="1860138" y="2353733"/>
+            <a:ext cx="4661724" cy="1781418"/>
           </a:xfrm>
           <a:prstGeom prst="rect">
             <a:avLst/>
@@ -7594,10 +7986,6 @@
             <a:r>
               <a:rPr lang="de-DE" dirty="0" smtClean="0"/>
               <a:t>Roboter Suche</a:t>
-            </a:r>
-            <a:r>
-              <a:rPr lang="de-DE" dirty="0" smtClean="0"/>
-              <a:t/>
             </a:r>
             <a:br>
               <a:rPr lang="de-DE" dirty="0" smtClean="0"/>
@@ -7938,7 +8326,6 @@
               <a:rPr lang="de-DE" dirty="0" smtClean="0"/>
               <a:t>Domain Model</a:t>
             </a:r>
-            <a:endParaRPr lang="de-DE" dirty="0" smtClean="0"/>
           </a:p>
           <a:p>
             <a:r>
@@ -8143,20 +8530,42 @@
           <a:p>
             <a:r>
               <a:rPr lang="de-DE" dirty="0" smtClean="0"/>
-              <a:t>Kürzester </a:t>
-            </a:r>
-            <a:r>
-              <a:rPr lang="de-DE" dirty="0" smtClean="0"/>
-              <a:t>Weg zum nächsten unbekannten Feld </a:t>
-            </a:r>
-            <a:r>
-              <a:rPr lang="de-DE" dirty="0" smtClean="0"/>
-              <a:t>suchen</a:t>
+              <a:t>Kürzester Weg zum nächsten unbekannten Feld suchen</a:t>
             </a:r>
             <a:endParaRPr lang="de-DE" dirty="0"/>
           </a:p>
         </p:txBody>
       </p:sp>
+      <p:pic>
+        <p:nvPicPr>
+          <p:cNvPr id="3" name="Bild 2" descr="computePathPresentation.jpg"/>
+          <p:cNvPicPr>
+            <a:picLocks noChangeAspect="1"/>
+          </p:cNvPicPr>
+          <p:nvPr/>
+        </p:nvPicPr>
+        <p:blipFill>
+          <a:blip r:embed="rId3">
+            <a:extLst>
+              <a:ext uri="{28A0092B-C50C-407E-A947-70E740481C1C}">
+                <a14:useLocalDpi xmlns:a14="http://schemas.microsoft.com/office/drawing/2010/main" val="0"/>
+              </a:ext>
+            </a:extLst>
+          </a:blip>
+          <a:stretch>
+            <a:fillRect/>
+          </a:stretch>
+        </p:blipFill>
+        <p:spPr>
+          <a:xfrm>
+            <a:off x="2319867" y="2578100"/>
+            <a:ext cx="4876800" cy="4279900"/>
+          </a:xfrm>
+          <a:prstGeom prst="rect">
+            <a:avLst/>
+          </a:prstGeom>
+        </p:spPr>
+      </p:pic>
     </p:spTree>
     <p:extLst>
       <p:ext uri="{BB962C8B-B14F-4D97-AF65-F5344CB8AC3E}">
@@ -8371,25 +8780,6 @@
       </p:sp>
       <p:sp>
         <p:nvSpPr>
-          <p:cNvPr id="3" name="Inhaltsplatzhalter 2"/>
-          <p:cNvSpPr>
-            <a:spLocks noGrp="1"/>
-          </p:cNvSpPr>
-          <p:nvPr>
-            <p:ph idx="1"/>
-          </p:nvPr>
-        </p:nvSpPr>
-        <p:spPr/>
-        <p:txBody>
-          <a:bodyPr/>
-          <a:lstStyle/>
-          <a:p>
-            <a:endParaRPr lang="de-DE"/>
-          </a:p>
-        </p:txBody>
-      </p:sp>
-      <p:sp>
-        <p:nvSpPr>
           <p:cNvPr id="6" name="Foliennummernplatzhalter 5"/>
           <p:cNvSpPr>
             <a:spLocks noGrp="1"/>
@@ -8790,7 +9180,7 @@
           <p:nvPr/>
         </p:nvPicPr>
         <p:blipFill rotWithShape="1">
-          <a:blip r:embed="rId2">
+          <a:blip r:embed="rId3">
             <a:extLst>
               <a:ext uri="{28A0092B-C50C-407E-A947-70E740481C1C}">
                 <a14:useLocalDpi xmlns:a14="http://schemas.microsoft.com/office/drawing/2010/main" val="0"/>

</xml_diff>